<commit_message>
Criando o instalador para windows
</commit_message>
<xml_diff>
--- a/Programa Controle de Uso de Equipamento.pptx
+++ b/Programa Controle de Uso de Equipamento.pptx
@@ -128,8 +128,7 @@
 <file path=ppt/revisionInfo.xml><?xml version="1.0" encoding="utf-8"?>
 <p1510:revInfo xmlns:a="http://schemas.openxmlformats.org/drawingml/2006/main" xmlns:r="http://schemas.openxmlformats.org/officeDocument/2006/relationships" xmlns:p1510="http://schemas.microsoft.com/office/powerpoint/2015/10/main">
   <p1510:revLst>
-    <p1510:client id="{16A5242A-F561-4E20-AC38-71889702ECAC}" v="1" dt="2022-08-08T16:50:18.489"/>
-    <p1510:client id="{91DE2ACF-89F6-443E-984A-3648791F656E}" v="1" dt="2022-08-08T16:54:59.935"/>
+    <p1510:client id="{91DE2ACF-89F6-443E-984A-3648791F656E}" v="261" dt="2022-08-15T11:49:02.683"/>
   </p1510:revLst>
 </p1510:revInfo>
 </file>
@@ -178,13 +177,13 @@
   </pc:docChgLst>
   <pc:docChgLst>
     <pc:chgData name="Germano Maioli Penello" userId="09a8bdae-2f17-4416-9fca-4e906e9ab742" providerId="ADAL" clId="{91DE2ACF-89F6-443E-984A-3648791F656E}"/>
-    <pc:docChg chg="custSel modSld">
-      <pc:chgData name="Germano Maioli Penello" userId="09a8bdae-2f17-4416-9fca-4e906e9ab742" providerId="ADAL" clId="{91DE2ACF-89F6-443E-984A-3648791F656E}" dt="2022-08-08T16:55:09.144" v="227" actId="1076"/>
+    <pc:docChg chg="undo custSel modSld">
+      <pc:chgData name="Germano Maioli Penello" userId="09a8bdae-2f17-4416-9fca-4e906e9ab742" providerId="ADAL" clId="{91DE2ACF-89F6-443E-984A-3648791F656E}" dt="2022-08-15T11:49:02.683" v="559"/>
       <pc:docMkLst>
         <pc:docMk/>
       </pc:docMkLst>
       <pc:sldChg chg="addSp modSp mod">
-        <pc:chgData name="Germano Maioli Penello" userId="09a8bdae-2f17-4416-9fca-4e906e9ab742" providerId="ADAL" clId="{91DE2ACF-89F6-443E-984A-3648791F656E}" dt="2022-08-08T16:55:09.144" v="227" actId="1076"/>
+        <pc:chgData name="Germano Maioli Penello" userId="09a8bdae-2f17-4416-9fca-4e906e9ab742" providerId="ADAL" clId="{91DE2ACF-89F6-443E-984A-3648791F656E}" dt="2022-08-15T11:49:02.583" v="254"/>
         <pc:sldMkLst>
           <pc:docMk/>
           <pc:sldMk cId="4255839206" sldId="256"/>
@@ -197,12 +196,655 @@
             <ac:spMk id="3" creationId="{937A44B6-DD30-CD59-53FA-1218EE68BE78}"/>
           </ac:spMkLst>
         </pc:spChg>
+        <pc:spChg chg="add mod">
+          <ac:chgData name="Germano Maioli Penello" userId="09a8bdae-2f17-4416-9fca-4e906e9ab742" providerId="ADAL" clId="{91DE2ACF-89F6-443E-984A-3648791F656E}" dt="2022-08-15T11:49:02.583" v="253"/>
+          <ac:spMkLst>
+            <pc:docMk/>
+            <pc:sldMk cId="4255839206" sldId="256"/>
+            <ac:spMk id="4" creationId="{DDE0E463-252A-24E2-027D-8467EFE1F2F8}"/>
+          </ac:spMkLst>
+        </pc:spChg>
+        <pc:spChg chg="add mod">
+          <ac:chgData name="Germano Maioli Penello" userId="09a8bdae-2f17-4416-9fca-4e906e9ab742" providerId="ADAL" clId="{91DE2ACF-89F6-443E-984A-3648791F656E}" dt="2022-08-15T11:49:02.583" v="253"/>
+          <ac:spMkLst>
+            <pc:docMk/>
+            <pc:sldMk cId="4255839206" sldId="256"/>
+            <ac:spMk id="6" creationId="{04BADA72-F188-CBB6-6B84-15F1D71E2512}"/>
+          </ac:spMkLst>
+        </pc:spChg>
+        <pc:spChg chg="add mod">
+          <ac:chgData name="Germano Maioli Penello" userId="09a8bdae-2f17-4416-9fca-4e906e9ab742" providerId="ADAL" clId="{91DE2ACF-89F6-443E-984A-3648791F656E}" dt="2022-08-15T11:49:02.583" v="253"/>
+          <ac:spMkLst>
+            <pc:docMk/>
+            <pc:sldMk cId="4255839206" sldId="256"/>
+            <ac:spMk id="7" creationId="{E48FFA49-8263-6CD2-47D4-770D358A1BC5}"/>
+          </ac:spMkLst>
+        </pc:spChg>
+        <pc:spChg chg="add mod">
+          <ac:chgData name="Germano Maioli Penello" userId="09a8bdae-2f17-4416-9fca-4e906e9ab742" providerId="ADAL" clId="{91DE2ACF-89F6-443E-984A-3648791F656E}" dt="2022-08-15T11:49:02.583" v="253"/>
+          <ac:spMkLst>
+            <pc:docMk/>
+            <pc:sldMk cId="4255839206" sldId="256"/>
+            <ac:spMk id="8" creationId="{75EC6AE5-692B-94D8-6AB9-EEE09F82155C}"/>
+          </ac:spMkLst>
+        </pc:spChg>
+        <pc:grpChg chg="add mod">
+          <ac:chgData name="Germano Maioli Penello" userId="09a8bdae-2f17-4416-9fca-4e906e9ab742" providerId="ADAL" clId="{91DE2ACF-89F6-443E-984A-3648791F656E}" dt="2022-08-15T11:49:02.583" v="254"/>
+          <ac:grpSpMkLst>
+            <pc:docMk/>
+            <pc:sldMk cId="4255839206" sldId="256"/>
+            <ac:grpSpMk id="9" creationId="{1440F11A-6241-C1D2-92D4-6A30BA1D57BB}"/>
+          </ac:grpSpMkLst>
+        </pc:grpChg>
         <pc:picChg chg="add mod">
           <ac:chgData name="Germano Maioli Penello" userId="09a8bdae-2f17-4416-9fca-4e906e9ab742" providerId="ADAL" clId="{91DE2ACF-89F6-443E-984A-3648791F656E}" dt="2022-08-08T16:55:09.144" v="227" actId="1076"/>
           <ac:picMkLst>
             <pc:docMk/>
             <pc:sldMk cId="4255839206" sldId="256"/>
             <ac:picMk id="5" creationId="{F66F769C-7C85-4CD3-A51C-E7E937045CB3}"/>
+          </ac:picMkLst>
+        </pc:picChg>
+      </pc:sldChg>
+      <pc:sldChg chg="addSp modSp mod">
+        <pc:chgData name="Germano Maioli Penello" userId="09a8bdae-2f17-4416-9fca-4e906e9ab742" providerId="ADAL" clId="{91DE2ACF-89F6-443E-984A-3648791F656E}" dt="2022-08-15T11:49:02.590" v="278"/>
+        <pc:sldMkLst>
+          <pc:docMk/>
+          <pc:sldMk cId="3325032548" sldId="257"/>
+        </pc:sldMkLst>
+        <pc:spChg chg="add mod">
+          <ac:chgData name="Germano Maioli Penello" userId="09a8bdae-2f17-4416-9fca-4e906e9ab742" providerId="ADAL" clId="{91DE2ACF-89F6-443E-984A-3648791F656E}" dt="2022-08-15T11:49:02.590" v="277"/>
+          <ac:spMkLst>
+            <pc:docMk/>
+            <pc:sldMk cId="3325032548" sldId="257"/>
+            <ac:spMk id="6" creationId="{32B9D163-67EA-02B0-AF0A-9B5370514D54}"/>
+          </ac:spMkLst>
+        </pc:spChg>
+        <pc:spChg chg="add mod">
+          <ac:chgData name="Germano Maioli Penello" userId="09a8bdae-2f17-4416-9fca-4e906e9ab742" providerId="ADAL" clId="{91DE2ACF-89F6-443E-984A-3648791F656E}" dt="2022-08-15T11:49:02.590" v="277"/>
+          <ac:spMkLst>
+            <pc:docMk/>
+            <pc:sldMk cId="3325032548" sldId="257"/>
+            <ac:spMk id="7" creationId="{D5E3DDF9-A4AD-F3C8-C519-2D4ECC7C9200}"/>
+          </ac:spMkLst>
+        </pc:spChg>
+        <pc:spChg chg="add mod">
+          <ac:chgData name="Germano Maioli Penello" userId="09a8bdae-2f17-4416-9fca-4e906e9ab742" providerId="ADAL" clId="{91DE2ACF-89F6-443E-984A-3648791F656E}" dt="2022-08-15T11:49:02.590" v="277"/>
+          <ac:spMkLst>
+            <pc:docMk/>
+            <pc:sldMk cId="3325032548" sldId="257"/>
+            <ac:spMk id="8" creationId="{71427F50-B6A7-1FE0-3715-A10030716E58}"/>
+          </ac:spMkLst>
+        </pc:spChg>
+        <pc:spChg chg="add mod">
+          <ac:chgData name="Germano Maioli Penello" userId="09a8bdae-2f17-4416-9fca-4e906e9ab742" providerId="ADAL" clId="{91DE2ACF-89F6-443E-984A-3648791F656E}" dt="2022-08-15T11:49:02.590" v="277"/>
+          <ac:spMkLst>
+            <pc:docMk/>
+            <pc:sldMk cId="3325032548" sldId="257"/>
+            <ac:spMk id="9" creationId="{0230E4C3-0EE1-EAF9-2D40-CCD6F935FD27}"/>
+          </ac:spMkLst>
+        </pc:spChg>
+        <pc:grpChg chg="add mod">
+          <ac:chgData name="Germano Maioli Penello" userId="09a8bdae-2f17-4416-9fca-4e906e9ab742" providerId="ADAL" clId="{91DE2ACF-89F6-443E-984A-3648791F656E}" dt="2022-08-15T11:49:02.590" v="278"/>
+          <ac:grpSpMkLst>
+            <pc:docMk/>
+            <pc:sldMk cId="3325032548" sldId="257"/>
+            <ac:grpSpMk id="10" creationId="{AEC1ED39-B40F-5ABF-9E9C-45960A74ACCF}"/>
+          </ac:grpSpMkLst>
+        </pc:grpChg>
+      </pc:sldChg>
+      <pc:sldChg chg="addSp modSp mod">
+        <pc:chgData name="Germano Maioli Penello" userId="09a8bdae-2f17-4416-9fca-4e906e9ab742" providerId="ADAL" clId="{91DE2ACF-89F6-443E-984A-3648791F656E}" dt="2022-08-15T11:49:02.597" v="302"/>
+        <pc:sldMkLst>
+          <pc:docMk/>
+          <pc:sldMk cId="3103528332" sldId="258"/>
+        </pc:sldMkLst>
+        <pc:spChg chg="add mod">
+          <ac:chgData name="Germano Maioli Penello" userId="09a8bdae-2f17-4416-9fca-4e906e9ab742" providerId="ADAL" clId="{91DE2ACF-89F6-443E-984A-3648791F656E}" dt="2022-08-15T11:49:02.597" v="301"/>
+          <ac:spMkLst>
+            <pc:docMk/>
+            <pc:sldMk cId="3103528332" sldId="258"/>
+            <ac:spMk id="4" creationId="{A5305143-3F01-67FA-0F1E-1305F27A9EE4}"/>
+          </ac:spMkLst>
+        </pc:spChg>
+        <pc:spChg chg="add mod">
+          <ac:chgData name="Germano Maioli Penello" userId="09a8bdae-2f17-4416-9fca-4e906e9ab742" providerId="ADAL" clId="{91DE2ACF-89F6-443E-984A-3648791F656E}" dt="2022-08-15T11:49:02.597" v="301"/>
+          <ac:spMkLst>
+            <pc:docMk/>
+            <pc:sldMk cId="3103528332" sldId="258"/>
+            <ac:spMk id="6" creationId="{D6290D90-6FE5-F90B-2EE5-35E89494D76F}"/>
+          </ac:spMkLst>
+        </pc:spChg>
+        <pc:spChg chg="add mod">
+          <ac:chgData name="Germano Maioli Penello" userId="09a8bdae-2f17-4416-9fca-4e906e9ab742" providerId="ADAL" clId="{91DE2ACF-89F6-443E-984A-3648791F656E}" dt="2022-08-15T11:49:02.597" v="301"/>
+          <ac:spMkLst>
+            <pc:docMk/>
+            <pc:sldMk cId="3103528332" sldId="258"/>
+            <ac:spMk id="7" creationId="{2B33E086-8BDB-3D35-5418-01B485D59B84}"/>
+          </ac:spMkLst>
+        </pc:spChg>
+        <pc:spChg chg="add mod">
+          <ac:chgData name="Germano Maioli Penello" userId="09a8bdae-2f17-4416-9fca-4e906e9ab742" providerId="ADAL" clId="{91DE2ACF-89F6-443E-984A-3648791F656E}" dt="2022-08-15T11:49:02.597" v="301"/>
+          <ac:spMkLst>
+            <pc:docMk/>
+            <pc:sldMk cId="3103528332" sldId="258"/>
+            <ac:spMk id="8" creationId="{B4238F2A-3C0A-2864-59A1-01B990B1BF53}"/>
+          </ac:spMkLst>
+        </pc:spChg>
+        <pc:grpChg chg="add mod">
+          <ac:chgData name="Germano Maioli Penello" userId="09a8bdae-2f17-4416-9fca-4e906e9ab742" providerId="ADAL" clId="{91DE2ACF-89F6-443E-984A-3648791F656E}" dt="2022-08-15T11:49:02.597" v="302"/>
+          <ac:grpSpMkLst>
+            <pc:docMk/>
+            <pc:sldMk cId="3103528332" sldId="258"/>
+            <ac:grpSpMk id="9" creationId="{4242D424-6904-325C-9D47-152BCFB03423}"/>
+          </ac:grpSpMkLst>
+        </pc:grpChg>
+      </pc:sldChg>
+      <pc:sldChg chg="addSp modSp mod">
+        <pc:chgData name="Germano Maioli Penello" userId="09a8bdae-2f17-4416-9fca-4e906e9ab742" providerId="ADAL" clId="{91DE2ACF-89F6-443E-984A-3648791F656E}" dt="2022-08-15T11:49:02.604" v="326"/>
+        <pc:sldMkLst>
+          <pc:docMk/>
+          <pc:sldMk cId="2593896598" sldId="259"/>
+        </pc:sldMkLst>
+        <pc:spChg chg="add mod">
+          <ac:chgData name="Germano Maioli Penello" userId="09a8bdae-2f17-4416-9fca-4e906e9ab742" providerId="ADAL" clId="{91DE2ACF-89F6-443E-984A-3648791F656E}" dt="2022-08-15T11:49:02.604" v="325"/>
+          <ac:spMkLst>
+            <pc:docMk/>
+            <pc:sldMk cId="2593896598" sldId="259"/>
+            <ac:spMk id="4" creationId="{180A41E3-6A61-F7D6-E78D-16677D100C02}"/>
+          </ac:spMkLst>
+        </pc:spChg>
+        <pc:spChg chg="add mod">
+          <ac:chgData name="Germano Maioli Penello" userId="09a8bdae-2f17-4416-9fca-4e906e9ab742" providerId="ADAL" clId="{91DE2ACF-89F6-443E-984A-3648791F656E}" dt="2022-08-15T11:49:02.604" v="325"/>
+          <ac:spMkLst>
+            <pc:docMk/>
+            <pc:sldMk cId="2593896598" sldId="259"/>
+            <ac:spMk id="6" creationId="{57352977-3141-501D-877F-6787CB69BF21}"/>
+          </ac:spMkLst>
+        </pc:spChg>
+        <pc:spChg chg="add mod">
+          <ac:chgData name="Germano Maioli Penello" userId="09a8bdae-2f17-4416-9fca-4e906e9ab742" providerId="ADAL" clId="{91DE2ACF-89F6-443E-984A-3648791F656E}" dt="2022-08-15T11:49:02.604" v="325"/>
+          <ac:spMkLst>
+            <pc:docMk/>
+            <pc:sldMk cId="2593896598" sldId="259"/>
+            <ac:spMk id="7" creationId="{2D3C9B8A-2C75-C8F1-6B22-6EBDBBF266DE}"/>
+          </ac:spMkLst>
+        </pc:spChg>
+        <pc:spChg chg="add mod">
+          <ac:chgData name="Germano Maioli Penello" userId="09a8bdae-2f17-4416-9fca-4e906e9ab742" providerId="ADAL" clId="{91DE2ACF-89F6-443E-984A-3648791F656E}" dt="2022-08-15T11:49:02.604" v="325"/>
+          <ac:spMkLst>
+            <pc:docMk/>
+            <pc:sldMk cId="2593896598" sldId="259"/>
+            <ac:spMk id="8" creationId="{386D4284-C651-018E-E980-EEE4F5F5DE30}"/>
+          </ac:spMkLst>
+        </pc:spChg>
+        <pc:grpChg chg="add mod">
+          <ac:chgData name="Germano Maioli Penello" userId="09a8bdae-2f17-4416-9fca-4e906e9ab742" providerId="ADAL" clId="{91DE2ACF-89F6-443E-984A-3648791F656E}" dt="2022-08-15T11:49:02.604" v="326"/>
+          <ac:grpSpMkLst>
+            <pc:docMk/>
+            <pc:sldMk cId="2593896598" sldId="259"/>
+            <ac:grpSpMk id="9" creationId="{BA780462-4181-EE5B-E555-2DF047C9D72E}"/>
+          </ac:grpSpMkLst>
+        </pc:grpChg>
+      </pc:sldChg>
+      <pc:sldChg chg="addSp modSp mod">
+        <pc:chgData name="Germano Maioli Penello" userId="09a8bdae-2f17-4416-9fca-4e906e9ab742" providerId="ADAL" clId="{91DE2ACF-89F6-443E-984A-3648791F656E}" dt="2022-08-15T11:49:02.612" v="350"/>
+        <pc:sldMkLst>
+          <pc:docMk/>
+          <pc:sldMk cId="3624510394" sldId="260"/>
+        </pc:sldMkLst>
+        <pc:spChg chg="add mod">
+          <ac:chgData name="Germano Maioli Penello" userId="09a8bdae-2f17-4416-9fca-4e906e9ab742" providerId="ADAL" clId="{91DE2ACF-89F6-443E-984A-3648791F656E}" dt="2022-08-15T11:49:02.612" v="349"/>
+          <ac:spMkLst>
+            <pc:docMk/>
+            <pc:sldMk cId="3624510394" sldId="260"/>
+            <ac:spMk id="2" creationId="{6B582CCD-A69F-865F-509C-506CAC1F3DE3}"/>
+          </ac:spMkLst>
+        </pc:spChg>
+        <pc:spChg chg="add mod">
+          <ac:chgData name="Germano Maioli Penello" userId="09a8bdae-2f17-4416-9fca-4e906e9ab742" providerId="ADAL" clId="{91DE2ACF-89F6-443E-984A-3648791F656E}" dt="2022-08-15T11:49:02.612" v="349"/>
+          <ac:spMkLst>
+            <pc:docMk/>
+            <pc:sldMk cId="3624510394" sldId="260"/>
+            <ac:spMk id="3" creationId="{DA414877-5642-CA32-0AAE-9572AC8EC64E}"/>
+          </ac:spMkLst>
+        </pc:spChg>
+        <pc:spChg chg="add mod">
+          <ac:chgData name="Germano Maioli Penello" userId="09a8bdae-2f17-4416-9fca-4e906e9ab742" providerId="ADAL" clId="{91DE2ACF-89F6-443E-984A-3648791F656E}" dt="2022-08-15T11:49:02.612" v="349"/>
+          <ac:spMkLst>
+            <pc:docMk/>
+            <pc:sldMk cId="3624510394" sldId="260"/>
+            <ac:spMk id="4" creationId="{D1CA15F2-2FCF-3DFE-F406-73E78C677E1D}"/>
+          </ac:spMkLst>
+        </pc:spChg>
+        <pc:spChg chg="add mod">
+          <ac:chgData name="Germano Maioli Penello" userId="09a8bdae-2f17-4416-9fca-4e906e9ab742" providerId="ADAL" clId="{91DE2ACF-89F6-443E-984A-3648791F656E}" dt="2022-08-15T11:49:02.612" v="349"/>
+          <ac:spMkLst>
+            <pc:docMk/>
+            <pc:sldMk cId="3624510394" sldId="260"/>
+            <ac:spMk id="7" creationId="{FA8610C0-1EC7-174D-E97F-7CD042BA4B5F}"/>
+          </ac:spMkLst>
+        </pc:spChg>
+        <pc:grpChg chg="add mod">
+          <ac:chgData name="Germano Maioli Penello" userId="09a8bdae-2f17-4416-9fca-4e906e9ab742" providerId="ADAL" clId="{91DE2ACF-89F6-443E-984A-3648791F656E}" dt="2022-08-15T11:49:02.612" v="350"/>
+          <ac:grpSpMkLst>
+            <pc:docMk/>
+            <pc:sldMk cId="3624510394" sldId="260"/>
+            <ac:grpSpMk id="10" creationId="{AA0F02F1-54D3-9BDE-84EF-52601580D7AB}"/>
+          </ac:grpSpMkLst>
+        </pc:grpChg>
+      </pc:sldChg>
+      <pc:sldChg chg="addSp modSp mod">
+        <pc:chgData name="Germano Maioli Penello" userId="09a8bdae-2f17-4416-9fca-4e906e9ab742" providerId="ADAL" clId="{91DE2ACF-89F6-443E-984A-3648791F656E}" dt="2022-08-15T11:49:02.620" v="374"/>
+        <pc:sldMkLst>
+          <pc:docMk/>
+          <pc:sldMk cId="2571965786" sldId="261"/>
+        </pc:sldMkLst>
+        <pc:spChg chg="add mod">
+          <ac:chgData name="Germano Maioli Penello" userId="09a8bdae-2f17-4416-9fca-4e906e9ab742" providerId="ADAL" clId="{91DE2ACF-89F6-443E-984A-3648791F656E}" dt="2022-08-15T11:49:02.620" v="373"/>
+          <ac:spMkLst>
+            <pc:docMk/>
+            <pc:sldMk cId="2571965786" sldId="261"/>
+            <ac:spMk id="4" creationId="{BD7A572B-7ACD-F73B-E964-5992426D4557}"/>
+          </ac:spMkLst>
+        </pc:spChg>
+        <pc:spChg chg="add mod">
+          <ac:chgData name="Germano Maioli Penello" userId="09a8bdae-2f17-4416-9fca-4e906e9ab742" providerId="ADAL" clId="{91DE2ACF-89F6-443E-984A-3648791F656E}" dt="2022-08-15T11:49:02.620" v="373"/>
+          <ac:spMkLst>
+            <pc:docMk/>
+            <pc:sldMk cId="2571965786" sldId="261"/>
+            <ac:spMk id="6" creationId="{4CD31F94-D4EF-4E77-2026-17120EA499CC}"/>
+          </ac:spMkLst>
+        </pc:spChg>
+        <pc:spChg chg="add mod">
+          <ac:chgData name="Germano Maioli Penello" userId="09a8bdae-2f17-4416-9fca-4e906e9ab742" providerId="ADAL" clId="{91DE2ACF-89F6-443E-984A-3648791F656E}" dt="2022-08-15T11:49:02.620" v="373"/>
+          <ac:spMkLst>
+            <pc:docMk/>
+            <pc:sldMk cId="2571965786" sldId="261"/>
+            <ac:spMk id="7" creationId="{A7BA6EA4-408A-EF08-85DB-006BFBC81DE8}"/>
+          </ac:spMkLst>
+        </pc:spChg>
+        <pc:spChg chg="add mod">
+          <ac:chgData name="Germano Maioli Penello" userId="09a8bdae-2f17-4416-9fca-4e906e9ab742" providerId="ADAL" clId="{91DE2ACF-89F6-443E-984A-3648791F656E}" dt="2022-08-15T11:49:02.620" v="373"/>
+          <ac:spMkLst>
+            <pc:docMk/>
+            <pc:sldMk cId="2571965786" sldId="261"/>
+            <ac:spMk id="8" creationId="{EE665DA6-E988-68DB-BA45-B4B7090B6F33}"/>
+          </ac:spMkLst>
+        </pc:spChg>
+        <pc:grpChg chg="add mod">
+          <ac:chgData name="Germano Maioli Penello" userId="09a8bdae-2f17-4416-9fca-4e906e9ab742" providerId="ADAL" clId="{91DE2ACF-89F6-443E-984A-3648791F656E}" dt="2022-08-15T11:49:02.620" v="374"/>
+          <ac:grpSpMkLst>
+            <pc:docMk/>
+            <pc:sldMk cId="2571965786" sldId="261"/>
+            <ac:grpSpMk id="9" creationId="{E8C2E487-D3E5-ED1A-D6F6-32486D86848D}"/>
+          </ac:grpSpMkLst>
+        </pc:grpChg>
+      </pc:sldChg>
+      <pc:sldChg chg="addSp modSp mod">
+        <pc:chgData name="Germano Maioli Penello" userId="09a8bdae-2f17-4416-9fca-4e906e9ab742" providerId="ADAL" clId="{91DE2ACF-89F6-443E-984A-3648791F656E}" dt="2022-08-15T11:49:02.635" v="422"/>
+        <pc:sldMkLst>
+          <pc:docMk/>
+          <pc:sldMk cId="977540387" sldId="262"/>
+        </pc:sldMkLst>
+        <pc:spChg chg="add mod">
+          <ac:chgData name="Germano Maioli Penello" userId="09a8bdae-2f17-4416-9fca-4e906e9ab742" providerId="ADAL" clId="{91DE2ACF-89F6-443E-984A-3648791F656E}" dt="2022-08-15T11:49:02.635" v="421"/>
+          <ac:spMkLst>
+            <pc:docMk/>
+            <pc:sldMk cId="977540387" sldId="262"/>
+            <ac:spMk id="4" creationId="{A90254B8-71FC-8E63-B085-7432333EDBEC}"/>
+          </ac:spMkLst>
+        </pc:spChg>
+        <pc:spChg chg="add mod">
+          <ac:chgData name="Germano Maioli Penello" userId="09a8bdae-2f17-4416-9fca-4e906e9ab742" providerId="ADAL" clId="{91DE2ACF-89F6-443E-984A-3648791F656E}" dt="2022-08-15T11:49:02.635" v="421"/>
+          <ac:spMkLst>
+            <pc:docMk/>
+            <pc:sldMk cId="977540387" sldId="262"/>
+            <ac:spMk id="6" creationId="{DE04EE7E-AA21-82FA-AA03-E96FA29C1044}"/>
+          </ac:spMkLst>
+        </pc:spChg>
+        <pc:spChg chg="add mod">
+          <ac:chgData name="Germano Maioli Penello" userId="09a8bdae-2f17-4416-9fca-4e906e9ab742" providerId="ADAL" clId="{91DE2ACF-89F6-443E-984A-3648791F656E}" dt="2022-08-15T11:49:02.635" v="421"/>
+          <ac:spMkLst>
+            <pc:docMk/>
+            <pc:sldMk cId="977540387" sldId="262"/>
+            <ac:spMk id="10" creationId="{1390631A-4414-BCFB-F047-2D9F1E69AB51}"/>
+          </ac:spMkLst>
+        </pc:spChg>
+        <pc:spChg chg="add mod">
+          <ac:chgData name="Germano Maioli Penello" userId="09a8bdae-2f17-4416-9fca-4e906e9ab742" providerId="ADAL" clId="{91DE2ACF-89F6-443E-984A-3648791F656E}" dt="2022-08-15T11:49:02.635" v="421"/>
+          <ac:spMkLst>
+            <pc:docMk/>
+            <pc:sldMk cId="977540387" sldId="262"/>
+            <ac:spMk id="11" creationId="{BCBC5BF4-09F7-EA0D-5E8C-307F01E795A8}"/>
+          </ac:spMkLst>
+        </pc:spChg>
+        <pc:grpChg chg="add mod">
+          <ac:chgData name="Germano Maioli Penello" userId="09a8bdae-2f17-4416-9fca-4e906e9ab742" providerId="ADAL" clId="{91DE2ACF-89F6-443E-984A-3648791F656E}" dt="2022-08-15T11:49:02.635" v="422"/>
+          <ac:grpSpMkLst>
+            <pc:docMk/>
+            <pc:sldMk cId="977540387" sldId="262"/>
+            <ac:grpSpMk id="12" creationId="{BC24998A-5FA4-C8D7-41B9-D422D80A638A}"/>
+          </ac:grpSpMkLst>
+        </pc:grpChg>
+      </pc:sldChg>
+      <pc:sldChg chg="addSp modSp mod">
+        <pc:chgData name="Germano Maioli Penello" userId="09a8bdae-2f17-4416-9fca-4e906e9ab742" providerId="ADAL" clId="{91DE2ACF-89F6-443E-984A-3648791F656E}" dt="2022-08-15T11:49:02.644" v="446"/>
+        <pc:sldMkLst>
+          <pc:docMk/>
+          <pc:sldMk cId="1034896533" sldId="263"/>
+        </pc:sldMkLst>
+        <pc:spChg chg="add mod">
+          <ac:chgData name="Germano Maioli Penello" userId="09a8bdae-2f17-4416-9fca-4e906e9ab742" providerId="ADAL" clId="{91DE2ACF-89F6-443E-984A-3648791F656E}" dt="2022-08-15T11:49:02.644" v="445"/>
+          <ac:spMkLst>
+            <pc:docMk/>
+            <pc:sldMk cId="1034896533" sldId="263"/>
+            <ac:spMk id="4" creationId="{6423B523-FE53-C302-77A4-147F0DBB2862}"/>
+          </ac:spMkLst>
+        </pc:spChg>
+        <pc:spChg chg="add mod">
+          <ac:chgData name="Germano Maioli Penello" userId="09a8bdae-2f17-4416-9fca-4e906e9ab742" providerId="ADAL" clId="{91DE2ACF-89F6-443E-984A-3648791F656E}" dt="2022-08-15T11:49:02.644" v="445"/>
+          <ac:spMkLst>
+            <pc:docMk/>
+            <pc:sldMk cId="1034896533" sldId="263"/>
+            <ac:spMk id="5" creationId="{A0662FC3-82E2-8895-D182-DEC12079FB70}"/>
+          </ac:spMkLst>
+        </pc:spChg>
+        <pc:spChg chg="add mod">
+          <ac:chgData name="Germano Maioli Penello" userId="09a8bdae-2f17-4416-9fca-4e906e9ab742" providerId="ADAL" clId="{91DE2ACF-89F6-443E-984A-3648791F656E}" dt="2022-08-15T11:49:02.644" v="445"/>
+          <ac:spMkLst>
+            <pc:docMk/>
+            <pc:sldMk cId="1034896533" sldId="263"/>
+            <ac:spMk id="7" creationId="{38744BE0-026C-F939-F720-E4EEE54608EC}"/>
+          </ac:spMkLst>
+        </pc:spChg>
+        <pc:spChg chg="add mod">
+          <ac:chgData name="Germano Maioli Penello" userId="09a8bdae-2f17-4416-9fca-4e906e9ab742" providerId="ADAL" clId="{91DE2ACF-89F6-443E-984A-3648791F656E}" dt="2022-08-15T11:49:02.644" v="445"/>
+          <ac:spMkLst>
+            <pc:docMk/>
+            <pc:sldMk cId="1034896533" sldId="263"/>
+            <ac:spMk id="8" creationId="{D77EFCA4-DC01-84F8-5FAB-B0F05A36CAC7}"/>
+          </ac:spMkLst>
+        </pc:spChg>
+        <pc:grpChg chg="add mod">
+          <ac:chgData name="Germano Maioli Penello" userId="09a8bdae-2f17-4416-9fca-4e906e9ab742" providerId="ADAL" clId="{91DE2ACF-89F6-443E-984A-3648791F656E}" dt="2022-08-15T11:49:02.644" v="446"/>
+          <ac:grpSpMkLst>
+            <pc:docMk/>
+            <pc:sldMk cId="1034896533" sldId="263"/>
+            <ac:grpSpMk id="9" creationId="{419F3933-0A32-D9E2-4FEE-0338F3227468}"/>
+          </ac:grpSpMkLst>
+        </pc:grpChg>
+      </pc:sldChg>
+      <pc:sldChg chg="addSp modSp mod">
+        <pc:chgData name="Germano Maioli Penello" userId="09a8bdae-2f17-4416-9fca-4e906e9ab742" providerId="ADAL" clId="{91DE2ACF-89F6-443E-984A-3648791F656E}" dt="2022-08-15T11:49:02.652" v="470"/>
+        <pc:sldMkLst>
+          <pc:docMk/>
+          <pc:sldMk cId="2080906906" sldId="264"/>
+        </pc:sldMkLst>
+        <pc:spChg chg="add mod">
+          <ac:chgData name="Germano Maioli Penello" userId="09a8bdae-2f17-4416-9fca-4e906e9ab742" providerId="ADAL" clId="{91DE2ACF-89F6-443E-984A-3648791F656E}" dt="2022-08-15T11:49:02.651" v="469"/>
+          <ac:spMkLst>
+            <pc:docMk/>
+            <pc:sldMk cId="2080906906" sldId="264"/>
+            <ac:spMk id="4" creationId="{5879780D-F3AC-8C93-25D5-B499A017B750}"/>
+          </ac:spMkLst>
+        </pc:spChg>
+        <pc:spChg chg="add mod">
+          <ac:chgData name="Germano Maioli Penello" userId="09a8bdae-2f17-4416-9fca-4e906e9ab742" providerId="ADAL" clId="{91DE2ACF-89F6-443E-984A-3648791F656E}" dt="2022-08-15T11:49:02.651" v="469"/>
+          <ac:spMkLst>
+            <pc:docMk/>
+            <pc:sldMk cId="2080906906" sldId="264"/>
+            <ac:spMk id="5" creationId="{E24D9BA8-64FD-9162-5D7B-F6B04663A736}"/>
+          </ac:spMkLst>
+        </pc:spChg>
+        <pc:spChg chg="add mod">
+          <ac:chgData name="Germano Maioli Penello" userId="09a8bdae-2f17-4416-9fca-4e906e9ab742" providerId="ADAL" clId="{91DE2ACF-89F6-443E-984A-3648791F656E}" dt="2022-08-15T11:49:02.651" v="469"/>
+          <ac:spMkLst>
+            <pc:docMk/>
+            <pc:sldMk cId="2080906906" sldId="264"/>
+            <ac:spMk id="6" creationId="{140FBB57-C4D3-5D87-5BBA-CA3E5102FB3E}"/>
+          </ac:spMkLst>
+        </pc:spChg>
+        <pc:spChg chg="add mod">
+          <ac:chgData name="Germano Maioli Penello" userId="09a8bdae-2f17-4416-9fca-4e906e9ab742" providerId="ADAL" clId="{91DE2ACF-89F6-443E-984A-3648791F656E}" dt="2022-08-15T11:49:02.651" v="469"/>
+          <ac:spMkLst>
+            <pc:docMk/>
+            <pc:sldMk cId="2080906906" sldId="264"/>
+            <ac:spMk id="10" creationId="{12319675-4E08-F787-FEEC-CA605FDA3A26}"/>
+          </ac:spMkLst>
+        </pc:spChg>
+        <pc:grpChg chg="add mod">
+          <ac:chgData name="Germano Maioli Penello" userId="09a8bdae-2f17-4416-9fca-4e906e9ab742" providerId="ADAL" clId="{91DE2ACF-89F6-443E-984A-3648791F656E}" dt="2022-08-15T11:49:02.652" v="470"/>
+          <ac:grpSpMkLst>
+            <pc:docMk/>
+            <pc:sldMk cId="2080906906" sldId="264"/>
+            <ac:grpSpMk id="11" creationId="{D9B4290D-CE6F-EA56-4DA9-732A99CE2309}"/>
+          </ac:grpSpMkLst>
+        </pc:grpChg>
+      </pc:sldChg>
+      <pc:sldChg chg="addSp modSp mod">
+        <pc:chgData name="Germano Maioli Penello" userId="09a8bdae-2f17-4416-9fca-4e906e9ab742" providerId="ADAL" clId="{91DE2ACF-89F6-443E-984A-3648791F656E}" dt="2022-08-15T11:49:02.659" v="494"/>
+        <pc:sldMkLst>
+          <pc:docMk/>
+          <pc:sldMk cId="3043660648" sldId="265"/>
+        </pc:sldMkLst>
+        <pc:spChg chg="add mod">
+          <ac:chgData name="Germano Maioli Penello" userId="09a8bdae-2f17-4416-9fca-4e906e9ab742" providerId="ADAL" clId="{91DE2ACF-89F6-443E-984A-3648791F656E}" dt="2022-08-15T11:49:02.659" v="493"/>
+          <ac:spMkLst>
+            <pc:docMk/>
+            <pc:sldMk cId="3043660648" sldId="265"/>
+            <ac:spMk id="4" creationId="{B93029EA-36A2-7F46-2F19-1C476FA06667}"/>
+          </ac:spMkLst>
+        </pc:spChg>
+        <pc:spChg chg="add mod">
+          <ac:chgData name="Germano Maioli Penello" userId="09a8bdae-2f17-4416-9fca-4e906e9ab742" providerId="ADAL" clId="{91DE2ACF-89F6-443E-984A-3648791F656E}" dt="2022-08-15T11:49:02.659" v="493"/>
+          <ac:spMkLst>
+            <pc:docMk/>
+            <pc:sldMk cId="3043660648" sldId="265"/>
+            <ac:spMk id="6" creationId="{71D477A4-2065-87EC-FFA4-E2283E2726B0}"/>
+          </ac:spMkLst>
+        </pc:spChg>
+        <pc:spChg chg="add mod">
+          <ac:chgData name="Germano Maioli Penello" userId="09a8bdae-2f17-4416-9fca-4e906e9ab742" providerId="ADAL" clId="{91DE2ACF-89F6-443E-984A-3648791F656E}" dt="2022-08-15T11:49:02.659" v="493"/>
+          <ac:spMkLst>
+            <pc:docMk/>
+            <pc:sldMk cId="3043660648" sldId="265"/>
+            <ac:spMk id="7" creationId="{2A3F3B0B-FF66-9DF0-1FE1-60B117B0C147}"/>
+          </ac:spMkLst>
+        </pc:spChg>
+        <pc:spChg chg="add mod">
+          <ac:chgData name="Germano Maioli Penello" userId="09a8bdae-2f17-4416-9fca-4e906e9ab742" providerId="ADAL" clId="{91DE2ACF-89F6-443E-984A-3648791F656E}" dt="2022-08-15T11:49:02.659" v="493"/>
+          <ac:spMkLst>
+            <pc:docMk/>
+            <pc:sldMk cId="3043660648" sldId="265"/>
+            <ac:spMk id="10" creationId="{08457434-F7D0-3E8C-FF06-CCEFFAA286FB}"/>
+          </ac:spMkLst>
+        </pc:spChg>
+        <pc:grpChg chg="add mod">
+          <ac:chgData name="Germano Maioli Penello" userId="09a8bdae-2f17-4416-9fca-4e906e9ab742" providerId="ADAL" clId="{91DE2ACF-89F6-443E-984A-3648791F656E}" dt="2022-08-15T11:49:02.659" v="494"/>
+          <ac:grpSpMkLst>
+            <pc:docMk/>
+            <pc:sldMk cId="3043660648" sldId="265"/>
+            <ac:grpSpMk id="11" creationId="{9803148E-2B66-9ECB-CAC5-F29F251EE971}"/>
+          </ac:grpSpMkLst>
+        </pc:grpChg>
+      </pc:sldChg>
+      <pc:sldChg chg="addSp modSp mod">
+        <pc:chgData name="Germano Maioli Penello" userId="09a8bdae-2f17-4416-9fca-4e906e9ab742" providerId="ADAL" clId="{91DE2ACF-89F6-443E-984A-3648791F656E}" dt="2022-08-15T11:49:02.628" v="398"/>
+        <pc:sldMkLst>
+          <pc:docMk/>
+          <pc:sldMk cId="2933234723" sldId="266"/>
+        </pc:sldMkLst>
+        <pc:spChg chg="add mod">
+          <ac:chgData name="Germano Maioli Penello" userId="09a8bdae-2f17-4416-9fca-4e906e9ab742" providerId="ADAL" clId="{91DE2ACF-89F6-443E-984A-3648791F656E}" dt="2022-08-15T11:49:02.628" v="397"/>
+          <ac:spMkLst>
+            <pc:docMk/>
+            <pc:sldMk cId="2933234723" sldId="266"/>
+            <ac:spMk id="4" creationId="{951B087B-0BEB-6507-EB1D-FAF891E87F12}"/>
+          </ac:spMkLst>
+        </pc:spChg>
+        <pc:spChg chg="add mod">
+          <ac:chgData name="Germano Maioli Penello" userId="09a8bdae-2f17-4416-9fca-4e906e9ab742" providerId="ADAL" clId="{91DE2ACF-89F6-443E-984A-3648791F656E}" dt="2022-08-15T11:49:02.628" v="397"/>
+          <ac:spMkLst>
+            <pc:docMk/>
+            <pc:sldMk cId="2933234723" sldId="266"/>
+            <ac:spMk id="6" creationId="{F750FB2B-0003-5105-8BE7-40BFEB85E81E}"/>
+          </ac:spMkLst>
+        </pc:spChg>
+        <pc:spChg chg="add mod">
+          <ac:chgData name="Germano Maioli Penello" userId="09a8bdae-2f17-4416-9fca-4e906e9ab742" providerId="ADAL" clId="{91DE2ACF-89F6-443E-984A-3648791F656E}" dt="2022-08-15T11:49:02.628" v="397"/>
+          <ac:spMkLst>
+            <pc:docMk/>
+            <pc:sldMk cId="2933234723" sldId="266"/>
+            <ac:spMk id="7" creationId="{9D280B0C-DC7F-B73C-AE70-610375BFCFE6}"/>
+          </ac:spMkLst>
+        </pc:spChg>
+        <pc:spChg chg="add mod">
+          <ac:chgData name="Germano Maioli Penello" userId="09a8bdae-2f17-4416-9fca-4e906e9ab742" providerId="ADAL" clId="{91DE2ACF-89F6-443E-984A-3648791F656E}" dt="2022-08-15T11:49:02.628" v="397"/>
+          <ac:spMkLst>
+            <pc:docMk/>
+            <pc:sldMk cId="2933234723" sldId="266"/>
+            <ac:spMk id="8" creationId="{8D47008A-2560-BEC2-6DAA-0DAA67FC31F7}"/>
+          </ac:spMkLst>
+        </pc:spChg>
+        <pc:grpChg chg="add mod">
+          <ac:chgData name="Germano Maioli Penello" userId="09a8bdae-2f17-4416-9fca-4e906e9ab742" providerId="ADAL" clId="{91DE2ACF-89F6-443E-984A-3648791F656E}" dt="2022-08-15T11:49:02.628" v="398"/>
+          <ac:grpSpMkLst>
+            <pc:docMk/>
+            <pc:sldMk cId="2933234723" sldId="266"/>
+            <ac:grpSpMk id="9" creationId="{5D239EF1-FC93-BB48-E0F0-56084697E408}"/>
+          </ac:grpSpMkLst>
+        </pc:grpChg>
+      </pc:sldChg>
+      <pc:sldChg chg="addSp modSp mod">
+        <pc:chgData name="Germano Maioli Penello" userId="09a8bdae-2f17-4416-9fca-4e906e9ab742" providerId="ADAL" clId="{91DE2ACF-89F6-443E-984A-3648791F656E}" dt="2022-08-15T11:49:02.667" v="518"/>
+        <pc:sldMkLst>
+          <pc:docMk/>
+          <pc:sldMk cId="507068993" sldId="267"/>
+        </pc:sldMkLst>
+        <pc:spChg chg="add mod">
+          <ac:chgData name="Germano Maioli Penello" userId="09a8bdae-2f17-4416-9fca-4e906e9ab742" providerId="ADAL" clId="{91DE2ACF-89F6-443E-984A-3648791F656E}" dt="2022-08-15T11:49:02.666" v="517"/>
+          <ac:spMkLst>
+            <pc:docMk/>
+            <pc:sldMk cId="507068993" sldId="267"/>
+            <ac:spMk id="4" creationId="{F251F56C-2AE3-6014-7E6D-92DA7BA4EC99}"/>
+          </ac:spMkLst>
+        </pc:spChg>
+        <pc:spChg chg="add mod">
+          <ac:chgData name="Germano Maioli Penello" userId="09a8bdae-2f17-4416-9fca-4e906e9ab742" providerId="ADAL" clId="{91DE2ACF-89F6-443E-984A-3648791F656E}" dt="2022-08-15T11:49:02.666" v="517"/>
+          <ac:spMkLst>
+            <pc:docMk/>
+            <pc:sldMk cId="507068993" sldId="267"/>
+            <ac:spMk id="6" creationId="{02E6E0B1-09A9-9076-4E7E-DB9E7D5A39C3}"/>
+          </ac:spMkLst>
+        </pc:spChg>
+        <pc:spChg chg="add mod">
+          <ac:chgData name="Germano Maioli Penello" userId="09a8bdae-2f17-4416-9fca-4e906e9ab742" providerId="ADAL" clId="{91DE2ACF-89F6-443E-984A-3648791F656E}" dt="2022-08-15T11:49:02.666" v="517"/>
+          <ac:spMkLst>
+            <pc:docMk/>
+            <pc:sldMk cId="507068993" sldId="267"/>
+            <ac:spMk id="7" creationId="{7DACB46D-396B-F3F5-627D-546CDAF1F57B}"/>
+          </ac:spMkLst>
+        </pc:spChg>
+        <pc:spChg chg="add mod">
+          <ac:chgData name="Germano Maioli Penello" userId="09a8bdae-2f17-4416-9fca-4e906e9ab742" providerId="ADAL" clId="{91DE2ACF-89F6-443E-984A-3648791F656E}" dt="2022-08-15T11:49:02.666" v="517"/>
+          <ac:spMkLst>
+            <pc:docMk/>
+            <pc:sldMk cId="507068993" sldId="267"/>
+            <ac:spMk id="8" creationId="{391D889E-B421-F8D3-96B8-56CAE8289FF5}"/>
+          </ac:spMkLst>
+        </pc:spChg>
+        <pc:grpChg chg="add mod">
+          <ac:chgData name="Germano Maioli Penello" userId="09a8bdae-2f17-4416-9fca-4e906e9ab742" providerId="ADAL" clId="{91DE2ACF-89F6-443E-984A-3648791F656E}" dt="2022-08-15T11:49:02.667" v="518"/>
+          <ac:grpSpMkLst>
+            <pc:docMk/>
+            <pc:sldMk cId="507068993" sldId="267"/>
+            <ac:grpSpMk id="9" creationId="{4B73B58D-349F-0A37-2A9F-36F6DF1E1516}"/>
+          </ac:grpSpMkLst>
+        </pc:grpChg>
+      </pc:sldChg>
+      <pc:sldChg chg="addSp modSp mod">
+        <pc:chgData name="Germano Maioli Penello" userId="09a8bdae-2f17-4416-9fca-4e906e9ab742" providerId="ADAL" clId="{91DE2ACF-89F6-443E-984A-3648791F656E}" dt="2022-08-15T11:49:02.683" v="559"/>
+        <pc:sldMkLst>
+          <pc:docMk/>
+          <pc:sldMk cId="565863698" sldId="268"/>
+        </pc:sldMkLst>
+        <pc:spChg chg="add mod">
+          <ac:chgData name="Germano Maioli Penello" userId="09a8bdae-2f17-4416-9fca-4e906e9ab742" providerId="ADAL" clId="{91DE2ACF-89F6-443E-984A-3648791F656E}" dt="2022-08-15T11:49:02.674" v="541"/>
+          <ac:spMkLst>
+            <pc:docMk/>
+            <pc:sldMk cId="565863698" sldId="268"/>
+            <ac:spMk id="2" creationId="{97B9A098-4AA9-E7F3-B6CA-C3086A42860C}"/>
+          </ac:spMkLst>
+        </pc:spChg>
+        <pc:spChg chg="add mod">
+          <ac:chgData name="Germano Maioli Penello" userId="09a8bdae-2f17-4416-9fca-4e906e9ab742" providerId="ADAL" clId="{91DE2ACF-89F6-443E-984A-3648791F656E}" dt="2022-08-15T11:49:02.674" v="541"/>
+          <ac:spMkLst>
+            <pc:docMk/>
+            <pc:sldMk cId="565863698" sldId="268"/>
+            <ac:spMk id="3" creationId="{35EF9908-FA0D-F5EB-9500-1800329E93F8}"/>
+          </ac:spMkLst>
+        </pc:spChg>
+        <pc:spChg chg="add mod">
+          <ac:chgData name="Germano Maioli Penello" userId="09a8bdae-2f17-4416-9fca-4e906e9ab742" providerId="ADAL" clId="{91DE2ACF-89F6-443E-984A-3648791F656E}" dt="2022-08-15T11:49:02.674" v="541"/>
+          <ac:spMkLst>
+            <pc:docMk/>
+            <pc:sldMk cId="565863698" sldId="268"/>
+            <ac:spMk id="4" creationId="{DDBFF2B9-7A9A-B12A-0B2E-600550053894}"/>
+          </ac:spMkLst>
+        </pc:spChg>
+        <pc:spChg chg="add mod">
+          <ac:chgData name="Germano Maioli Penello" userId="09a8bdae-2f17-4416-9fca-4e906e9ab742" providerId="ADAL" clId="{91DE2ACF-89F6-443E-984A-3648791F656E}" dt="2022-08-15T11:49:02.674" v="541"/>
+          <ac:spMkLst>
+            <pc:docMk/>
+            <pc:sldMk cId="565863698" sldId="268"/>
+            <ac:spMk id="6" creationId="{22876657-AC67-AB0C-4593-8AD106BA4741}"/>
+          </ac:spMkLst>
+        </pc:spChg>
+        <pc:grpChg chg="add mod">
+          <ac:chgData name="Germano Maioli Penello" userId="09a8bdae-2f17-4416-9fca-4e906e9ab742" providerId="ADAL" clId="{91DE2ACF-89F6-443E-984A-3648791F656E}" dt="2022-08-15T11:49:02.683" v="559"/>
+          <ac:grpSpMkLst>
+            <pc:docMk/>
+            <pc:sldMk cId="565863698" sldId="268"/>
+            <ac:grpSpMk id="9" creationId="{9C3E20C9-483B-4681-7747-8BFF68E296C6}"/>
+          </ac:grpSpMkLst>
+        </pc:grpChg>
+      </pc:sldChg>
+      <pc:sldChg chg="addSp modSp mod">
+        <pc:chgData name="Germano Maioli Penello" userId="09a8bdae-2f17-4416-9fca-4e906e9ab742" providerId="ADAL" clId="{91DE2ACF-89F6-443E-984A-3648791F656E}" dt="2022-08-15T11:49:02.681" v="558"/>
+        <pc:sldMkLst>
+          <pc:docMk/>
+          <pc:sldMk cId="2285392349" sldId="269"/>
+        </pc:sldMkLst>
+        <pc:spChg chg="add mod">
+          <ac:chgData name="Germano Maioli Penello" userId="09a8bdae-2f17-4416-9fca-4e906e9ab742" providerId="ADAL" clId="{91DE2ACF-89F6-443E-984A-3648791F656E}" dt="2022-08-15T11:49:02.678" v="548"/>
+          <ac:spMkLst>
+            <pc:docMk/>
+            <pc:sldMk cId="2285392349" sldId="269"/>
+            <ac:spMk id="5" creationId="{1A3434EF-517F-F959-2A94-7B906C387CE8}"/>
+          </ac:spMkLst>
+        </pc:spChg>
+        <pc:spChg chg="add mod">
+          <ac:chgData name="Germano Maioli Penello" userId="09a8bdae-2f17-4416-9fca-4e906e9ab742" providerId="ADAL" clId="{91DE2ACF-89F6-443E-984A-3648791F656E}" dt="2022-08-15T11:49:02.679" v="554"/>
+          <ac:spMkLst>
+            <pc:docMk/>
+            <pc:sldMk cId="2285392349" sldId="269"/>
+            <ac:spMk id="6" creationId="{98E0A70C-856B-D10D-3650-F27B2F9BF9E2}"/>
+          </ac:spMkLst>
+        </pc:spChg>
+        <pc:spChg chg="add mod">
+          <ac:chgData name="Germano Maioli Penello" userId="09a8bdae-2f17-4416-9fca-4e906e9ab742" providerId="ADAL" clId="{91DE2ACF-89F6-443E-984A-3648791F656E}" dt="2022-08-15T11:49:02.681" v="558"/>
+          <ac:spMkLst>
+            <pc:docMk/>
+            <pc:sldMk cId="2285392349" sldId="269"/>
+            <ac:spMk id="7" creationId="{80DCEC69-F959-2827-AF8C-B5888C609E85}"/>
+          </ac:spMkLst>
+        </pc:spChg>
+        <pc:picChg chg="mod">
+          <ac:chgData name="Germano Maioli Penello" userId="09a8bdae-2f17-4416-9fca-4e906e9ab742" providerId="ADAL" clId="{91DE2ACF-89F6-443E-984A-3648791F656E}" dt="2022-08-15T11:49:01.022" v="230" actId="1076"/>
+          <ac:picMkLst>
+            <pc:docMk/>
+            <pc:sldMk cId="2285392349" sldId="269"/>
+            <ac:picMk id="4" creationId="{C528A8FF-0D6C-2B53-D9B8-EEDA4134670A}"/>
           </ac:picMkLst>
         </pc:picChg>
       </pc:sldChg>
@@ -358,7 +1000,7 @@
           <a:p>
             <a:fld id="{7A23E4E3-11D0-4FB1-9A3D-5867A4A2CC6D}" type="datetimeFigureOut">
               <a:rPr lang="pt-BR" smtClean="0"/>
-              <a:t>08/08/2022</a:t>
+              <a:t>15/08/2022</a:t>
             </a:fld>
             <a:endParaRPr lang="pt-BR"/>
           </a:p>
@@ -556,7 +1198,7 @@
           <a:p>
             <a:fld id="{7A23E4E3-11D0-4FB1-9A3D-5867A4A2CC6D}" type="datetimeFigureOut">
               <a:rPr lang="pt-BR" smtClean="0"/>
-              <a:t>08/08/2022</a:t>
+              <a:t>15/08/2022</a:t>
             </a:fld>
             <a:endParaRPr lang="pt-BR"/>
           </a:p>
@@ -764,7 +1406,7 @@
           <a:p>
             <a:fld id="{7A23E4E3-11D0-4FB1-9A3D-5867A4A2CC6D}" type="datetimeFigureOut">
               <a:rPr lang="pt-BR" smtClean="0"/>
-              <a:t>08/08/2022</a:t>
+              <a:t>15/08/2022</a:t>
             </a:fld>
             <a:endParaRPr lang="pt-BR"/>
           </a:p>
@@ -962,7 +1604,7 @@
           <a:p>
             <a:fld id="{7A23E4E3-11D0-4FB1-9A3D-5867A4A2CC6D}" type="datetimeFigureOut">
               <a:rPr lang="pt-BR" smtClean="0"/>
-              <a:t>08/08/2022</a:t>
+              <a:t>15/08/2022</a:t>
             </a:fld>
             <a:endParaRPr lang="pt-BR"/>
           </a:p>
@@ -1237,7 +1879,7 @@
           <a:p>
             <a:fld id="{7A23E4E3-11D0-4FB1-9A3D-5867A4A2CC6D}" type="datetimeFigureOut">
               <a:rPr lang="pt-BR" smtClean="0"/>
-              <a:t>08/08/2022</a:t>
+              <a:t>15/08/2022</a:t>
             </a:fld>
             <a:endParaRPr lang="pt-BR"/>
           </a:p>
@@ -1502,7 +2144,7 @@
           <a:p>
             <a:fld id="{7A23E4E3-11D0-4FB1-9A3D-5867A4A2CC6D}" type="datetimeFigureOut">
               <a:rPr lang="pt-BR" smtClean="0"/>
-              <a:t>08/08/2022</a:t>
+              <a:t>15/08/2022</a:t>
             </a:fld>
             <a:endParaRPr lang="pt-BR"/>
           </a:p>
@@ -1914,7 +2556,7 @@
           <a:p>
             <a:fld id="{7A23E4E3-11D0-4FB1-9A3D-5867A4A2CC6D}" type="datetimeFigureOut">
               <a:rPr lang="pt-BR" smtClean="0"/>
-              <a:t>08/08/2022</a:t>
+              <a:t>15/08/2022</a:t>
             </a:fld>
             <a:endParaRPr lang="pt-BR"/>
           </a:p>
@@ -2055,7 +2697,7 @@
           <a:p>
             <a:fld id="{7A23E4E3-11D0-4FB1-9A3D-5867A4A2CC6D}" type="datetimeFigureOut">
               <a:rPr lang="pt-BR" smtClean="0"/>
-              <a:t>08/08/2022</a:t>
+              <a:t>15/08/2022</a:t>
             </a:fld>
             <a:endParaRPr lang="pt-BR"/>
           </a:p>
@@ -2168,7 +2810,7 @@
           <a:p>
             <a:fld id="{7A23E4E3-11D0-4FB1-9A3D-5867A4A2CC6D}" type="datetimeFigureOut">
               <a:rPr lang="pt-BR" smtClean="0"/>
-              <a:t>08/08/2022</a:t>
+              <a:t>15/08/2022</a:t>
             </a:fld>
             <a:endParaRPr lang="pt-BR"/>
           </a:p>
@@ -2479,7 +3121,7 @@
           <a:p>
             <a:fld id="{7A23E4E3-11D0-4FB1-9A3D-5867A4A2CC6D}" type="datetimeFigureOut">
               <a:rPr lang="pt-BR" smtClean="0"/>
-              <a:t>08/08/2022</a:t>
+              <a:t>15/08/2022</a:t>
             </a:fld>
             <a:endParaRPr lang="pt-BR"/>
           </a:p>
@@ -2767,7 +3409,7 @@
           <a:p>
             <a:fld id="{7A23E4E3-11D0-4FB1-9A3D-5867A4A2CC6D}" type="datetimeFigureOut">
               <a:rPr lang="pt-BR" smtClean="0"/>
-              <a:t>08/08/2022</a:t>
+              <a:t>15/08/2022</a:t>
             </a:fld>
             <a:endParaRPr lang="pt-BR"/>
           </a:p>
@@ -3008,7 +3650,7 @@
           <a:p>
             <a:fld id="{7A23E4E3-11D0-4FB1-9A3D-5867A4A2CC6D}" type="datetimeFigureOut">
               <a:rPr lang="pt-BR" smtClean="0"/>
-              <a:t>08/08/2022</a:t>
+              <a:t>15/08/2022</a:t>
             </a:fld>
             <a:endParaRPr lang="pt-BR"/>
           </a:p>
@@ -3551,6 +4193,287 @@
           </a:prstGeom>
         </p:spPr>
       </p:pic>
+      <p:grpSp>
+        <p:nvGrpSpPr>
+          <p:cNvPr id="9" name="!!circuloProgresso">
+            <a:extLst>
+              <a:ext uri="{FF2B5EF4-FFF2-40B4-BE49-F238E27FC236}">
+                <a16:creationId xmlns:a16="http://schemas.microsoft.com/office/drawing/2014/main" id="{1440F11A-6241-C1D2-92D4-6A30BA1D57BB}"/>
+              </a:ext>
+            </a:extLst>
+          </p:cNvPr>
+          <p:cNvGrpSpPr/>
+          <p:nvPr/>
+        </p:nvGrpSpPr>
+        <p:grpSpPr>
+          <a:xfrm>
+            <a:off x="11798300" y="6464300"/>
+            <a:ext cx="342900" cy="342900"/>
+            <a:chOff x="11798300" y="6464300"/>
+            <a:chExt cx="342900" cy="342900"/>
+          </a:xfrm>
+        </p:grpSpPr>
+        <p:sp>
+          <p:nvSpPr>
+            <p:cNvPr id="4" name="Marker1">
+              <a:extLst>
+                <a:ext uri="{FF2B5EF4-FFF2-40B4-BE49-F238E27FC236}">
+                  <a16:creationId xmlns:a16="http://schemas.microsoft.com/office/drawing/2014/main" id="{DDE0E463-252A-24E2-027D-8467EFE1F2F8}"/>
+                </a:ext>
+              </a:extLst>
+            </p:cNvPr>
+            <p:cNvSpPr/>
+            <p:nvPr/>
+          </p:nvSpPr>
+          <p:spPr>
+            <a:xfrm>
+              <a:off x="11798300" y="6464300"/>
+              <a:ext cx="342900" cy="342900"/>
+            </a:xfrm>
+            <a:prstGeom prst="pie">
+              <a:avLst>
+                <a:gd name="adj1" fmla="val 16200000"/>
+                <a:gd name="adj2" fmla="val 16200000"/>
+              </a:avLst>
+            </a:prstGeom>
+            <a:solidFill>
+              <a:srgbClr val="000000"/>
+            </a:solidFill>
+            <a:ln w="12700" cap="flat" cmpd="sng" algn="ctr">
+              <a:noFill/>
+              <a:prstDash val="solid"/>
+              <a:miter lim="800000"/>
+            </a:ln>
+            <a:effectLst/>
+            <a:extLst>
+              <a:ext uri="{91240B29-F687-4F45-9708-019B960494DF}">
+                <a14:hiddenLine xmlns:a14="http://schemas.microsoft.com/office/drawing/2010/main" w="12700" cap="flat" cmpd="sng" algn="ctr">
+                  <a:solidFill>
+                    <a:schemeClr val="accent1">
+                      <a:shade val="50000"/>
+                    </a:schemeClr>
+                  </a:solidFill>
+                  <a:prstDash val="solid"/>
+                  <a:miter lim="800000"/>
+                </a14:hiddenLine>
+              </a:ext>
+            </a:extLst>
+          </p:spPr>
+          <p:style>
+            <a:lnRef idx="2">
+              <a:schemeClr val="accent1">
+                <a:shade val="50000"/>
+              </a:schemeClr>
+            </a:lnRef>
+            <a:fillRef idx="1">
+              <a:schemeClr val="accent1"/>
+            </a:fillRef>
+            <a:effectRef idx="0">
+              <a:schemeClr val="accent1"/>
+            </a:effectRef>
+            <a:fontRef idx="minor">
+              <a:schemeClr val="lt1"/>
+            </a:fontRef>
+          </p:style>
+          <p:txBody>
+            <a:bodyPr rtlCol="0" anchor="ctr"/>
+            <a:lstStyle/>
+            <a:p>
+              <a:pPr algn="ctr"/>
+              <a:endParaRPr lang="pt-BR">
+                <a:solidFill>
+                  <a:schemeClr val="tx1"/>
+                </a:solidFill>
+              </a:endParaRPr>
+            </a:p>
+          </p:txBody>
+        </p:sp>
+        <p:sp>
+          <p:nvSpPr>
+            <p:cNvPr id="6" name="Marker2">
+              <a:extLst>
+                <a:ext uri="{FF2B5EF4-FFF2-40B4-BE49-F238E27FC236}">
+                  <a16:creationId xmlns:a16="http://schemas.microsoft.com/office/drawing/2014/main" id="{04BADA72-F188-CBB6-6B84-15F1D71E2512}"/>
+                </a:ext>
+              </a:extLst>
+            </p:cNvPr>
+            <p:cNvSpPr/>
+            <p:nvPr/>
+          </p:nvSpPr>
+          <p:spPr>
+            <a:xfrm>
+              <a:off x="11811000" y="6477000"/>
+              <a:ext cx="317500" cy="317500"/>
+            </a:xfrm>
+            <a:prstGeom prst="pie">
+              <a:avLst>
+                <a:gd name="adj1" fmla="val 17742857"/>
+                <a:gd name="adj2" fmla="val 16200000"/>
+              </a:avLst>
+            </a:prstGeom>
+            <a:solidFill>
+              <a:srgbClr val="FFFFFF"/>
+            </a:solidFill>
+            <a:ln w="12700" cap="flat" cmpd="sng" algn="ctr">
+              <a:noFill/>
+              <a:prstDash val="solid"/>
+              <a:miter lim="800000"/>
+            </a:ln>
+            <a:effectLst/>
+            <a:extLst>
+              <a:ext uri="{91240B29-F687-4F45-9708-019B960494DF}">
+                <a14:hiddenLine xmlns:a14="http://schemas.microsoft.com/office/drawing/2010/main" w="12700" cap="flat" cmpd="sng" algn="ctr">
+                  <a:solidFill>
+                    <a:schemeClr val="accent1">
+                      <a:shade val="50000"/>
+                    </a:schemeClr>
+                  </a:solidFill>
+                  <a:prstDash val="solid"/>
+                  <a:miter lim="800000"/>
+                </a14:hiddenLine>
+              </a:ext>
+            </a:extLst>
+          </p:spPr>
+          <p:style>
+            <a:lnRef idx="2">
+              <a:schemeClr val="accent1">
+                <a:shade val="50000"/>
+              </a:schemeClr>
+            </a:lnRef>
+            <a:fillRef idx="1">
+              <a:schemeClr val="accent1"/>
+            </a:fillRef>
+            <a:effectRef idx="0">
+              <a:schemeClr val="accent1"/>
+            </a:effectRef>
+            <a:fontRef idx="minor">
+              <a:schemeClr val="lt1"/>
+            </a:fontRef>
+          </p:style>
+          <p:txBody>
+            <a:bodyPr rtlCol="0" anchor="ctr"/>
+            <a:lstStyle/>
+            <a:p>
+              <a:pPr algn="ctr"/>
+              <a:endParaRPr lang="pt-BR">
+                <a:solidFill>
+                  <a:schemeClr val="tx1"/>
+                </a:solidFill>
+              </a:endParaRPr>
+            </a:p>
+          </p:txBody>
+        </p:sp>
+        <p:sp>
+          <p:nvSpPr>
+            <p:cNvPr id="7" name="Marker3">
+              <a:extLst>
+                <a:ext uri="{FF2B5EF4-FFF2-40B4-BE49-F238E27FC236}">
+                  <a16:creationId xmlns:a16="http://schemas.microsoft.com/office/drawing/2014/main" id="{E48FFA49-8263-6CD2-47D4-770D358A1BC5}"/>
+                </a:ext>
+              </a:extLst>
+            </p:cNvPr>
+            <p:cNvSpPr/>
+            <p:nvPr/>
+          </p:nvSpPr>
+          <p:spPr>
+            <a:xfrm>
+              <a:off x="11874500" y="6540500"/>
+              <a:ext cx="190500" cy="190500"/>
+            </a:xfrm>
+            <a:prstGeom prst="pie">
+              <a:avLst>
+                <a:gd name="adj1" fmla="val 16200000"/>
+                <a:gd name="adj2" fmla="val 16200000"/>
+              </a:avLst>
+            </a:prstGeom>
+            <a:solidFill>
+              <a:srgbClr val="FFFFFF"/>
+            </a:solidFill>
+            <a:ln w="12700" cap="flat" cmpd="sng" algn="ctr">
+              <a:noFill/>
+              <a:prstDash val="solid"/>
+              <a:miter lim="800000"/>
+            </a:ln>
+            <a:effectLst/>
+            <a:extLst>
+              <a:ext uri="{91240B29-F687-4F45-9708-019B960494DF}">
+                <a14:hiddenLine xmlns:a14="http://schemas.microsoft.com/office/drawing/2010/main" w="12700" cap="flat" cmpd="sng" algn="ctr">
+                  <a:solidFill>
+                    <a:schemeClr val="accent1">
+                      <a:shade val="50000"/>
+                    </a:schemeClr>
+                  </a:solidFill>
+                  <a:prstDash val="solid"/>
+                  <a:miter lim="800000"/>
+                </a14:hiddenLine>
+              </a:ext>
+            </a:extLst>
+          </p:spPr>
+          <p:style>
+            <a:lnRef idx="2">
+              <a:schemeClr val="accent1">
+                <a:shade val="50000"/>
+              </a:schemeClr>
+            </a:lnRef>
+            <a:fillRef idx="1">
+              <a:schemeClr val="accent1"/>
+            </a:fillRef>
+            <a:effectRef idx="0">
+              <a:schemeClr val="accent1"/>
+            </a:effectRef>
+            <a:fontRef idx="minor">
+              <a:schemeClr val="lt1"/>
+            </a:fontRef>
+          </p:style>
+          <p:txBody>
+            <a:bodyPr rtlCol="0" anchor="ctr"/>
+            <a:lstStyle/>
+            <a:p>
+              <a:pPr algn="ctr"/>
+              <a:endParaRPr lang="pt-BR">
+                <a:solidFill>
+                  <a:schemeClr val="tx1"/>
+                </a:solidFill>
+              </a:endParaRPr>
+            </a:p>
+          </p:txBody>
+        </p:sp>
+        <p:sp>
+          <p:nvSpPr>
+            <p:cNvPr id="8" name="Marker4">
+              <a:extLst>
+                <a:ext uri="{FF2B5EF4-FFF2-40B4-BE49-F238E27FC236}">
+                  <a16:creationId xmlns:a16="http://schemas.microsoft.com/office/drawing/2014/main" id="{75EC6AE5-692B-94D8-6AB9-EEE09F82155C}"/>
+                </a:ext>
+              </a:extLst>
+            </p:cNvPr>
+            <p:cNvSpPr txBox="1"/>
+            <p:nvPr/>
+          </p:nvSpPr>
+          <p:spPr>
+            <a:xfrm>
+              <a:off x="11849100" y="6527800"/>
+              <a:ext cx="242374" cy="230832"/>
+            </a:xfrm>
+            <a:prstGeom prst="rect">
+              <a:avLst/>
+            </a:prstGeom>
+            <a:noFill/>
+          </p:spPr>
+          <p:txBody>
+            <a:bodyPr vert="horz" wrap="none" rtlCol="0">
+              <a:spAutoFit/>
+            </a:bodyPr>
+            <a:lstStyle/>
+            <a:p>
+              <a:r>
+                <a:rPr lang="pt-BR" sz="900"/>
+                <a:t>1</a:t>
+              </a:r>
+            </a:p>
+          </p:txBody>
+        </p:sp>
+      </p:grpSp>
     </p:spTree>
     <p:extLst>
       <p:ext uri="{BB962C8B-B14F-4D97-AF65-F5344CB8AC3E}">
@@ -3752,6 +4675,287 @@
           </a:p>
         </p:txBody>
       </p:sp>
+      <p:grpSp>
+        <p:nvGrpSpPr>
+          <p:cNvPr id="11" name="!!circuloProgresso">
+            <a:extLst>
+              <a:ext uri="{FF2B5EF4-FFF2-40B4-BE49-F238E27FC236}">
+                <a16:creationId xmlns:a16="http://schemas.microsoft.com/office/drawing/2014/main" id="{D9B4290D-CE6F-EA56-4DA9-732A99CE2309}"/>
+              </a:ext>
+            </a:extLst>
+          </p:cNvPr>
+          <p:cNvGrpSpPr/>
+          <p:nvPr/>
+        </p:nvGrpSpPr>
+        <p:grpSpPr>
+          <a:xfrm>
+            <a:off x="11798300" y="6464300"/>
+            <a:ext cx="342900" cy="342900"/>
+            <a:chOff x="11798300" y="6464300"/>
+            <a:chExt cx="342900" cy="342900"/>
+          </a:xfrm>
+        </p:grpSpPr>
+        <p:sp>
+          <p:nvSpPr>
+            <p:cNvPr id="4" name="Marker1">
+              <a:extLst>
+                <a:ext uri="{FF2B5EF4-FFF2-40B4-BE49-F238E27FC236}">
+                  <a16:creationId xmlns:a16="http://schemas.microsoft.com/office/drawing/2014/main" id="{5879780D-F3AC-8C93-25D5-B499A017B750}"/>
+                </a:ext>
+              </a:extLst>
+            </p:cNvPr>
+            <p:cNvSpPr/>
+            <p:nvPr/>
+          </p:nvSpPr>
+          <p:spPr>
+            <a:xfrm>
+              <a:off x="11798300" y="6464300"/>
+              <a:ext cx="342900" cy="342900"/>
+            </a:xfrm>
+            <a:prstGeom prst="pie">
+              <a:avLst>
+                <a:gd name="adj1" fmla="val 16200000"/>
+                <a:gd name="adj2" fmla="val 16200000"/>
+              </a:avLst>
+            </a:prstGeom>
+            <a:solidFill>
+              <a:srgbClr val="000000"/>
+            </a:solidFill>
+            <a:ln w="12700" cap="flat" cmpd="sng" algn="ctr">
+              <a:noFill/>
+              <a:prstDash val="solid"/>
+              <a:miter lim="800000"/>
+            </a:ln>
+            <a:effectLst/>
+            <a:extLst>
+              <a:ext uri="{91240B29-F687-4F45-9708-019B960494DF}">
+                <a14:hiddenLine xmlns:a14="http://schemas.microsoft.com/office/drawing/2010/main" w="12700" cap="flat" cmpd="sng" algn="ctr">
+                  <a:solidFill>
+                    <a:schemeClr val="accent1">
+                      <a:shade val="50000"/>
+                    </a:schemeClr>
+                  </a:solidFill>
+                  <a:prstDash val="solid"/>
+                  <a:miter lim="800000"/>
+                </a14:hiddenLine>
+              </a:ext>
+            </a:extLst>
+          </p:spPr>
+          <p:style>
+            <a:lnRef idx="2">
+              <a:schemeClr val="accent1">
+                <a:shade val="50000"/>
+              </a:schemeClr>
+            </a:lnRef>
+            <a:fillRef idx="1">
+              <a:schemeClr val="accent1"/>
+            </a:fillRef>
+            <a:effectRef idx="0">
+              <a:schemeClr val="accent1"/>
+            </a:effectRef>
+            <a:fontRef idx="minor">
+              <a:schemeClr val="lt1"/>
+            </a:fontRef>
+          </p:style>
+          <p:txBody>
+            <a:bodyPr rtlCol="0" anchor="ctr"/>
+            <a:lstStyle/>
+            <a:p>
+              <a:pPr algn="ctr"/>
+              <a:endParaRPr lang="pt-BR">
+                <a:solidFill>
+                  <a:schemeClr val="tx1"/>
+                </a:solidFill>
+              </a:endParaRPr>
+            </a:p>
+          </p:txBody>
+        </p:sp>
+        <p:sp>
+          <p:nvSpPr>
+            <p:cNvPr id="5" name="Marker2">
+              <a:extLst>
+                <a:ext uri="{FF2B5EF4-FFF2-40B4-BE49-F238E27FC236}">
+                  <a16:creationId xmlns:a16="http://schemas.microsoft.com/office/drawing/2014/main" id="{E24D9BA8-64FD-9162-5D7B-F6B04663A736}"/>
+                </a:ext>
+              </a:extLst>
+            </p:cNvPr>
+            <p:cNvSpPr/>
+            <p:nvPr/>
+          </p:nvSpPr>
+          <p:spPr>
+            <a:xfrm>
+              <a:off x="11811000" y="6477000"/>
+              <a:ext cx="317500" cy="317500"/>
+            </a:xfrm>
+            <a:prstGeom prst="pie">
+              <a:avLst>
+                <a:gd name="adj1" fmla="val 10028571"/>
+                <a:gd name="adj2" fmla="val 16200000"/>
+              </a:avLst>
+            </a:prstGeom>
+            <a:solidFill>
+              <a:srgbClr val="FFFFFF"/>
+            </a:solidFill>
+            <a:ln w="12700" cap="flat" cmpd="sng" algn="ctr">
+              <a:noFill/>
+              <a:prstDash val="solid"/>
+              <a:miter lim="800000"/>
+            </a:ln>
+            <a:effectLst/>
+            <a:extLst>
+              <a:ext uri="{91240B29-F687-4F45-9708-019B960494DF}">
+                <a14:hiddenLine xmlns:a14="http://schemas.microsoft.com/office/drawing/2010/main" w="12700" cap="flat" cmpd="sng" algn="ctr">
+                  <a:solidFill>
+                    <a:schemeClr val="accent1">
+                      <a:shade val="50000"/>
+                    </a:schemeClr>
+                  </a:solidFill>
+                  <a:prstDash val="solid"/>
+                  <a:miter lim="800000"/>
+                </a14:hiddenLine>
+              </a:ext>
+            </a:extLst>
+          </p:spPr>
+          <p:style>
+            <a:lnRef idx="2">
+              <a:schemeClr val="accent1">
+                <a:shade val="50000"/>
+              </a:schemeClr>
+            </a:lnRef>
+            <a:fillRef idx="1">
+              <a:schemeClr val="accent1"/>
+            </a:fillRef>
+            <a:effectRef idx="0">
+              <a:schemeClr val="accent1"/>
+            </a:effectRef>
+            <a:fontRef idx="minor">
+              <a:schemeClr val="lt1"/>
+            </a:fontRef>
+          </p:style>
+          <p:txBody>
+            <a:bodyPr rtlCol="0" anchor="ctr"/>
+            <a:lstStyle/>
+            <a:p>
+              <a:pPr algn="ctr"/>
+              <a:endParaRPr lang="pt-BR">
+                <a:solidFill>
+                  <a:schemeClr val="tx1"/>
+                </a:solidFill>
+              </a:endParaRPr>
+            </a:p>
+          </p:txBody>
+        </p:sp>
+        <p:sp>
+          <p:nvSpPr>
+            <p:cNvPr id="6" name="Marker3">
+              <a:extLst>
+                <a:ext uri="{FF2B5EF4-FFF2-40B4-BE49-F238E27FC236}">
+                  <a16:creationId xmlns:a16="http://schemas.microsoft.com/office/drawing/2014/main" id="{140FBB57-C4D3-5D87-5BBA-CA3E5102FB3E}"/>
+                </a:ext>
+              </a:extLst>
+            </p:cNvPr>
+            <p:cNvSpPr/>
+            <p:nvPr/>
+          </p:nvSpPr>
+          <p:spPr>
+            <a:xfrm>
+              <a:off x="11874500" y="6540500"/>
+              <a:ext cx="190500" cy="190500"/>
+            </a:xfrm>
+            <a:prstGeom prst="pie">
+              <a:avLst>
+                <a:gd name="adj1" fmla="val 16200000"/>
+                <a:gd name="adj2" fmla="val 16200000"/>
+              </a:avLst>
+            </a:prstGeom>
+            <a:solidFill>
+              <a:srgbClr val="FFFFFF"/>
+            </a:solidFill>
+            <a:ln w="12700" cap="flat" cmpd="sng" algn="ctr">
+              <a:noFill/>
+              <a:prstDash val="solid"/>
+              <a:miter lim="800000"/>
+            </a:ln>
+            <a:effectLst/>
+            <a:extLst>
+              <a:ext uri="{91240B29-F687-4F45-9708-019B960494DF}">
+                <a14:hiddenLine xmlns:a14="http://schemas.microsoft.com/office/drawing/2010/main" w="12700" cap="flat" cmpd="sng" algn="ctr">
+                  <a:solidFill>
+                    <a:schemeClr val="accent1">
+                      <a:shade val="50000"/>
+                    </a:schemeClr>
+                  </a:solidFill>
+                  <a:prstDash val="solid"/>
+                  <a:miter lim="800000"/>
+                </a14:hiddenLine>
+              </a:ext>
+            </a:extLst>
+          </p:spPr>
+          <p:style>
+            <a:lnRef idx="2">
+              <a:schemeClr val="accent1">
+                <a:shade val="50000"/>
+              </a:schemeClr>
+            </a:lnRef>
+            <a:fillRef idx="1">
+              <a:schemeClr val="accent1"/>
+            </a:fillRef>
+            <a:effectRef idx="0">
+              <a:schemeClr val="accent1"/>
+            </a:effectRef>
+            <a:fontRef idx="minor">
+              <a:schemeClr val="lt1"/>
+            </a:fontRef>
+          </p:style>
+          <p:txBody>
+            <a:bodyPr rtlCol="0" anchor="ctr"/>
+            <a:lstStyle/>
+            <a:p>
+              <a:pPr algn="ctr"/>
+              <a:endParaRPr lang="pt-BR">
+                <a:solidFill>
+                  <a:schemeClr val="tx1"/>
+                </a:solidFill>
+              </a:endParaRPr>
+            </a:p>
+          </p:txBody>
+        </p:sp>
+        <p:sp>
+          <p:nvSpPr>
+            <p:cNvPr id="10" name="Marker4">
+              <a:extLst>
+                <a:ext uri="{FF2B5EF4-FFF2-40B4-BE49-F238E27FC236}">
+                  <a16:creationId xmlns:a16="http://schemas.microsoft.com/office/drawing/2014/main" id="{12319675-4E08-F787-FEEC-CA605FDA3A26}"/>
+                </a:ext>
+              </a:extLst>
+            </p:cNvPr>
+            <p:cNvSpPr txBox="1"/>
+            <p:nvPr/>
+          </p:nvSpPr>
+          <p:spPr>
+            <a:xfrm>
+              <a:off x="11811000" y="6527800"/>
+              <a:ext cx="300082" cy="230832"/>
+            </a:xfrm>
+            <a:prstGeom prst="rect">
+              <a:avLst/>
+            </a:prstGeom>
+            <a:noFill/>
+          </p:spPr>
+          <p:txBody>
+            <a:bodyPr vert="horz" wrap="none" rtlCol="0">
+              <a:spAutoFit/>
+            </a:bodyPr>
+            <a:lstStyle/>
+            <a:p>
+              <a:r>
+                <a:rPr lang="pt-BR" sz="900"/>
+                <a:t>10</a:t>
+              </a:r>
+            </a:p>
+          </p:txBody>
+        </p:sp>
+      </p:grpSp>
     </p:spTree>
     <p:extLst>
       <p:ext uri="{BB962C8B-B14F-4D97-AF65-F5344CB8AC3E}">
@@ -3958,6 +5162,287 @@
           </a:prstGeom>
         </p:spPr>
       </p:pic>
+      <p:grpSp>
+        <p:nvGrpSpPr>
+          <p:cNvPr id="11" name="!!circuloProgresso">
+            <a:extLst>
+              <a:ext uri="{FF2B5EF4-FFF2-40B4-BE49-F238E27FC236}">
+                <a16:creationId xmlns:a16="http://schemas.microsoft.com/office/drawing/2014/main" id="{9803148E-2B66-9ECB-CAC5-F29F251EE971}"/>
+              </a:ext>
+            </a:extLst>
+          </p:cNvPr>
+          <p:cNvGrpSpPr/>
+          <p:nvPr/>
+        </p:nvGrpSpPr>
+        <p:grpSpPr>
+          <a:xfrm>
+            <a:off x="11798300" y="6464300"/>
+            <a:ext cx="342900" cy="342900"/>
+            <a:chOff x="11798300" y="6464300"/>
+            <a:chExt cx="342900" cy="342900"/>
+          </a:xfrm>
+        </p:grpSpPr>
+        <p:sp>
+          <p:nvSpPr>
+            <p:cNvPr id="4" name="Marker1">
+              <a:extLst>
+                <a:ext uri="{FF2B5EF4-FFF2-40B4-BE49-F238E27FC236}">
+                  <a16:creationId xmlns:a16="http://schemas.microsoft.com/office/drawing/2014/main" id="{B93029EA-36A2-7F46-2F19-1C476FA06667}"/>
+                </a:ext>
+              </a:extLst>
+            </p:cNvPr>
+            <p:cNvSpPr/>
+            <p:nvPr/>
+          </p:nvSpPr>
+          <p:spPr>
+            <a:xfrm>
+              <a:off x="11798300" y="6464300"/>
+              <a:ext cx="342900" cy="342900"/>
+            </a:xfrm>
+            <a:prstGeom prst="pie">
+              <a:avLst>
+                <a:gd name="adj1" fmla="val 16200000"/>
+                <a:gd name="adj2" fmla="val 16200000"/>
+              </a:avLst>
+            </a:prstGeom>
+            <a:solidFill>
+              <a:srgbClr val="000000"/>
+            </a:solidFill>
+            <a:ln w="12700" cap="flat" cmpd="sng" algn="ctr">
+              <a:noFill/>
+              <a:prstDash val="solid"/>
+              <a:miter lim="800000"/>
+            </a:ln>
+            <a:effectLst/>
+            <a:extLst>
+              <a:ext uri="{91240B29-F687-4F45-9708-019B960494DF}">
+                <a14:hiddenLine xmlns:a14="http://schemas.microsoft.com/office/drawing/2010/main" w="12700" cap="flat" cmpd="sng" algn="ctr">
+                  <a:solidFill>
+                    <a:schemeClr val="accent1">
+                      <a:shade val="50000"/>
+                    </a:schemeClr>
+                  </a:solidFill>
+                  <a:prstDash val="solid"/>
+                  <a:miter lim="800000"/>
+                </a14:hiddenLine>
+              </a:ext>
+            </a:extLst>
+          </p:spPr>
+          <p:style>
+            <a:lnRef idx="2">
+              <a:schemeClr val="accent1">
+                <a:shade val="50000"/>
+              </a:schemeClr>
+            </a:lnRef>
+            <a:fillRef idx="1">
+              <a:schemeClr val="accent1"/>
+            </a:fillRef>
+            <a:effectRef idx="0">
+              <a:schemeClr val="accent1"/>
+            </a:effectRef>
+            <a:fontRef idx="minor">
+              <a:schemeClr val="lt1"/>
+            </a:fontRef>
+          </p:style>
+          <p:txBody>
+            <a:bodyPr rtlCol="0" anchor="ctr"/>
+            <a:lstStyle/>
+            <a:p>
+              <a:pPr algn="ctr"/>
+              <a:endParaRPr lang="pt-BR">
+                <a:solidFill>
+                  <a:schemeClr val="tx1"/>
+                </a:solidFill>
+              </a:endParaRPr>
+            </a:p>
+          </p:txBody>
+        </p:sp>
+        <p:sp>
+          <p:nvSpPr>
+            <p:cNvPr id="6" name="Marker2">
+              <a:extLst>
+                <a:ext uri="{FF2B5EF4-FFF2-40B4-BE49-F238E27FC236}">
+                  <a16:creationId xmlns:a16="http://schemas.microsoft.com/office/drawing/2014/main" id="{71D477A4-2065-87EC-FFA4-E2283E2726B0}"/>
+                </a:ext>
+              </a:extLst>
+            </p:cNvPr>
+            <p:cNvSpPr/>
+            <p:nvPr/>
+          </p:nvSpPr>
+          <p:spPr>
+            <a:xfrm>
+              <a:off x="11811000" y="6477000"/>
+              <a:ext cx="317500" cy="317500"/>
+            </a:xfrm>
+            <a:prstGeom prst="pie">
+              <a:avLst>
+                <a:gd name="adj1" fmla="val 11571429"/>
+                <a:gd name="adj2" fmla="val 16200000"/>
+              </a:avLst>
+            </a:prstGeom>
+            <a:solidFill>
+              <a:srgbClr val="FFFFFF"/>
+            </a:solidFill>
+            <a:ln w="12700" cap="flat" cmpd="sng" algn="ctr">
+              <a:noFill/>
+              <a:prstDash val="solid"/>
+              <a:miter lim="800000"/>
+            </a:ln>
+            <a:effectLst/>
+            <a:extLst>
+              <a:ext uri="{91240B29-F687-4F45-9708-019B960494DF}">
+                <a14:hiddenLine xmlns:a14="http://schemas.microsoft.com/office/drawing/2010/main" w="12700" cap="flat" cmpd="sng" algn="ctr">
+                  <a:solidFill>
+                    <a:schemeClr val="accent1">
+                      <a:shade val="50000"/>
+                    </a:schemeClr>
+                  </a:solidFill>
+                  <a:prstDash val="solid"/>
+                  <a:miter lim="800000"/>
+                </a14:hiddenLine>
+              </a:ext>
+            </a:extLst>
+          </p:spPr>
+          <p:style>
+            <a:lnRef idx="2">
+              <a:schemeClr val="accent1">
+                <a:shade val="50000"/>
+              </a:schemeClr>
+            </a:lnRef>
+            <a:fillRef idx="1">
+              <a:schemeClr val="accent1"/>
+            </a:fillRef>
+            <a:effectRef idx="0">
+              <a:schemeClr val="accent1"/>
+            </a:effectRef>
+            <a:fontRef idx="minor">
+              <a:schemeClr val="lt1"/>
+            </a:fontRef>
+          </p:style>
+          <p:txBody>
+            <a:bodyPr rtlCol="0" anchor="ctr"/>
+            <a:lstStyle/>
+            <a:p>
+              <a:pPr algn="ctr"/>
+              <a:endParaRPr lang="pt-BR">
+                <a:solidFill>
+                  <a:schemeClr val="tx1"/>
+                </a:solidFill>
+              </a:endParaRPr>
+            </a:p>
+          </p:txBody>
+        </p:sp>
+        <p:sp>
+          <p:nvSpPr>
+            <p:cNvPr id="7" name="Marker3">
+              <a:extLst>
+                <a:ext uri="{FF2B5EF4-FFF2-40B4-BE49-F238E27FC236}">
+                  <a16:creationId xmlns:a16="http://schemas.microsoft.com/office/drawing/2014/main" id="{2A3F3B0B-FF66-9DF0-1FE1-60B117B0C147}"/>
+                </a:ext>
+              </a:extLst>
+            </p:cNvPr>
+            <p:cNvSpPr/>
+            <p:nvPr/>
+          </p:nvSpPr>
+          <p:spPr>
+            <a:xfrm>
+              <a:off x="11874500" y="6540500"/>
+              <a:ext cx="190500" cy="190500"/>
+            </a:xfrm>
+            <a:prstGeom prst="pie">
+              <a:avLst>
+                <a:gd name="adj1" fmla="val 16200000"/>
+                <a:gd name="adj2" fmla="val 16200000"/>
+              </a:avLst>
+            </a:prstGeom>
+            <a:solidFill>
+              <a:srgbClr val="FFFFFF"/>
+            </a:solidFill>
+            <a:ln w="12700" cap="flat" cmpd="sng" algn="ctr">
+              <a:noFill/>
+              <a:prstDash val="solid"/>
+              <a:miter lim="800000"/>
+            </a:ln>
+            <a:effectLst/>
+            <a:extLst>
+              <a:ext uri="{91240B29-F687-4F45-9708-019B960494DF}">
+                <a14:hiddenLine xmlns:a14="http://schemas.microsoft.com/office/drawing/2010/main" w="12700" cap="flat" cmpd="sng" algn="ctr">
+                  <a:solidFill>
+                    <a:schemeClr val="accent1">
+                      <a:shade val="50000"/>
+                    </a:schemeClr>
+                  </a:solidFill>
+                  <a:prstDash val="solid"/>
+                  <a:miter lim="800000"/>
+                </a14:hiddenLine>
+              </a:ext>
+            </a:extLst>
+          </p:spPr>
+          <p:style>
+            <a:lnRef idx="2">
+              <a:schemeClr val="accent1">
+                <a:shade val="50000"/>
+              </a:schemeClr>
+            </a:lnRef>
+            <a:fillRef idx="1">
+              <a:schemeClr val="accent1"/>
+            </a:fillRef>
+            <a:effectRef idx="0">
+              <a:schemeClr val="accent1"/>
+            </a:effectRef>
+            <a:fontRef idx="minor">
+              <a:schemeClr val="lt1"/>
+            </a:fontRef>
+          </p:style>
+          <p:txBody>
+            <a:bodyPr rtlCol="0" anchor="ctr"/>
+            <a:lstStyle/>
+            <a:p>
+              <a:pPr algn="ctr"/>
+              <a:endParaRPr lang="pt-BR">
+                <a:solidFill>
+                  <a:schemeClr val="tx1"/>
+                </a:solidFill>
+              </a:endParaRPr>
+            </a:p>
+          </p:txBody>
+        </p:sp>
+        <p:sp>
+          <p:nvSpPr>
+            <p:cNvPr id="10" name="Marker4">
+              <a:extLst>
+                <a:ext uri="{FF2B5EF4-FFF2-40B4-BE49-F238E27FC236}">
+                  <a16:creationId xmlns:a16="http://schemas.microsoft.com/office/drawing/2014/main" id="{08457434-F7D0-3E8C-FF06-CCEFFAA286FB}"/>
+                </a:ext>
+              </a:extLst>
+            </p:cNvPr>
+            <p:cNvSpPr txBox="1"/>
+            <p:nvPr/>
+          </p:nvSpPr>
+          <p:spPr>
+            <a:xfrm>
+              <a:off x="11811000" y="6527800"/>
+              <a:ext cx="300082" cy="230832"/>
+            </a:xfrm>
+            <a:prstGeom prst="rect">
+              <a:avLst/>
+            </a:prstGeom>
+            <a:noFill/>
+          </p:spPr>
+          <p:txBody>
+            <a:bodyPr vert="horz" wrap="none" rtlCol="0">
+              <a:spAutoFit/>
+            </a:bodyPr>
+            <a:lstStyle/>
+            <a:p>
+              <a:r>
+                <a:rPr lang="pt-BR" sz="900"/>
+                <a:t>11</a:t>
+              </a:r>
+            </a:p>
+          </p:txBody>
+        </p:sp>
+      </p:grpSp>
     </p:spTree>
     <p:extLst>
       <p:ext uri="{BB962C8B-B14F-4D97-AF65-F5344CB8AC3E}">
@@ -4099,6 +5584,287 @@
           </a:prstGeom>
         </p:spPr>
       </p:pic>
+      <p:grpSp>
+        <p:nvGrpSpPr>
+          <p:cNvPr id="9" name="!!circuloProgresso">
+            <a:extLst>
+              <a:ext uri="{FF2B5EF4-FFF2-40B4-BE49-F238E27FC236}">
+                <a16:creationId xmlns:a16="http://schemas.microsoft.com/office/drawing/2014/main" id="{4B73B58D-349F-0A37-2A9F-36F6DF1E1516}"/>
+              </a:ext>
+            </a:extLst>
+          </p:cNvPr>
+          <p:cNvGrpSpPr/>
+          <p:nvPr/>
+        </p:nvGrpSpPr>
+        <p:grpSpPr>
+          <a:xfrm>
+            <a:off x="11798300" y="6464300"/>
+            <a:ext cx="342900" cy="342900"/>
+            <a:chOff x="11798300" y="6464300"/>
+            <a:chExt cx="342900" cy="342900"/>
+          </a:xfrm>
+        </p:grpSpPr>
+        <p:sp>
+          <p:nvSpPr>
+            <p:cNvPr id="4" name="Marker1">
+              <a:extLst>
+                <a:ext uri="{FF2B5EF4-FFF2-40B4-BE49-F238E27FC236}">
+                  <a16:creationId xmlns:a16="http://schemas.microsoft.com/office/drawing/2014/main" id="{F251F56C-2AE3-6014-7E6D-92DA7BA4EC99}"/>
+                </a:ext>
+              </a:extLst>
+            </p:cNvPr>
+            <p:cNvSpPr/>
+            <p:nvPr/>
+          </p:nvSpPr>
+          <p:spPr>
+            <a:xfrm>
+              <a:off x="11798300" y="6464300"/>
+              <a:ext cx="342900" cy="342900"/>
+            </a:xfrm>
+            <a:prstGeom prst="pie">
+              <a:avLst>
+                <a:gd name="adj1" fmla="val 16200000"/>
+                <a:gd name="adj2" fmla="val 16200000"/>
+              </a:avLst>
+            </a:prstGeom>
+            <a:solidFill>
+              <a:srgbClr val="000000"/>
+            </a:solidFill>
+            <a:ln w="12700" cap="flat" cmpd="sng" algn="ctr">
+              <a:noFill/>
+              <a:prstDash val="solid"/>
+              <a:miter lim="800000"/>
+            </a:ln>
+            <a:effectLst/>
+            <a:extLst>
+              <a:ext uri="{91240B29-F687-4F45-9708-019B960494DF}">
+                <a14:hiddenLine xmlns:a14="http://schemas.microsoft.com/office/drawing/2010/main" w="12700" cap="flat" cmpd="sng" algn="ctr">
+                  <a:solidFill>
+                    <a:schemeClr val="accent1">
+                      <a:shade val="50000"/>
+                    </a:schemeClr>
+                  </a:solidFill>
+                  <a:prstDash val="solid"/>
+                  <a:miter lim="800000"/>
+                </a14:hiddenLine>
+              </a:ext>
+            </a:extLst>
+          </p:spPr>
+          <p:style>
+            <a:lnRef idx="2">
+              <a:schemeClr val="accent1">
+                <a:shade val="50000"/>
+              </a:schemeClr>
+            </a:lnRef>
+            <a:fillRef idx="1">
+              <a:schemeClr val="accent1"/>
+            </a:fillRef>
+            <a:effectRef idx="0">
+              <a:schemeClr val="accent1"/>
+            </a:effectRef>
+            <a:fontRef idx="minor">
+              <a:schemeClr val="lt1"/>
+            </a:fontRef>
+          </p:style>
+          <p:txBody>
+            <a:bodyPr rtlCol="0" anchor="ctr"/>
+            <a:lstStyle/>
+            <a:p>
+              <a:pPr algn="ctr"/>
+              <a:endParaRPr lang="pt-BR">
+                <a:solidFill>
+                  <a:schemeClr val="tx1"/>
+                </a:solidFill>
+              </a:endParaRPr>
+            </a:p>
+          </p:txBody>
+        </p:sp>
+        <p:sp>
+          <p:nvSpPr>
+            <p:cNvPr id="6" name="Marker2">
+              <a:extLst>
+                <a:ext uri="{FF2B5EF4-FFF2-40B4-BE49-F238E27FC236}">
+                  <a16:creationId xmlns:a16="http://schemas.microsoft.com/office/drawing/2014/main" id="{02E6E0B1-09A9-9076-4E7E-DB9E7D5A39C3}"/>
+                </a:ext>
+              </a:extLst>
+            </p:cNvPr>
+            <p:cNvSpPr/>
+            <p:nvPr/>
+          </p:nvSpPr>
+          <p:spPr>
+            <a:xfrm>
+              <a:off x="11811000" y="6477000"/>
+              <a:ext cx="317500" cy="317500"/>
+            </a:xfrm>
+            <a:prstGeom prst="pie">
+              <a:avLst>
+                <a:gd name="adj1" fmla="val 13114286"/>
+                <a:gd name="adj2" fmla="val 16200000"/>
+              </a:avLst>
+            </a:prstGeom>
+            <a:solidFill>
+              <a:srgbClr val="FFFFFF"/>
+            </a:solidFill>
+            <a:ln w="12700" cap="flat" cmpd="sng" algn="ctr">
+              <a:noFill/>
+              <a:prstDash val="solid"/>
+              <a:miter lim="800000"/>
+            </a:ln>
+            <a:effectLst/>
+            <a:extLst>
+              <a:ext uri="{91240B29-F687-4F45-9708-019B960494DF}">
+                <a14:hiddenLine xmlns:a14="http://schemas.microsoft.com/office/drawing/2010/main" w="12700" cap="flat" cmpd="sng" algn="ctr">
+                  <a:solidFill>
+                    <a:schemeClr val="accent1">
+                      <a:shade val="50000"/>
+                    </a:schemeClr>
+                  </a:solidFill>
+                  <a:prstDash val="solid"/>
+                  <a:miter lim="800000"/>
+                </a14:hiddenLine>
+              </a:ext>
+            </a:extLst>
+          </p:spPr>
+          <p:style>
+            <a:lnRef idx="2">
+              <a:schemeClr val="accent1">
+                <a:shade val="50000"/>
+              </a:schemeClr>
+            </a:lnRef>
+            <a:fillRef idx="1">
+              <a:schemeClr val="accent1"/>
+            </a:fillRef>
+            <a:effectRef idx="0">
+              <a:schemeClr val="accent1"/>
+            </a:effectRef>
+            <a:fontRef idx="minor">
+              <a:schemeClr val="lt1"/>
+            </a:fontRef>
+          </p:style>
+          <p:txBody>
+            <a:bodyPr rtlCol="0" anchor="ctr"/>
+            <a:lstStyle/>
+            <a:p>
+              <a:pPr algn="ctr"/>
+              <a:endParaRPr lang="pt-BR">
+                <a:solidFill>
+                  <a:schemeClr val="tx1"/>
+                </a:solidFill>
+              </a:endParaRPr>
+            </a:p>
+          </p:txBody>
+        </p:sp>
+        <p:sp>
+          <p:nvSpPr>
+            <p:cNvPr id="7" name="Marker3">
+              <a:extLst>
+                <a:ext uri="{FF2B5EF4-FFF2-40B4-BE49-F238E27FC236}">
+                  <a16:creationId xmlns:a16="http://schemas.microsoft.com/office/drawing/2014/main" id="{7DACB46D-396B-F3F5-627D-546CDAF1F57B}"/>
+                </a:ext>
+              </a:extLst>
+            </p:cNvPr>
+            <p:cNvSpPr/>
+            <p:nvPr/>
+          </p:nvSpPr>
+          <p:spPr>
+            <a:xfrm>
+              <a:off x="11874500" y="6540500"/>
+              <a:ext cx="190500" cy="190500"/>
+            </a:xfrm>
+            <a:prstGeom prst="pie">
+              <a:avLst>
+                <a:gd name="adj1" fmla="val 16200000"/>
+                <a:gd name="adj2" fmla="val 16200000"/>
+              </a:avLst>
+            </a:prstGeom>
+            <a:solidFill>
+              <a:srgbClr val="FFFFFF"/>
+            </a:solidFill>
+            <a:ln w="12700" cap="flat" cmpd="sng" algn="ctr">
+              <a:noFill/>
+              <a:prstDash val="solid"/>
+              <a:miter lim="800000"/>
+            </a:ln>
+            <a:effectLst/>
+            <a:extLst>
+              <a:ext uri="{91240B29-F687-4F45-9708-019B960494DF}">
+                <a14:hiddenLine xmlns:a14="http://schemas.microsoft.com/office/drawing/2010/main" w="12700" cap="flat" cmpd="sng" algn="ctr">
+                  <a:solidFill>
+                    <a:schemeClr val="accent1">
+                      <a:shade val="50000"/>
+                    </a:schemeClr>
+                  </a:solidFill>
+                  <a:prstDash val="solid"/>
+                  <a:miter lim="800000"/>
+                </a14:hiddenLine>
+              </a:ext>
+            </a:extLst>
+          </p:spPr>
+          <p:style>
+            <a:lnRef idx="2">
+              <a:schemeClr val="accent1">
+                <a:shade val="50000"/>
+              </a:schemeClr>
+            </a:lnRef>
+            <a:fillRef idx="1">
+              <a:schemeClr val="accent1"/>
+            </a:fillRef>
+            <a:effectRef idx="0">
+              <a:schemeClr val="accent1"/>
+            </a:effectRef>
+            <a:fontRef idx="minor">
+              <a:schemeClr val="lt1"/>
+            </a:fontRef>
+          </p:style>
+          <p:txBody>
+            <a:bodyPr rtlCol="0" anchor="ctr"/>
+            <a:lstStyle/>
+            <a:p>
+              <a:pPr algn="ctr"/>
+              <a:endParaRPr lang="pt-BR">
+                <a:solidFill>
+                  <a:schemeClr val="tx1"/>
+                </a:solidFill>
+              </a:endParaRPr>
+            </a:p>
+          </p:txBody>
+        </p:sp>
+        <p:sp>
+          <p:nvSpPr>
+            <p:cNvPr id="8" name="Marker4">
+              <a:extLst>
+                <a:ext uri="{FF2B5EF4-FFF2-40B4-BE49-F238E27FC236}">
+                  <a16:creationId xmlns:a16="http://schemas.microsoft.com/office/drawing/2014/main" id="{391D889E-B421-F8D3-96B8-56CAE8289FF5}"/>
+                </a:ext>
+              </a:extLst>
+            </p:cNvPr>
+            <p:cNvSpPr txBox="1"/>
+            <p:nvPr/>
+          </p:nvSpPr>
+          <p:spPr>
+            <a:xfrm>
+              <a:off x="11811000" y="6527800"/>
+              <a:ext cx="300082" cy="230832"/>
+            </a:xfrm>
+            <a:prstGeom prst="rect">
+              <a:avLst/>
+            </a:prstGeom>
+            <a:noFill/>
+          </p:spPr>
+          <p:txBody>
+            <a:bodyPr vert="horz" wrap="none" rtlCol="0">
+              <a:spAutoFit/>
+            </a:bodyPr>
+            <a:lstStyle/>
+            <a:p>
+              <a:r>
+                <a:rPr lang="pt-BR" sz="900"/>
+                <a:t>12</a:t>
+              </a:r>
+            </a:p>
+          </p:txBody>
+        </p:sp>
+      </p:grpSp>
     </p:spTree>
     <p:extLst>
       <p:ext uri="{BB962C8B-B14F-4D97-AF65-F5344CB8AC3E}">
@@ -4319,6 +6085,287 @@
           </a:p>
         </p:txBody>
       </p:sp>
+      <p:grpSp>
+        <p:nvGrpSpPr>
+          <p:cNvPr id="9" name="!!circuloProgresso">
+            <a:extLst>
+              <a:ext uri="{FF2B5EF4-FFF2-40B4-BE49-F238E27FC236}">
+                <a16:creationId xmlns:a16="http://schemas.microsoft.com/office/drawing/2014/main" id="{9C3E20C9-483B-4681-7747-8BFF68E296C6}"/>
+              </a:ext>
+            </a:extLst>
+          </p:cNvPr>
+          <p:cNvGrpSpPr/>
+          <p:nvPr/>
+        </p:nvGrpSpPr>
+        <p:grpSpPr>
+          <a:xfrm>
+            <a:off x="11798300" y="6464300"/>
+            <a:ext cx="342900" cy="342900"/>
+            <a:chOff x="11798300" y="6464300"/>
+            <a:chExt cx="342900" cy="342900"/>
+          </a:xfrm>
+        </p:grpSpPr>
+        <p:sp>
+          <p:nvSpPr>
+            <p:cNvPr id="2" name="Marker1">
+              <a:extLst>
+                <a:ext uri="{FF2B5EF4-FFF2-40B4-BE49-F238E27FC236}">
+                  <a16:creationId xmlns:a16="http://schemas.microsoft.com/office/drawing/2014/main" id="{97B9A098-4AA9-E7F3-B6CA-C3086A42860C}"/>
+                </a:ext>
+              </a:extLst>
+            </p:cNvPr>
+            <p:cNvSpPr/>
+            <p:nvPr/>
+          </p:nvSpPr>
+          <p:spPr>
+            <a:xfrm>
+              <a:off x="11798300" y="6464300"/>
+              <a:ext cx="342900" cy="342900"/>
+            </a:xfrm>
+            <a:prstGeom prst="pie">
+              <a:avLst>
+                <a:gd name="adj1" fmla="val 16200000"/>
+                <a:gd name="adj2" fmla="val 16200000"/>
+              </a:avLst>
+            </a:prstGeom>
+            <a:solidFill>
+              <a:srgbClr val="000000"/>
+            </a:solidFill>
+            <a:ln w="12700" cap="flat" cmpd="sng" algn="ctr">
+              <a:noFill/>
+              <a:prstDash val="solid"/>
+              <a:miter lim="800000"/>
+            </a:ln>
+            <a:effectLst/>
+            <a:extLst>
+              <a:ext uri="{91240B29-F687-4F45-9708-019B960494DF}">
+                <a14:hiddenLine xmlns:a14="http://schemas.microsoft.com/office/drawing/2010/main" w="12700" cap="flat" cmpd="sng" algn="ctr">
+                  <a:solidFill>
+                    <a:schemeClr val="accent1">
+                      <a:shade val="50000"/>
+                    </a:schemeClr>
+                  </a:solidFill>
+                  <a:prstDash val="solid"/>
+                  <a:miter lim="800000"/>
+                </a14:hiddenLine>
+              </a:ext>
+            </a:extLst>
+          </p:spPr>
+          <p:style>
+            <a:lnRef idx="2">
+              <a:schemeClr val="accent1">
+                <a:shade val="50000"/>
+              </a:schemeClr>
+            </a:lnRef>
+            <a:fillRef idx="1">
+              <a:schemeClr val="accent1"/>
+            </a:fillRef>
+            <a:effectRef idx="0">
+              <a:schemeClr val="accent1"/>
+            </a:effectRef>
+            <a:fontRef idx="minor">
+              <a:schemeClr val="lt1"/>
+            </a:fontRef>
+          </p:style>
+          <p:txBody>
+            <a:bodyPr rtlCol="0" anchor="ctr"/>
+            <a:lstStyle/>
+            <a:p>
+              <a:pPr algn="ctr"/>
+              <a:endParaRPr lang="pt-BR">
+                <a:solidFill>
+                  <a:schemeClr val="tx1"/>
+                </a:solidFill>
+              </a:endParaRPr>
+            </a:p>
+          </p:txBody>
+        </p:sp>
+        <p:sp>
+          <p:nvSpPr>
+            <p:cNvPr id="3" name="Marker2">
+              <a:extLst>
+                <a:ext uri="{FF2B5EF4-FFF2-40B4-BE49-F238E27FC236}">
+                  <a16:creationId xmlns:a16="http://schemas.microsoft.com/office/drawing/2014/main" id="{35EF9908-FA0D-F5EB-9500-1800329E93F8}"/>
+                </a:ext>
+              </a:extLst>
+            </p:cNvPr>
+            <p:cNvSpPr/>
+            <p:nvPr/>
+          </p:nvSpPr>
+          <p:spPr>
+            <a:xfrm>
+              <a:off x="11811000" y="6477000"/>
+              <a:ext cx="317500" cy="317500"/>
+            </a:xfrm>
+            <a:prstGeom prst="pie">
+              <a:avLst>
+                <a:gd name="adj1" fmla="val 14657143"/>
+                <a:gd name="adj2" fmla="val 16200000"/>
+              </a:avLst>
+            </a:prstGeom>
+            <a:solidFill>
+              <a:srgbClr val="FFFFFF"/>
+            </a:solidFill>
+            <a:ln w="12700" cap="flat" cmpd="sng" algn="ctr">
+              <a:noFill/>
+              <a:prstDash val="solid"/>
+              <a:miter lim="800000"/>
+            </a:ln>
+            <a:effectLst/>
+            <a:extLst>
+              <a:ext uri="{91240B29-F687-4F45-9708-019B960494DF}">
+                <a14:hiddenLine xmlns:a14="http://schemas.microsoft.com/office/drawing/2010/main" w="12700" cap="flat" cmpd="sng" algn="ctr">
+                  <a:solidFill>
+                    <a:schemeClr val="accent1">
+                      <a:shade val="50000"/>
+                    </a:schemeClr>
+                  </a:solidFill>
+                  <a:prstDash val="solid"/>
+                  <a:miter lim="800000"/>
+                </a14:hiddenLine>
+              </a:ext>
+            </a:extLst>
+          </p:spPr>
+          <p:style>
+            <a:lnRef idx="2">
+              <a:schemeClr val="accent1">
+                <a:shade val="50000"/>
+              </a:schemeClr>
+            </a:lnRef>
+            <a:fillRef idx="1">
+              <a:schemeClr val="accent1"/>
+            </a:fillRef>
+            <a:effectRef idx="0">
+              <a:schemeClr val="accent1"/>
+            </a:effectRef>
+            <a:fontRef idx="minor">
+              <a:schemeClr val="lt1"/>
+            </a:fontRef>
+          </p:style>
+          <p:txBody>
+            <a:bodyPr rtlCol="0" anchor="ctr"/>
+            <a:lstStyle/>
+            <a:p>
+              <a:pPr algn="ctr"/>
+              <a:endParaRPr lang="pt-BR">
+                <a:solidFill>
+                  <a:schemeClr val="tx1"/>
+                </a:solidFill>
+              </a:endParaRPr>
+            </a:p>
+          </p:txBody>
+        </p:sp>
+        <p:sp>
+          <p:nvSpPr>
+            <p:cNvPr id="4" name="Marker3">
+              <a:extLst>
+                <a:ext uri="{FF2B5EF4-FFF2-40B4-BE49-F238E27FC236}">
+                  <a16:creationId xmlns:a16="http://schemas.microsoft.com/office/drawing/2014/main" id="{DDBFF2B9-7A9A-B12A-0B2E-600550053894}"/>
+                </a:ext>
+              </a:extLst>
+            </p:cNvPr>
+            <p:cNvSpPr/>
+            <p:nvPr/>
+          </p:nvSpPr>
+          <p:spPr>
+            <a:xfrm>
+              <a:off x="11874500" y="6540500"/>
+              <a:ext cx="190500" cy="190500"/>
+            </a:xfrm>
+            <a:prstGeom prst="pie">
+              <a:avLst>
+                <a:gd name="adj1" fmla="val 16200000"/>
+                <a:gd name="adj2" fmla="val 16200000"/>
+              </a:avLst>
+            </a:prstGeom>
+            <a:solidFill>
+              <a:srgbClr val="FFFFFF"/>
+            </a:solidFill>
+            <a:ln w="12700" cap="flat" cmpd="sng" algn="ctr">
+              <a:noFill/>
+              <a:prstDash val="solid"/>
+              <a:miter lim="800000"/>
+            </a:ln>
+            <a:effectLst/>
+            <a:extLst>
+              <a:ext uri="{91240B29-F687-4F45-9708-019B960494DF}">
+                <a14:hiddenLine xmlns:a14="http://schemas.microsoft.com/office/drawing/2010/main" w="12700" cap="flat" cmpd="sng" algn="ctr">
+                  <a:solidFill>
+                    <a:schemeClr val="accent1">
+                      <a:shade val="50000"/>
+                    </a:schemeClr>
+                  </a:solidFill>
+                  <a:prstDash val="solid"/>
+                  <a:miter lim="800000"/>
+                </a14:hiddenLine>
+              </a:ext>
+            </a:extLst>
+          </p:spPr>
+          <p:style>
+            <a:lnRef idx="2">
+              <a:schemeClr val="accent1">
+                <a:shade val="50000"/>
+              </a:schemeClr>
+            </a:lnRef>
+            <a:fillRef idx="1">
+              <a:schemeClr val="accent1"/>
+            </a:fillRef>
+            <a:effectRef idx="0">
+              <a:schemeClr val="accent1"/>
+            </a:effectRef>
+            <a:fontRef idx="minor">
+              <a:schemeClr val="lt1"/>
+            </a:fontRef>
+          </p:style>
+          <p:txBody>
+            <a:bodyPr rtlCol="0" anchor="ctr"/>
+            <a:lstStyle/>
+            <a:p>
+              <a:pPr algn="ctr"/>
+              <a:endParaRPr lang="pt-BR">
+                <a:solidFill>
+                  <a:schemeClr val="tx1"/>
+                </a:solidFill>
+              </a:endParaRPr>
+            </a:p>
+          </p:txBody>
+        </p:sp>
+        <p:sp>
+          <p:nvSpPr>
+            <p:cNvPr id="6" name="Marker4">
+              <a:extLst>
+                <a:ext uri="{FF2B5EF4-FFF2-40B4-BE49-F238E27FC236}">
+                  <a16:creationId xmlns:a16="http://schemas.microsoft.com/office/drawing/2014/main" id="{22876657-AC67-AB0C-4593-8AD106BA4741}"/>
+                </a:ext>
+              </a:extLst>
+            </p:cNvPr>
+            <p:cNvSpPr txBox="1"/>
+            <p:nvPr/>
+          </p:nvSpPr>
+          <p:spPr>
+            <a:xfrm>
+              <a:off x="11811000" y="6527800"/>
+              <a:ext cx="300082" cy="230832"/>
+            </a:xfrm>
+            <a:prstGeom prst="rect">
+              <a:avLst/>
+            </a:prstGeom>
+            <a:noFill/>
+          </p:spPr>
+          <p:txBody>
+            <a:bodyPr vert="horz" wrap="none" rtlCol="0">
+              <a:spAutoFit/>
+            </a:bodyPr>
+            <a:lstStyle/>
+            <a:p>
+              <a:r>
+                <a:rPr lang="pt-BR" sz="900"/>
+                <a:t>13</a:t>
+              </a:r>
+            </a:p>
+          </p:txBody>
+        </p:sp>
+      </p:grpSp>
     </p:spTree>
     <p:extLst>
       <p:ext uri="{BB962C8B-B14F-4D97-AF65-F5344CB8AC3E}">
@@ -4466,7 +6513,7 @@
         </p:blipFill>
         <p:spPr>
           <a:xfrm>
-            <a:off x="6775450" y="815975"/>
+            <a:off x="6339223" y="590550"/>
             <a:ext cx="5257800" cy="5676900"/>
           </a:xfrm>
           <a:prstGeom prst="rect">
@@ -4474,6 +6521,191 @@
           </a:prstGeom>
         </p:spPr>
       </p:pic>
+      <p:sp>
+        <p:nvSpPr>
+          <p:cNvPr id="5" name="Marker1">
+            <a:extLst>
+              <a:ext uri="{FF2B5EF4-FFF2-40B4-BE49-F238E27FC236}">
+                <a16:creationId xmlns:a16="http://schemas.microsoft.com/office/drawing/2014/main" id="{1A3434EF-517F-F959-2A94-7B906C387CE8}"/>
+              </a:ext>
+            </a:extLst>
+          </p:cNvPr>
+          <p:cNvSpPr/>
+          <p:nvPr/>
+        </p:nvSpPr>
+        <p:spPr>
+          <a:xfrm>
+            <a:off x="11798300" y="6464300"/>
+            <a:ext cx="342900" cy="342900"/>
+          </a:xfrm>
+          <a:prstGeom prst="pie">
+            <a:avLst>
+              <a:gd name="adj1" fmla="val 16200000"/>
+              <a:gd name="adj2" fmla="val 16200000"/>
+            </a:avLst>
+          </a:prstGeom>
+          <a:solidFill>
+            <a:srgbClr val="000000"/>
+          </a:solidFill>
+          <a:ln w="12700" cap="flat" cmpd="sng" algn="ctr">
+            <a:noFill/>
+            <a:prstDash val="solid"/>
+            <a:miter lim="800000"/>
+          </a:ln>
+          <a:effectLst/>
+          <a:extLst>
+            <a:ext uri="{91240B29-F687-4F45-9708-019B960494DF}">
+              <a14:hiddenLine xmlns:a14="http://schemas.microsoft.com/office/drawing/2010/main" w="12700" cap="flat" cmpd="sng" algn="ctr">
+                <a:solidFill>
+                  <a:schemeClr val="accent1">
+                    <a:shade val="50000"/>
+                  </a:schemeClr>
+                </a:solidFill>
+                <a:prstDash val="solid"/>
+                <a:miter lim="800000"/>
+              </a14:hiddenLine>
+            </a:ext>
+          </a:extLst>
+        </p:spPr>
+        <p:style>
+          <a:lnRef idx="2">
+            <a:schemeClr val="accent1">
+              <a:shade val="50000"/>
+            </a:schemeClr>
+          </a:lnRef>
+          <a:fillRef idx="1">
+            <a:schemeClr val="accent1"/>
+          </a:fillRef>
+          <a:effectRef idx="0">
+            <a:schemeClr val="accent1"/>
+          </a:effectRef>
+          <a:fontRef idx="minor">
+            <a:schemeClr val="lt1"/>
+          </a:fontRef>
+        </p:style>
+        <p:txBody>
+          <a:bodyPr rtlCol="0" anchor="ctr"/>
+          <a:lstStyle/>
+          <a:p>
+            <a:pPr algn="ctr"/>
+            <a:endParaRPr lang="pt-BR">
+              <a:solidFill>
+                <a:schemeClr val="tx1"/>
+              </a:solidFill>
+            </a:endParaRPr>
+          </a:p>
+        </p:txBody>
+      </p:sp>
+      <p:sp>
+        <p:nvSpPr>
+          <p:cNvPr id="6" name="Marker3">
+            <a:extLst>
+              <a:ext uri="{FF2B5EF4-FFF2-40B4-BE49-F238E27FC236}">
+                <a16:creationId xmlns:a16="http://schemas.microsoft.com/office/drawing/2014/main" id="{98E0A70C-856B-D10D-3650-F27B2F9BF9E2}"/>
+              </a:ext>
+            </a:extLst>
+          </p:cNvPr>
+          <p:cNvSpPr/>
+          <p:nvPr/>
+        </p:nvSpPr>
+        <p:spPr>
+          <a:xfrm>
+            <a:off x="11874500" y="6540500"/>
+            <a:ext cx="190500" cy="190500"/>
+          </a:xfrm>
+          <a:prstGeom prst="pie">
+            <a:avLst>
+              <a:gd name="adj1" fmla="val 16200000"/>
+              <a:gd name="adj2" fmla="val 16200000"/>
+            </a:avLst>
+          </a:prstGeom>
+          <a:solidFill>
+            <a:srgbClr val="FFFFFF"/>
+          </a:solidFill>
+          <a:ln w="12700" cap="flat" cmpd="sng" algn="ctr">
+            <a:noFill/>
+            <a:prstDash val="solid"/>
+            <a:miter lim="800000"/>
+          </a:ln>
+          <a:effectLst/>
+          <a:extLst>
+            <a:ext uri="{91240B29-F687-4F45-9708-019B960494DF}">
+              <a14:hiddenLine xmlns:a14="http://schemas.microsoft.com/office/drawing/2010/main" w="12700" cap="flat" cmpd="sng" algn="ctr">
+                <a:solidFill>
+                  <a:schemeClr val="accent1">
+                    <a:shade val="50000"/>
+                  </a:schemeClr>
+                </a:solidFill>
+                <a:prstDash val="solid"/>
+                <a:miter lim="800000"/>
+              </a14:hiddenLine>
+            </a:ext>
+          </a:extLst>
+        </p:spPr>
+        <p:style>
+          <a:lnRef idx="2">
+            <a:schemeClr val="accent1">
+              <a:shade val="50000"/>
+            </a:schemeClr>
+          </a:lnRef>
+          <a:fillRef idx="1">
+            <a:schemeClr val="accent1"/>
+          </a:fillRef>
+          <a:effectRef idx="0">
+            <a:schemeClr val="accent1"/>
+          </a:effectRef>
+          <a:fontRef idx="minor">
+            <a:schemeClr val="lt1"/>
+          </a:fontRef>
+        </p:style>
+        <p:txBody>
+          <a:bodyPr rtlCol="0" anchor="ctr"/>
+          <a:lstStyle/>
+          <a:p>
+            <a:pPr algn="ctr"/>
+            <a:endParaRPr lang="pt-BR">
+              <a:solidFill>
+                <a:schemeClr val="tx1"/>
+              </a:solidFill>
+            </a:endParaRPr>
+          </a:p>
+        </p:txBody>
+      </p:sp>
+      <p:sp>
+        <p:nvSpPr>
+          <p:cNvPr id="7" name="Marker4">
+            <a:extLst>
+              <a:ext uri="{FF2B5EF4-FFF2-40B4-BE49-F238E27FC236}">
+                <a16:creationId xmlns:a16="http://schemas.microsoft.com/office/drawing/2014/main" id="{80DCEC69-F959-2827-AF8C-B5888C609E85}"/>
+              </a:ext>
+            </a:extLst>
+          </p:cNvPr>
+          <p:cNvSpPr txBox="1"/>
+          <p:nvPr/>
+        </p:nvSpPr>
+        <p:spPr>
+          <a:xfrm>
+            <a:off x="11811000" y="6527800"/>
+            <a:ext cx="300082" cy="230832"/>
+          </a:xfrm>
+          <a:prstGeom prst="rect">
+            <a:avLst/>
+          </a:prstGeom>
+          <a:noFill/>
+        </p:spPr>
+        <p:txBody>
+          <a:bodyPr vert="horz" wrap="none" rtlCol="0">
+            <a:spAutoFit/>
+          </a:bodyPr>
+          <a:lstStyle/>
+          <a:p>
+            <a:r>
+              <a:rPr lang="pt-BR" sz="900"/>
+              <a:t>14</a:t>
+            </a:r>
+          </a:p>
+        </p:txBody>
+      </p:sp>
     </p:spTree>
     <p:extLst>
       <p:ext uri="{BB962C8B-B14F-4D97-AF65-F5344CB8AC3E}">
@@ -4833,6 +7065,287 @@
           </a:p>
         </p:txBody>
       </p:sp>
+      <p:grpSp>
+        <p:nvGrpSpPr>
+          <p:cNvPr id="10" name="!!circuloProgresso">
+            <a:extLst>
+              <a:ext uri="{FF2B5EF4-FFF2-40B4-BE49-F238E27FC236}">
+                <a16:creationId xmlns:a16="http://schemas.microsoft.com/office/drawing/2014/main" id="{AEC1ED39-B40F-5ABF-9E9C-45960A74ACCF}"/>
+              </a:ext>
+            </a:extLst>
+          </p:cNvPr>
+          <p:cNvGrpSpPr/>
+          <p:nvPr/>
+        </p:nvGrpSpPr>
+        <p:grpSpPr>
+          <a:xfrm>
+            <a:off x="11798300" y="6464300"/>
+            <a:ext cx="342900" cy="342900"/>
+            <a:chOff x="11798300" y="6464300"/>
+            <a:chExt cx="342900" cy="342900"/>
+          </a:xfrm>
+        </p:grpSpPr>
+        <p:sp>
+          <p:nvSpPr>
+            <p:cNvPr id="6" name="Marker1">
+              <a:extLst>
+                <a:ext uri="{FF2B5EF4-FFF2-40B4-BE49-F238E27FC236}">
+                  <a16:creationId xmlns:a16="http://schemas.microsoft.com/office/drawing/2014/main" id="{32B9D163-67EA-02B0-AF0A-9B5370514D54}"/>
+                </a:ext>
+              </a:extLst>
+            </p:cNvPr>
+            <p:cNvSpPr/>
+            <p:nvPr/>
+          </p:nvSpPr>
+          <p:spPr>
+            <a:xfrm>
+              <a:off x="11798300" y="6464300"/>
+              <a:ext cx="342900" cy="342900"/>
+            </a:xfrm>
+            <a:prstGeom prst="pie">
+              <a:avLst>
+                <a:gd name="adj1" fmla="val 16200000"/>
+                <a:gd name="adj2" fmla="val 16200000"/>
+              </a:avLst>
+            </a:prstGeom>
+            <a:solidFill>
+              <a:srgbClr val="000000"/>
+            </a:solidFill>
+            <a:ln w="12700" cap="flat" cmpd="sng" algn="ctr">
+              <a:noFill/>
+              <a:prstDash val="solid"/>
+              <a:miter lim="800000"/>
+            </a:ln>
+            <a:effectLst/>
+            <a:extLst>
+              <a:ext uri="{91240B29-F687-4F45-9708-019B960494DF}">
+                <a14:hiddenLine xmlns:a14="http://schemas.microsoft.com/office/drawing/2010/main" w="12700" cap="flat" cmpd="sng" algn="ctr">
+                  <a:solidFill>
+                    <a:schemeClr val="accent1">
+                      <a:shade val="50000"/>
+                    </a:schemeClr>
+                  </a:solidFill>
+                  <a:prstDash val="solid"/>
+                  <a:miter lim="800000"/>
+                </a14:hiddenLine>
+              </a:ext>
+            </a:extLst>
+          </p:spPr>
+          <p:style>
+            <a:lnRef idx="2">
+              <a:schemeClr val="accent1">
+                <a:shade val="50000"/>
+              </a:schemeClr>
+            </a:lnRef>
+            <a:fillRef idx="1">
+              <a:schemeClr val="accent1"/>
+            </a:fillRef>
+            <a:effectRef idx="0">
+              <a:schemeClr val="accent1"/>
+            </a:effectRef>
+            <a:fontRef idx="minor">
+              <a:schemeClr val="lt1"/>
+            </a:fontRef>
+          </p:style>
+          <p:txBody>
+            <a:bodyPr rtlCol="0" anchor="ctr"/>
+            <a:lstStyle/>
+            <a:p>
+              <a:pPr algn="ctr"/>
+              <a:endParaRPr lang="pt-BR">
+                <a:solidFill>
+                  <a:schemeClr val="tx1"/>
+                </a:solidFill>
+              </a:endParaRPr>
+            </a:p>
+          </p:txBody>
+        </p:sp>
+        <p:sp>
+          <p:nvSpPr>
+            <p:cNvPr id="7" name="Marker2">
+              <a:extLst>
+                <a:ext uri="{FF2B5EF4-FFF2-40B4-BE49-F238E27FC236}">
+                  <a16:creationId xmlns:a16="http://schemas.microsoft.com/office/drawing/2014/main" id="{D5E3DDF9-A4AD-F3C8-C519-2D4ECC7C9200}"/>
+                </a:ext>
+              </a:extLst>
+            </p:cNvPr>
+            <p:cNvSpPr/>
+            <p:nvPr/>
+          </p:nvSpPr>
+          <p:spPr>
+            <a:xfrm>
+              <a:off x="11811000" y="6477000"/>
+              <a:ext cx="317500" cy="317500"/>
+            </a:xfrm>
+            <a:prstGeom prst="pie">
+              <a:avLst>
+                <a:gd name="adj1" fmla="val 19285714"/>
+                <a:gd name="adj2" fmla="val 16200000"/>
+              </a:avLst>
+            </a:prstGeom>
+            <a:solidFill>
+              <a:srgbClr val="FFFFFF"/>
+            </a:solidFill>
+            <a:ln w="12700" cap="flat" cmpd="sng" algn="ctr">
+              <a:noFill/>
+              <a:prstDash val="solid"/>
+              <a:miter lim="800000"/>
+            </a:ln>
+            <a:effectLst/>
+            <a:extLst>
+              <a:ext uri="{91240B29-F687-4F45-9708-019B960494DF}">
+                <a14:hiddenLine xmlns:a14="http://schemas.microsoft.com/office/drawing/2010/main" w="12700" cap="flat" cmpd="sng" algn="ctr">
+                  <a:solidFill>
+                    <a:schemeClr val="accent1">
+                      <a:shade val="50000"/>
+                    </a:schemeClr>
+                  </a:solidFill>
+                  <a:prstDash val="solid"/>
+                  <a:miter lim="800000"/>
+                </a14:hiddenLine>
+              </a:ext>
+            </a:extLst>
+          </p:spPr>
+          <p:style>
+            <a:lnRef idx="2">
+              <a:schemeClr val="accent1">
+                <a:shade val="50000"/>
+              </a:schemeClr>
+            </a:lnRef>
+            <a:fillRef idx="1">
+              <a:schemeClr val="accent1"/>
+            </a:fillRef>
+            <a:effectRef idx="0">
+              <a:schemeClr val="accent1"/>
+            </a:effectRef>
+            <a:fontRef idx="minor">
+              <a:schemeClr val="lt1"/>
+            </a:fontRef>
+          </p:style>
+          <p:txBody>
+            <a:bodyPr rtlCol="0" anchor="ctr"/>
+            <a:lstStyle/>
+            <a:p>
+              <a:pPr algn="ctr"/>
+              <a:endParaRPr lang="pt-BR">
+                <a:solidFill>
+                  <a:schemeClr val="tx1"/>
+                </a:solidFill>
+              </a:endParaRPr>
+            </a:p>
+          </p:txBody>
+        </p:sp>
+        <p:sp>
+          <p:nvSpPr>
+            <p:cNvPr id="8" name="Marker3">
+              <a:extLst>
+                <a:ext uri="{FF2B5EF4-FFF2-40B4-BE49-F238E27FC236}">
+                  <a16:creationId xmlns:a16="http://schemas.microsoft.com/office/drawing/2014/main" id="{71427F50-B6A7-1FE0-3715-A10030716E58}"/>
+                </a:ext>
+              </a:extLst>
+            </p:cNvPr>
+            <p:cNvSpPr/>
+            <p:nvPr/>
+          </p:nvSpPr>
+          <p:spPr>
+            <a:xfrm>
+              <a:off x="11874500" y="6540500"/>
+              <a:ext cx="190500" cy="190500"/>
+            </a:xfrm>
+            <a:prstGeom prst="pie">
+              <a:avLst>
+                <a:gd name="adj1" fmla="val 16200000"/>
+                <a:gd name="adj2" fmla="val 16200000"/>
+              </a:avLst>
+            </a:prstGeom>
+            <a:solidFill>
+              <a:srgbClr val="FFFFFF"/>
+            </a:solidFill>
+            <a:ln w="12700" cap="flat" cmpd="sng" algn="ctr">
+              <a:noFill/>
+              <a:prstDash val="solid"/>
+              <a:miter lim="800000"/>
+            </a:ln>
+            <a:effectLst/>
+            <a:extLst>
+              <a:ext uri="{91240B29-F687-4F45-9708-019B960494DF}">
+                <a14:hiddenLine xmlns:a14="http://schemas.microsoft.com/office/drawing/2010/main" w="12700" cap="flat" cmpd="sng" algn="ctr">
+                  <a:solidFill>
+                    <a:schemeClr val="accent1">
+                      <a:shade val="50000"/>
+                    </a:schemeClr>
+                  </a:solidFill>
+                  <a:prstDash val="solid"/>
+                  <a:miter lim="800000"/>
+                </a14:hiddenLine>
+              </a:ext>
+            </a:extLst>
+          </p:spPr>
+          <p:style>
+            <a:lnRef idx="2">
+              <a:schemeClr val="accent1">
+                <a:shade val="50000"/>
+              </a:schemeClr>
+            </a:lnRef>
+            <a:fillRef idx="1">
+              <a:schemeClr val="accent1"/>
+            </a:fillRef>
+            <a:effectRef idx="0">
+              <a:schemeClr val="accent1"/>
+            </a:effectRef>
+            <a:fontRef idx="minor">
+              <a:schemeClr val="lt1"/>
+            </a:fontRef>
+          </p:style>
+          <p:txBody>
+            <a:bodyPr rtlCol="0" anchor="ctr"/>
+            <a:lstStyle/>
+            <a:p>
+              <a:pPr algn="ctr"/>
+              <a:endParaRPr lang="pt-BR">
+                <a:solidFill>
+                  <a:schemeClr val="tx1"/>
+                </a:solidFill>
+              </a:endParaRPr>
+            </a:p>
+          </p:txBody>
+        </p:sp>
+        <p:sp>
+          <p:nvSpPr>
+            <p:cNvPr id="9" name="Marker4">
+              <a:extLst>
+                <a:ext uri="{FF2B5EF4-FFF2-40B4-BE49-F238E27FC236}">
+                  <a16:creationId xmlns:a16="http://schemas.microsoft.com/office/drawing/2014/main" id="{0230E4C3-0EE1-EAF9-2D40-CCD6F935FD27}"/>
+                </a:ext>
+              </a:extLst>
+            </p:cNvPr>
+            <p:cNvSpPr txBox="1"/>
+            <p:nvPr/>
+          </p:nvSpPr>
+          <p:spPr>
+            <a:xfrm>
+              <a:off x="11849100" y="6527800"/>
+              <a:ext cx="242374" cy="230832"/>
+            </a:xfrm>
+            <a:prstGeom prst="rect">
+              <a:avLst/>
+            </a:prstGeom>
+            <a:noFill/>
+          </p:spPr>
+          <p:txBody>
+            <a:bodyPr vert="horz" wrap="none" rtlCol="0">
+              <a:spAutoFit/>
+            </a:bodyPr>
+            <a:lstStyle/>
+            <a:p>
+              <a:r>
+                <a:rPr lang="pt-BR" sz="900"/>
+                <a:t>2</a:t>
+              </a:r>
+            </a:p>
+          </p:txBody>
+        </p:sp>
+      </p:grpSp>
     </p:spTree>
     <p:extLst>
       <p:ext uri="{BB962C8B-B14F-4D97-AF65-F5344CB8AC3E}">
@@ -4989,6 +7502,287 @@
           </a:prstGeom>
         </p:spPr>
       </p:pic>
+      <p:grpSp>
+        <p:nvGrpSpPr>
+          <p:cNvPr id="9" name="!!circuloProgresso">
+            <a:extLst>
+              <a:ext uri="{FF2B5EF4-FFF2-40B4-BE49-F238E27FC236}">
+                <a16:creationId xmlns:a16="http://schemas.microsoft.com/office/drawing/2014/main" id="{4242D424-6904-325C-9D47-152BCFB03423}"/>
+              </a:ext>
+            </a:extLst>
+          </p:cNvPr>
+          <p:cNvGrpSpPr/>
+          <p:nvPr/>
+        </p:nvGrpSpPr>
+        <p:grpSpPr>
+          <a:xfrm>
+            <a:off x="11798300" y="6464300"/>
+            <a:ext cx="342900" cy="342900"/>
+            <a:chOff x="11798300" y="6464300"/>
+            <a:chExt cx="342900" cy="342900"/>
+          </a:xfrm>
+        </p:grpSpPr>
+        <p:sp>
+          <p:nvSpPr>
+            <p:cNvPr id="4" name="Marker1">
+              <a:extLst>
+                <a:ext uri="{FF2B5EF4-FFF2-40B4-BE49-F238E27FC236}">
+                  <a16:creationId xmlns:a16="http://schemas.microsoft.com/office/drawing/2014/main" id="{A5305143-3F01-67FA-0F1E-1305F27A9EE4}"/>
+                </a:ext>
+              </a:extLst>
+            </p:cNvPr>
+            <p:cNvSpPr/>
+            <p:nvPr/>
+          </p:nvSpPr>
+          <p:spPr>
+            <a:xfrm>
+              <a:off x="11798300" y="6464300"/>
+              <a:ext cx="342900" cy="342900"/>
+            </a:xfrm>
+            <a:prstGeom prst="pie">
+              <a:avLst>
+                <a:gd name="adj1" fmla="val 16200000"/>
+                <a:gd name="adj2" fmla="val 16200000"/>
+              </a:avLst>
+            </a:prstGeom>
+            <a:solidFill>
+              <a:srgbClr val="000000"/>
+            </a:solidFill>
+            <a:ln w="12700" cap="flat" cmpd="sng" algn="ctr">
+              <a:noFill/>
+              <a:prstDash val="solid"/>
+              <a:miter lim="800000"/>
+            </a:ln>
+            <a:effectLst/>
+            <a:extLst>
+              <a:ext uri="{91240B29-F687-4F45-9708-019B960494DF}">
+                <a14:hiddenLine xmlns:a14="http://schemas.microsoft.com/office/drawing/2010/main" w="12700" cap="flat" cmpd="sng" algn="ctr">
+                  <a:solidFill>
+                    <a:schemeClr val="accent1">
+                      <a:shade val="50000"/>
+                    </a:schemeClr>
+                  </a:solidFill>
+                  <a:prstDash val="solid"/>
+                  <a:miter lim="800000"/>
+                </a14:hiddenLine>
+              </a:ext>
+            </a:extLst>
+          </p:spPr>
+          <p:style>
+            <a:lnRef idx="2">
+              <a:schemeClr val="accent1">
+                <a:shade val="50000"/>
+              </a:schemeClr>
+            </a:lnRef>
+            <a:fillRef idx="1">
+              <a:schemeClr val="accent1"/>
+            </a:fillRef>
+            <a:effectRef idx="0">
+              <a:schemeClr val="accent1"/>
+            </a:effectRef>
+            <a:fontRef idx="minor">
+              <a:schemeClr val="lt1"/>
+            </a:fontRef>
+          </p:style>
+          <p:txBody>
+            <a:bodyPr rtlCol="0" anchor="ctr"/>
+            <a:lstStyle/>
+            <a:p>
+              <a:pPr algn="ctr"/>
+              <a:endParaRPr lang="pt-BR">
+                <a:solidFill>
+                  <a:schemeClr val="tx1"/>
+                </a:solidFill>
+              </a:endParaRPr>
+            </a:p>
+          </p:txBody>
+        </p:sp>
+        <p:sp>
+          <p:nvSpPr>
+            <p:cNvPr id="6" name="Marker2">
+              <a:extLst>
+                <a:ext uri="{FF2B5EF4-FFF2-40B4-BE49-F238E27FC236}">
+                  <a16:creationId xmlns:a16="http://schemas.microsoft.com/office/drawing/2014/main" id="{D6290D90-6FE5-F90B-2EE5-35E89494D76F}"/>
+                </a:ext>
+              </a:extLst>
+            </p:cNvPr>
+            <p:cNvSpPr/>
+            <p:nvPr/>
+          </p:nvSpPr>
+          <p:spPr>
+            <a:xfrm>
+              <a:off x="11811000" y="6477000"/>
+              <a:ext cx="317500" cy="317500"/>
+            </a:xfrm>
+            <a:prstGeom prst="pie">
+              <a:avLst>
+                <a:gd name="adj1" fmla="val 20828571"/>
+                <a:gd name="adj2" fmla="val 16200000"/>
+              </a:avLst>
+            </a:prstGeom>
+            <a:solidFill>
+              <a:srgbClr val="FFFFFF"/>
+            </a:solidFill>
+            <a:ln w="12700" cap="flat" cmpd="sng" algn="ctr">
+              <a:noFill/>
+              <a:prstDash val="solid"/>
+              <a:miter lim="800000"/>
+            </a:ln>
+            <a:effectLst/>
+            <a:extLst>
+              <a:ext uri="{91240B29-F687-4F45-9708-019B960494DF}">
+                <a14:hiddenLine xmlns:a14="http://schemas.microsoft.com/office/drawing/2010/main" w="12700" cap="flat" cmpd="sng" algn="ctr">
+                  <a:solidFill>
+                    <a:schemeClr val="accent1">
+                      <a:shade val="50000"/>
+                    </a:schemeClr>
+                  </a:solidFill>
+                  <a:prstDash val="solid"/>
+                  <a:miter lim="800000"/>
+                </a14:hiddenLine>
+              </a:ext>
+            </a:extLst>
+          </p:spPr>
+          <p:style>
+            <a:lnRef idx="2">
+              <a:schemeClr val="accent1">
+                <a:shade val="50000"/>
+              </a:schemeClr>
+            </a:lnRef>
+            <a:fillRef idx="1">
+              <a:schemeClr val="accent1"/>
+            </a:fillRef>
+            <a:effectRef idx="0">
+              <a:schemeClr val="accent1"/>
+            </a:effectRef>
+            <a:fontRef idx="minor">
+              <a:schemeClr val="lt1"/>
+            </a:fontRef>
+          </p:style>
+          <p:txBody>
+            <a:bodyPr rtlCol="0" anchor="ctr"/>
+            <a:lstStyle/>
+            <a:p>
+              <a:pPr algn="ctr"/>
+              <a:endParaRPr lang="pt-BR">
+                <a:solidFill>
+                  <a:schemeClr val="tx1"/>
+                </a:solidFill>
+              </a:endParaRPr>
+            </a:p>
+          </p:txBody>
+        </p:sp>
+        <p:sp>
+          <p:nvSpPr>
+            <p:cNvPr id="7" name="Marker3">
+              <a:extLst>
+                <a:ext uri="{FF2B5EF4-FFF2-40B4-BE49-F238E27FC236}">
+                  <a16:creationId xmlns:a16="http://schemas.microsoft.com/office/drawing/2014/main" id="{2B33E086-8BDB-3D35-5418-01B485D59B84}"/>
+                </a:ext>
+              </a:extLst>
+            </p:cNvPr>
+            <p:cNvSpPr/>
+            <p:nvPr/>
+          </p:nvSpPr>
+          <p:spPr>
+            <a:xfrm>
+              <a:off x="11874500" y="6540500"/>
+              <a:ext cx="190500" cy="190500"/>
+            </a:xfrm>
+            <a:prstGeom prst="pie">
+              <a:avLst>
+                <a:gd name="adj1" fmla="val 16200000"/>
+                <a:gd name="adj2" fmla="val 16200000"/>
+              </a:avLst>
+            </a:prstGeom>
+            <a:solidFill>
+              <a:srgbClr val="FFFFFF"/>
+            </a:solidFill>
+            <a:ln w="12700" cap="flat" cmpd="sng" algn="ctr">
+              <a:noFill/>
+              <a:prstDash val="solid"/>
+              <a:miter lim="800000"/>
+            </a:ln>
+            <a:effectLst/>
+            <a:extLst>
+              <a:ext uri="{91240B29-F687-4F45-9708-019B960494DF}">
+                <a14:hiddenLine xmlns:a14="http://schemas.microsoft.com/office/drawing/2010/main" w="12700" cap="flat" cmpd="sng" algn="ctr">
+                  <a:solidFill>
+                    <a:schemeClr val="accent1">
+                      <a:shade val="50000"/>
+                    </a:schemeClr>
+                  </a:solidFill>
+                  <a:prstDash val="solid"/>
+                  <a:miter lim="800000"/>
+                </a14:hiddenLine>
+              </a:ext>
+            </a:extLst>
+          </p:spPr>
+          <p:style>
+            <a:lnRef idx="2">
+              <a:schemeClr val="accent1">
+                <a:shade val="50000"/>
+              </a:schemeClr>
+            </a:lnRef>
+            <a:fillRef idx="1">
+              <a:schemeClr val="accent1"/>
+            </a:fillRef>
+            <a:effectRef idx="0">
+              <a:schemeClr val="accent1"/>
+            </a:effectRef>
+            <a:fontRef idx="minor">
+              <a:schemeClr val="lt1"/>
+            </a:fontRef>
+          </p:style>
+          <p:txBody>
+            <a:bodyPr rtlCol="0" anchor="ctr"/>
+            <a:lstStyle/>
+            <a:p>
+              <a:pPr algn="ctr"/>
+              <a:endParaRPr lang="pt-BR">
+                <a:solidFill>
+                  <a:schemeClr val="tx1"/>
+                </a:solidFill>
+              </a:endParaRPr>
+            </a:p>
+          </p:txBody>
+        </p:sp>
+        <p:sp>
+          <p:nvSpPr>
+            <p:cNvPr id="8" name="Marker4">
+              <a:extLst>
+                <a:ext uri="{FF2B5EF4-FFF2-40B4-BE49-F238E27FC236}">
+                  <a16:creationId xmlns:a16="http://schemas.microsoft.com/office/drawing/2014/main" id="{B4238F2A-3C0A-2864-59A1-01B990B1BF53}"/>
+                </a:ext>
+              </a:extLst>
+            </p:cNvPr>
+            <p:cNvSpPr txBox="1"/>
+            <p:nvPr/>
+          </p:nvSpPr>
+          <p:spPr>
+            <a:xfrm>
+              <a:off x="11849100" y="6527800"/>
+              <a:ext cx="242374" cy="230832"/>
+            </a:xfrm>
+            <a:prstGeom prst="rect">
+              <a:avLst/>
+            </a:prstGeom>
+            <a:noFill/>
+          </p:spPr>
+          <p:txBody>
+            <a:bodyPr vert="horz" wrap="none" rtlCol="0">
+              <a:spAutoFit/>
+            </a:bodyPr>
+            <a:lstStyle/>
+            <a:p>
+              <a:r>
+                <a:rPr lang="pt-BR" sz="900"/>
+                <a:t>3</a:t>
+              </a:r>
+            </a:p>
+          </p:txBody>
+        </p:sp>
+      </p:grpSp>
     </p:spTree>
     <p:extLst>
       <p:ext uri="{BB962C8B-B14F-4D97-AF65-F5344CB8AC3E}">
@@ -5161,6 +7955,287 @@
           </a:prstGeom>
         </p:spPr>
       </p:pic>
+      <p:grpSp>
+        <p:nvGrpSpPr>
+          <p:cNvPr id="9" name="!!circuloProgresso">
+            <a:extLst>
+              <a:ext uri="{FF2B5EF4-FFF2-40B4-BE49-F238E27FC236}">
+                <a16:creationId xmlns:a16="http://schemas.microsoft.com/office/drawing/2014/main" id="{BA780462-4181-EE5B-E555-2DF047C9D72E}"/>
+              </a:ext>
+            </a:extLst>
+          </p:cNvPr>
+          <p:cNvGrpSpPr/>
+          <p:nvPr/>
+        </p:nvGrpSpPr>
+        <p:grpSpPr>
+          <a:xfrm>
+            <a:off x="11798300" y="6464300"/>
+            <a:ext cx="342900" cy="342900"/>
+            <a:chOff x="11798300" y="6464300"/>
+            <a:chExt cx="342900" cy="342900"/>
+          </a:xfrm>
+        </p:grpSpPr>
+        <p:sp>
+          <p:nvSpPr>
+            <p:cNvPr id="4" name="Marker1">
+              <a:extLst>
+                <a:ext uri="{FF2B5EF4-FFF2-40B4-BE49-F238E27FC236}">
+                  <a16:creationId xmlns:a16="http://schemas.microsoft.com/office/drawing/2014/main" id="{180A41E3-6A61-F7D6-E78D-16677D100C02}"/>
+                </a:ext>
+              </a:extLst>
+            </p:cNvPr>
+            <p:cNvSpPr/>
+            <p:nvPr/>
+          </p:nvSpPr>
+          <p:spPr>
+            <a:xfrm>
+              <a:off x="11798300" y="6464300"/>
+              <a:ext cx="342900" cy="342900"/>
+            </a:xfrm>
+            <a:prstGeom prst="pie">
+              <a:avLst>
+                <a:gd name="adj1" fmla="val 16200000"/>
+                <a:gd name="adj2" fmla="val 16200000"/>
+              </a:avLst>
+            </a:prstGeom>
+            <a:solidFill>
+              <a:srgbClr val="000000"/>
+            </a:solidFill>
+            <a:ln w="12700" cap="flat" cmpd="sng" algn="ctr">
+              <a:noFill/>
+              <a:prstDash val="solid"/>
+              <a:miter lim="800000"/>
+            </a:ln>
+            <a:effectLst/>
+            <a:extLst>
+              <a:ext uri="{91240B29-F687-4F45-9708-019B960494DF}">
+                <a14:hiddenLine xmlns:a14="http://schemas.microsoft.com/office/drawing/2010/main" w="12700" cap="flat" cmpd="sng" algn="ctr">
+                  <a:solidFill>
+                    <a:schemeClr val="accent1">
+                      <a:shade val="50000"/>
+                    </a:schemeClr>
+                  </a:solidFill>
+                  <a:prstDash val="solid"/>
+                  <a:miter lim="800000"/>
+                </a14:hiddenLine>
+              </a:ext>
+            </a:extLst>
+          </p:spPr>
+          <p:style>
+            <a:lnRef idx="2">
+              <a:schemeClr val="accent1">
+                <a:shade val="50000"/>
+              </a:schemeClr>
+            </a:lnRef>
+            <a:fillRef idx="1">
+              <a:schemeClr val="accent1"/>
+            </a:fillRef>
+            <a:effectRef idx="0">
+              <a:schemeClr val="accent1"/>
+            </a:effectRef>
+            <a:fontRef idx="minor">
+              <a:schemeClr val="lt1"/>
+            </a:fontRef>
+          </p:style>
+          <p:txBody>
+            <a:bodyPr rtlCol="0" anchor="ctr"/>
+            <a:lstStyle/>
+            <a:p>
+              <a:pPr algn="ctr"/>
+              <a:endParaRPr lang="pt-BR">
+                <a:solidFill>
+                  <a:schemeClr val="tx1"/>
+                </a:solidFill>
+              </a:endParaRPr>
+            </a:p>
+          </p:txBody>
+        </p:sp>
+        <p:sp>
+          <p:nvSpPr>
+            <p:cNvPr id="6" name="Marker2">
+              <a:extLst>
+                <a:ext uri="{FF2B5EF4-FFF2-40B4-BE49-F238E27FC236}">
+                  <a16:creationId xmlns:a16="http://schemas.microsoft.com/office/drawing/2014/main" id="{57352977-3141-501D-877F-6787CB69BF21}"/>
+                </a:ext>
+              </a:extLst>
+            </p:cNvPr>
+            <p:cNvSpPr/>
+            <p:nvPr/>
+          </p:nvSpPr>
+          <p:spPr>
+            <a:xfrm>
+              <a:off x="11811000" y="6477000"/>
+              <a:ext cx="317500" cy="317500"/>
+            </a:xfrm>
+            <a:prstGeom prst="pie">
+              <a:avLst>
+                <a:gd name="adj1" fmla="val 771429"/>
+                <a:gd name="adj2" fmla="val 16200000"/>
+              </a:avLst>
+            </a:prstGeom>
+            <a:solidFill>
+              <a:srgbClr val="FFFFFF"/>
+            </a:solidFill>
+            <a:ln w="12700" cap="flat" cmpd="sng" algn="ctr">
+              <a:noFill/>
+              <a:prstDash val="solid"/>
+              <a:miter lim="800000"/>
+            </a:ln>
+            <a:effectLst/>
+            <a:extLst>
+              <a:ext uri="{91240B29-F687-4F45-9708-019B960494DF}">
+                <a14:hiddenLine xmlns:a14="http://schemas.microsoft.com/office/drawing/2010/main" w="12700" cap="flat" cmpd="sng" algn="ctr">
+                  <a:solidFill>
+                    <a:schemeClr val="accent1">
+                      <a:shade val="50000"/>
+                    </a:schemeClr>
+                  </a:solidFill>
+                  <a:prstDash val="solid"/>
+                  <a:miter lim="800000"/>
+                </a14:hiddenLine>
+              </a:ext>
+            </a:extLst>
+          </p:spPr>
+          <p:style>
+            <a:lnRef idx="2">
+              <a:schemeClr val="accent1">
+                <a:shade val="50000"/>
+              </a:schemeClr>
+            </a:lnRef>
+            <a:fillRef idx="1">
+              <a:schemeClr val="accent1"/>
+            </a:fillRef>
+            <a:effectRef idx="0">
+              <a:schemeClr val="accent1"/>
+            </a:effectRef>
+            <a:fontRef idx="minor">
+              <a:schemeClr val="lt1"/>
+            </a:fontRef>
+          </p:style>
+          <p:txBody>
+            <a:bodyPr rtlCol="0" anchor="ctr"/>
+            <a:lstStyle/>
+            <a:p>
+              <a:pPr algn="ctr"/>
+              <a:endParaRPr lang="pt-BR">
+                <a:solidFill>
+                  <a:schemeClr val="tx1"/>
+                </a:solidFill>
+              </a:endParaRPr>
+            </a:p>
+          </p:txBody>
+        </p:sp>
+        <p:sp>
+          <p:nvSpPr>
+            <p:cNvPr id="7" name="Marker3">
+              <a:extLst>
+                <a:ext uri="{FF2B5EF4-FFF2-40B4-BE49-F238E27FC236}">
+                  <a16:creationId xmlns:a16="http://schemas.microsoft.com/office/drawing/2014/main" id="{2D3C9B8A-2C75-C8F1-6B22-6EBDBBF266DE}"/>
+                </a:ext>
+              </a:extLst>
+            </p:cNvPr>
+            <p:cNvSpPr/>
+            <p:nvPr/>
+          </p:nvSpPr>
+          <p:spPr>
+            <a:xfrm>
+              <a:off x="11874500" y="6540500"/>
+              <a:ext cx="190500" cy="190500"/>
+            </a:xfrm>
+            <a:prstGeom prst="pie">
+              <a:avLst>
+                <a:gd name="adj1" fmla="val 16200000"/>
+                <a:gd name="adj2" fmla="val 16200000"/>
+              </a:avLst>
+            </a:prstGeom>
+            <a:solidFill>
+              <a:srgbClr val="FFFFFF"/>
+            </a:solidFill>
+            <a:ln w="12700" cap="flat" cmpd="sng" algn="ctr">
+              <a:noFill/>
+              <a:prstDash val="solid"/>
+              <a:miter lim="800000"/>
+            </a:ln>
+            <a:effectLst/>
+            <a:extLst>
+              <a:ext uri="{91240B29-F687-4F45-9708-019B960494DF}">
+                <a14:hiddenLine xmlns:a14="http://schemas.microsoft.com/office/drawing/2010/main" w="12700" cap="flat" cmpd="sng" algn="ctr">
+                  <a:solidFill>
+                    <a:schemeClr val="accent1">
+                      <a:shade val="50000"/>
+                    </a:schemeClr>
+                  </a:solidFill>
+                  <a:prstDash val="solid"/>
+                  <a:miter lim="800000"/>
+                </a14:hiddenLine>
+              </a:ext>
+            </a:extLst>
+          </p:spPr>
+          <p:style>
+            <a:lnRef idx="2">
+              <a:schemeClr val="accent1">
+                <a:shade val="50000"/>
+              </a:schemeClr>
+            </a:lnRef>
+            <a:fillRef idx="1">
+              <a:schemeClr val="accent1"/>
+            </a:fillRef>
+            <a:effectRef idx="0">
+              <a:schemeClr val="accent1"/>
+            </a:effectRef>
+            <a:fontRef idx="minor">
+              <a:schemeClr val="lt1"/>
+            </a:fontRef>
+          </p:style>
+          <p:txBody>
+            <a:bodyPr rtlCol="0" anchor="ctr"/>
+            <a:lstStyle/>
+            <a:p>
+              <a:pPr algn="ctr"/>
+              <a:endParaRPr lang="pt-BR">
+                <a:solidFill>
+                  <a:schemeClr val="tx1"/>
+                </a:solidFill>
+              </a:endParaRPr>
+            </a:p>
+          </p:txBody>
+        </p:sp>
+        <p:sp>
+          <p:nvSpPr>
+            <p:cNvPr id="8" name="Marker4">
+              <a:extLst>
+                <a:ext uri="{FF2B5EF4-FFF2-40B4-BE49-F238E27FC236}">
+                  <a16:creationId xmlns:a16="http://schemas.microsoft.com/office/drawing/2014/main" id="{386D4284-C651-018E-E980-EEE4F5F5DE30}"/>
+                </a:ext>
+              </a:extLst>
+            </p:cNvPr>
+            <p:cNvSpPr txBox="1"/>
+            <p:nvPr/>
+          </p:nvSpPr>
+          <p:spPr>
+            <a:xfrm>
+              <a:off x="11849100" y="6527800"/>
+              <a:ext cx="242374" cy="230832"/>
+            </a:xfrm>
+            <a:prstGeom prst="rect">
+              <a:avLst/>
+            </a:prstGeom>
+            <a:noFill/>
+          </p:spPr>
+          <p:txBody>
+            <a:bodyPr vert="horz" wrap="none" rtlCol="0">
+              <a:spAutoFit/>
+            </a:bodyPr>
+            <a:lstStyle/>
+            <a:p>
+              <a:r>
+                <a:rPr lang="pt-BR" sz="900"/>
+                <a:t>4</a:t>
+              </a:r>
+            </a:p>
+          </p:txBody>
+        </p:sp>
+      </p:grpSp>
     </p:spTree>
     <p:extLst>
       <p:ext uri="{BB962C8B-B14F-4D97-AF65-F5344CB8AC3E}">
@@ -5387,6 +8462,287 @@
           </a:p>
         </p:txBody>
       </p:sp>
+      <p:grpSp>
+        <p:nvGrpSpPr>
+          <p:cNvPr id="10" name="!!circuloProgresso">
+            <a:extLst>
+              <a:ext uri="{FF2B5EF4-FFF2-40B4-BE49-F238E27FC236}">
+                <a16:creationId xmlns:a16="http://schemas.microsoft.com/office/drawing/2014/main" id="{AA0F02F1-54D3-9BDE-84EF-52601580D7AB}"/>
+              </a:ext>
+            </a:extLst>
+          </p:cNvPr>
+          <p:cNvGrpSpPr/>
+          <p:nvPr/>
+        </p:nvGrpSpPr>
+        <p:grpSpPr>
+          <a:xfrm>
+            <a:off x="11798300" y="6464300"/>
+            <a:ext cx="342900" cy="342900"/>
+            <a:chOff x="11798300" y="6464300"/>
+            <a:chExt cx="342900" cy="342900"/>
+          </a:xfrm>
+        </p:grpSpPr>
+        <p:sp>
+          <p:nvSpPr>
+            <p:cNvPr id="2" name="Marker1">
+              <a:extLst>
+                <a:ext uri="{FF2B5EF4-FFF2-40B4-BE49-F238E27FC236}">
+                  <a16:creationId xmlns:a16="http://schemas.microsoft.com/office/drawing/2014/main" id="{6B582CCD-A69F-865F-509C-506CAC1F3DE3}"/>
+                </a:ext>
+              </a:extLst>
+            </p:cNvPr>
+            <p:cNvSpPr/>
+            <p:nvPr/>
+          </p:nvSpPr>
+          <p:spPr>
+            <a:xfrm>
+              <a:off x="11798300" y="6464300"/>
+              <a:ext cx="342900" cy="342900"/>
+            </a:xfrm>
+            <a:prstGeom prst="pie">
+              <a:avLst>
+                <a:gd name="adj1" fmla="val 16200000"/>
+                <a:gd name="adj2" fmla="val 16200000"/>
+              </a:avLst>
+            </a:prstGeom>
+            <a:solidFill>
+              <a:srgbClr val="000000"/>
+            </a:solidFill>
+            <a:ln w="12700" cap="flat" cmpd="sng" algn="ctr">
+              <a:noFill/>
+              <a:prstDash val="solid"/>
+              <a:miter lim="800000"/>
+            </a:ln>
+            <a:effectLst/>
+            <a:extLst>
+              <a:ext uri="{91240B29-F687-4F45-9708-019B960494DF}">
+                <a14:hiddenLine xmlns:a14="http://schemas.microsoft.com/office/drawing/2010/main" w="12700" cap="flat" cmpd="sng" algn="ctr">
+                  <a:solidFill>
+                    <a:schemeClr val="accent1">
+                      <a:shade val="50000"/>
+                    </a:schemeClr>
+                  </a:solidFill>
+                  <a:prstDash val="solid"/>
+                  <a:miter lim="800000"/>
+                </a14:hiddenLine>
+              </a:ext>
+            </a:extLst>
+          </p:spPr>
+          <p:style>
+            <a:lnRef idx="2">
+              <a:schemeClr val="accent1">
+                <a:shade val="50000"/>
+              </a:schemeClr>
+            </a:lnRef>
+            <a:fillRef idx="1">
+              <a:schemeClr val="accent1"/>
+            </a:fillRef>
+            <a:effectRef idx="0">
+              <a:schemeClr val="accent1"/>
+            </a:effectRef>
+            <a:fontRef idx="minor">
+              <a:schemeClr val="lt1"/>
+            </a:fontRef>
+          </p:style>
+          <p:txBody>
+            <a:bodyPr rtlCol="0" anchor="ctr"/>
+            <a:lstStyle/>
+            <a:p>
+              <a:pPr algn="ctr"/>
+              <a:endParaRPr lang="pt-BR">
+                <a:solidFill>
+                  <a:schemeClr val="tx1"/>
+                </a:solidFill>
+              </a:endParaRPr>
+            </a:p>
+          </p:txBody>
+        </p:sp>
+        <p:sp>
+          <p:nvSpPr>
+            <p:cNvPr id="3" name="Marker2">
+              <a:extLst>
+                <a:ext uri="{FF2B5EF4-FFF2-40B4-BE49-F238E27FC236}">
+                  <a16:creationId xmlns:a16="http://schemas.microsoft.com/office/drawing/2014/main" id="{DA414877-5642-CA32-0AAE-9572AC8EC64E}"/>
+                </a:ext>
+              </a:extLst>
+            </p:cNvPr>
+            <p:cNvSpPr/>
+            <p:nvPr/>
+          </p:nvSpPr>
+          <p:spPr>
+            <a:xfrm>
+              <a:off x="11811000" y="6477000"/>
+              <a:ext cx="317500" cy="317500"/>
+            </a:xfrm>
+            <a:prstGeom prst="pie">
+              <a:avLst>
+                <a:gd name="adj1" fmla="val 2314286"/>
+                <a:gd name="adj2" fmla="val 16200000"/>
+              </a:avLst>
+            </a:prstGeom>
+            <a:solidFill>
+              <a:srgbClr val="FFFFFF"/>
+            </a:solidFill>
+            <a:ln w="12700" cap="flat" cmpd="sng" algn="ctr">
+              <a:noFill/>
+              <a:prstDash val="solid"/>
+              <a:miter lim="800000"/>
+            </a:ln>
+            <a:effectLst/>
+            <a:extLst>
+              <a:ext uri="{91240B29-F687-4F45-9708-019B960494DF}">
+                <a14:hiddenLine xmlns:a14="http://schemas.microsoft.com/office/drawing/2010/main" w="12700" cap="flat" cmpd="sng" algn="ctr">
+                  <a:solidFill>
+                    <a:schemeClr val="accent1">
+                      <a:shade val="50000"/>
+                    </a:schemeClr>
+                  </a:solidFill>
+                  <a:prstDash val="solid"/>
+                  <a:miter lim="800000"/>
+                </a14:hiddenLine>
+              </a:ext>
+            </a:extLst>
+          </p:spPr>
+          <p:style>
+            <a:lnRef idx="2">
+              <a:schemeClr val="accent1">
+                <a:shade val="50000"/>
+              </a:schemeClr>
+            </a:lnRef>
+            <a:fillRef idx="1">
+              <a:schemeClr val="accent1"/>
+            </a:fillRef>
+            <a:effectRef idx="0">
+              <a:schemeClr val="accent1"/>
+            </a:effectRef>
+            <a:fontRef idx="minor">
+              <a:schemeClr val="lt1"/>
+            </a:fontRef>
+          </p:style>
+          <p:txBody>
+            <a:bodyPr rtlCol="0" anchor="ctr"/>
+            <a:lstStyle/>
+            <a:p>
+              <a:pPr algn="ctr"/>
+              <a:endParaRPr lang="pt-BR">
+                <a:solidFill>
+                  <a:schemeClr val="tx1"/>
+                </a:solidFill>
+              </a:endParaRPr>
+            </a:p>
+          </p:txBody>
+        </p:sp>
+        <p:sp>
+          <p:nvSpPr>
+            <p:cNvPr id="4" name="Marker3">
+              <a:extLst>
+                <a:ext uri="{FF2B5EF4-FFF2-40B4-BE49-F238E27FC236}">
+                  <a16:creationId xmlns:a16="http://schemas.microsoft.com/office/drawing/2014/main" id="{D1CA15F2-2FCF-3DFE-F406-73E78C677E1D}"/>
+                </a:ext>
+              </a:extLst>
+            </p:cNvPr>
+            <p:cNvSpPr/>
+            <p:nvPr/>
+          </p:nvSpPr>
+          <p:spPr>
+            <a:xfrm>
+              <a:off x="11874500" y="6540500"/>
+              <a:ext cx="190500" cy="190500"/>
+            </a:xfrm>
+            <a:prstGeom prst="pie">
+              <a:avLst>
+                <a:gd name="adj1" fmla="val 16200000"/>
+                <a:gd name="adj2" fmla="val 16200000"/>
+              </a:avLst>
+            </a:prstGeom>
+            <a:solidFill>
+              <a:srgbClr val="FFFFFF"/>
+            </a:solidFill>
+            <a:ln w="12700" cap="flat" cmpd="sng" algn="ctr">
+              <a:noFill/>
+              <a:prstDash val="solid"/>
+              <a:miter lim="800000"/>
+            </a:ln>
+            <a:effectLst/>
+            <a:extLst>
+              <a:ext uri="{91240B29-F687-4F45-9708-019B960494DF}">
+                <a14:hiddenLine xmlns:a14="http://schemas.microsoft.com/office/drawing/2010/main" w="12700" cap="flat" cmpd="sng" algn="ctr">
+                  <a:solidFill>
+                    <a:schemeClr val="accent1">
+                      <a:shade val="50000"/>
+                    </a:schemeClr>
+                  </a:solidFill>
+                  <a:prstDash val="solid"/>
+                  <a:miter lim="800000"/>
+                </a14:hiddenLine>
+              </a:ext>
+            </a:extLst>
+          </p:spPr>
+          <p:style>
+            <a:lnRef idx="2">
+              <a:schemeClr val="accent1">
+                <a:shade val="50000"/>
+              </a:schemeClr>
+            </a:lnRef>
+            <a:fillRef idx="1">
+              <a:schemeClr val="accent1"/>
+            </a:fillRef>
+            <a:effectRef idx="0">
+              <a:schemeClr val="accent1"/>
+            </a:effectRef>
+            <a:fontRef idx="minor">
+              <a:schemeClr val="lt1"/>
+            </a:fontRef>
+          </p:style>
+          <p:txBody>
+            <a:bodyPr rtlCol="0" anchor="ctr"/>
+            <a:lstStyle/>
+            <a:p>
+              <a:pPr algn="ctr"/>
+              <a:endParaRPr lang="pt-BR">
+                <a:solidFill>
+                  <a:schemeClr val="tx1"/>
+                </a:solidFill>
+              </a:endParaRPr>
+            </a:p>
+          </p:txBody>
+        </p:sp>
+        <p:sp>
+          <p:nvSpPr>
+            <p:cNvPr id="7" name="Marker4">
+              <a:extLst>
+                <a:ext uri="{FF2B5EF4-FFF2-40B4-BE49-F238E27FC236}">
+                  <a16:creationId xmlns:a16="http://schemas.microsoft.com/office/drawing/2014/main" id="{FA8610C0-1EC7-174D-E97F-7CD042BA4B5F}"/>
+                </a:ext>
+              </a:extLst>
+            </p:cNvPr>
+            <p:cNvSpPr txBox="1"/>
+            <p:nvPr/>
+          </p:nvSpPr>
+          <p:spPr>
+            <a:xfrm>
+              <a:off x="11849100" y="6527800"/>
+              <a:ext cx="242374" cy="230832"/>
+            </a:xfrm>
+            <a:prstGeom prst="rect">
+              <a:avLst/>
+            </a:prstGeom>
+            <a:noFill/>
+          </p:spPr>
+          <p:txBody>
+            <a:bodyPr vert="horz" wrap="none" rtlCol="0">
+              <a:spAutoFit/>
+            </a:bodyPr>
+            <a:lstStyle/>
+            <a:p>
+              <a:r>
+                <a:rPr lang="pt-BR" sz="900"/>
+                <a:t>5</a:t>
+              </a:r>
+            </a:p>
+          </p:txBody>
+        </p:sp>
+      </p:grpSp>
     </p:spTree>
     <p:extLst>
       <p:ext uri="{BB962C8B-B14F-4D97-AF65-F5344CB8AC3E}">
@@ -5536,6 +8892,287 @@
           </a:prstGeom>
         </p:spPr>
       </p:pic>
+      <p:grpSp>
+        <p:nvGrpSpPr>
+          <p:cNvPr id="9" name="!!circuloProgresso">
+            <a:extLst>
+              <a:ext uri="{FF2B5EF4-FFF2-40B4-BE49-F238E27FC236}">
+                <a16:creationId xmlns:a16="http://schemas.microsoft.com/office/drawing/2014/main" id="{E8C2E487-D3E5-ED1A-D6F6-32486D86848D}"/>
+              </a:ext>
+            </a:extLst>
+          </p:cNvPr>
+          <p:cNvGrpSpPr/>
+          <p:nvPr/>
+        </p:nvGrpSpPr>
+        <p:grpSpPr>
+          <a:xfrm>
+            <a:off x="11798300" y="6464300"/>
+            <a:ext cx="342900" cy="342900"/>
+            <a:chOff x="11798300" y="6464300"/>
+            <a:chExt cx="342900" cy="342900"/>
+          </a:xfrm>
+        </p:grpSpPr>
+        <p:sp>
+          <p:nvSpPr>
+            <p:cNvPr id="4" name="Marker1">
+              <a:extLst>
+                <a:ext uri="{FF2B5EF4-FFF2-40B4-BE49-F238E27FC236}">
+                  <a16:creationId xmlns:a16="http://schemas.microsoft.com/office/drawing/2014/main" id="{BD7A572B-7ACD-F73B-E964-5992426D4557}"/>
+                </a:ext>
+              </a:extLst>
+            </p:cNvPr>
+            <p:cNvSpPr/>
+            <p:nvPr/>
+          </p:nvSpPr>
+          <p:spPr>
+            <a:xfrm>
+              <a:off x="11798300" y="6464300"/>
+              <a:ext cx="342900" cy="342900"/>
+            </a:xfrm>
+            <a:prstGeom prst="pie">
+              <a:avLst>
+                <a:gd name="adj1" fmla="val 16200000"/>
+                <a:gd name="adj2" fmla="val 16200000"/>
+              </a:avLst>
+            </a:prstGeom>
+            <a:solidFill>
+              <a:srgbClr val="000000"/>
+            </a:solidFill>
+            <a:ln w="12700" cap="flat" cmpd="sng" algn="ctr">
+              <a:noFill/>
+              <a:prstDash val="solid"/>
+              <a:miter lim="800000"/>
+            </a:ln>
+            <a:effectLst/>
+            <a:extLst>
+              <a:ext uri="{91240B29-F687-4F45-9708-019B960494DF}">
+                <a14:hiddenLine xmlns:a14="http://schemas.microsoft.com/office/drawing/2010/main" w="12700" cap="flat" cmpd="sng" algn="ctr">
+                  <a:solidFill>
+                    <a:schemeClr val="accent1">
+                      <a:shade val="50000"/>
+                    </a:schemeClr>
+                  </a:solidFill>
+                  <a:prstDash val="solid"/>
+                  <a:miter lim="800000"/>
+                </a14:hiddenLine>
+              </a:ext>
+            </a:extLst>
+          </p:spPr>
+          <p:style>
+            <a:lnRef idx="2">
+              <a:schemeClr val="accent1">
+                <a:shade val="50000"/>
+              </a:schemeClr>
+            </a:lnRef>
+            <a:fillRef idx="1">
+              <a:schemeClr val="accent1"/>
+            </a:fillRef>
+            <a:effectRef idx="0">
+              <a:schemeClr val="accent1"/>
+            </a:effectRef>
+            <a:fontRef idx="minor">
+              <a:schemeClr val="lt1"/>
+            </a:fontRef>
+          </p:style>
+          <p:txBody>
+            <a:bodyPr rtlCol="0" anchor="ctr"/>
+            <a:lstStyle/>
+            <a:p>
+              <a:pPr algn="ctr"/>
+              <a:endParaRPr lang="pt-BR">
+                <a:solidFill>
+                  <a:schemeClr val="tx1"/>
+                </a:solidFill>
+              </a:endParaRPr>
+            </a:p>
+          </p:txBody>
+        </p:sp>
+        <p:sp>
+          <p:nvSpPr>
+            <p:cNvPr id="6" name="Marker2">
+              <a:extLst>
+                <a:ext uri="{FF2B5EF4-FFF2-40B4-BE49-F238E27FC236}">
+                  <a16:creationId xmlns:a16="http://schemas.microsoft.com/office/drawing/2014/main" id="{4CD31F94-D4EF-4E77-2026-17120EA499CC}"/>
+                </a:ext>
+              </a:extLst>
+            </p:cNvPr>
+            <p:cNvSpPr/>
+            <p:nvPr/>
+          </p:nvSpPr>
+          <p:spPr>
+            <a:xfrm>
+              <a:off x="11811000" y="6477000"/>
+              <a:ext cx="317500" cy="317500"/>
+            </a:xfrm>
+            <a:prstGeom prst="pie">
+              <a:avLst>
+                <a:gd name="adj1" fmla="val 3857143"/>
+                <a:gd name="adj2" fmla="val 16200000"/>
+              </a:avLst>
+            </a:prstGeom>
+            <a:solidFill>
+              <a:srgbClr val="FFFFFF"/>
+            </a:solidFill>
+            <a:ln w="12700" cap="flat" cmpd="sng" algn="ctr">
+              <a:noFill/>
+              <a:prstDash val="solid"/>
+              <a:miter lim="800000"/>
+            </a:ln>
+            <a:effectLst/>
+            <a:extLst>
+              <a:ext uri="{91240B29-F687-4F45-9708-019B960494DF}">
+                <a14:hiddenLine xmlns:a14="http://schemas.microsoft.com/office/drawing/2010/main" w="12700" cap="flat" cmpd="sng" algn="ctr">
+                  <a:solidFill>
+                    <a:schemeClr val="accent1">
+                      <a:shade val="50000"/>
+                    </a:schemeClr>
+                  </a:solidFill>
+                  <a:prstDash val="solid"/>
+                  <a:miter lim="800000"/>
+                </a14:hiddenLine>
+              </a:ext>
+            </a:extLst>
+          </p:spPr>
+          <p:style>
+            <a:lnRef idx="2">
+              <a:schemeClr val="accent1">
+                <a:shade val="50000"/>
+              </a:schemeClr>
+            </a:lnRef>
+            <a:fillRef idx="1">
+              <a:schemeClr val="accent1"/>
+            </a:fillRef>
+            <a:effectRef idx="0">
+              <a:schemeClr val="accent1"/>
+            </a:effectRef>
+            <a:fontRef idx="minor">
+              <a:schemeClr val="lt1"/>
+            </a:fontRef>
+          </p:style>
+          <p:txBody>
+            <a:bodyPr rtlCol="0" anchor="ctr"/>
+            <a:lstStyle/>
+            <a:p>
+              <a:pPr algn="ctr"/>
+              <a:endParaRPr lang="pt-BR">
+                <a:solidFill>
+                  <a:schemeClr val="tx1"/>
+                </a:solidFill>
+              </a:endParaRPr>
+            </a:p>
+          </p:txBody>
+        </p:sp>
+        <p:sp>
+          <p:nvSpPr>
+            <p:cNvPr id="7" name="Marker3">
+              <a:extLst>
+                <a:ext uri="{FF2B5EF4-FFF2-40B4-BE49-F238E27FC236}">
+                  <a16:creationId xmlns:a16="http://schemas.microsoft.com/office/drawing/2014/main" id="{A7BA6EA4-408A-EF08-85DB-006BFBC81DE8}"/>
+                </a:ext>
+              </a:extLst>
+            </p:cNvPr>
+            <p:cNvSpPr/>
+            <p:nvPr/>
+          </p:nvSpPr>
+          <p:spPr>
+            <a:xfrm>
+              <a:off x="11874500" y="6540500"/>
+              <a:ext cx="190500" cy="190500"/>
+            </a:xfrm>
+            <a:prstGeom prst="pie">
+              <a:avLst>
+                <a:gd name="adj1" fmla="val 16200000"/>
+                <a:gd name="adj2" fmla="val 16200000"/>
+              </a:avLst>
+            </a:prstGeom>
+            <a:solidFill>
+              <a:srgbClr val="FFFFFF"/>
+            </a:solidFill>
+            <a:ln w="12700" cap="flat" cmpd="sng" algn="ctr">
+              <a:noFill/>
+              <a:prstDash val="solid"/>
+              <a:miter lim="800000"/>
+            </a:ln>
+            <a:effectLst/>
+            <a:extLst>
+              <a:ext uri="{91240B29-F687-4F45-9708-019B960494DF}">
+                <a14:hiddenLine xmlns:a14="http://schemas.microsoft.com/office/drawing/2010/main" w="12700" cap="flat" cmpd="sng" algn="ctr">
+                  <a:solidFill>
+                    <a:schemeClr val="accent1">
+                      <a:shade val="50000"/>
+                    </a:schemeClr>
+                  </a:solidFill>
+                  <a:prstDash val="solid"/>
+                  <a:miter lim="800000"/>
+                </a14:hiddenLine>
+              </a:ext>
+            </a:extLst>
+          </p:spPr>
+          <p:style>
+            <a:lnRef idx="2">
+              <a:schemeClr val="accent1">
+                <a:shade val="50000"/>
+              </a:schemeClr>
+            </a:lnRef>
+            <a:fillRef idx="1">
+              <a:schemeClr val="accent1"/>
+            </a:fillRef>
+            <a:effectRef idx="0">
+              <a:schemeClr val="accent1"/>
+            </a:effectRef>
+            <a:fontRef idx="minor">
+              <a:schemeClr val="lt1"/>
+            </a:fontRef>
+          </p:style>
+          <p:txBody>
+            <a:bodyPr rtlCol="0" anchor="ctr"/>
+            <a:lstStyle/>
+            <a:p>
+              <a:pPr algn="ctr"/>
+              <a:endParaRPr lang="pt-BR">
+                <a:solidFill>
+                  <a:schemeClr val="tx1"/>
+                </a:solidFill>
+              </a:endParaRPr>
+            </a:p>
+          </p:txBody>
+        </p:sp>
+        <p:sp>
+          <p:nvSpPr>
+            <p:cNvPr id="8" name="Marker4">
+              <a:extLst>
+                <a:ext uri="{FF2B5EF4-FFF2-40B4-BE49-F238E27FC236}">
+                  <a16:creationId xmlns:a16="http://schemas.microsoft.com/office/drawing/2014/main" id="{EE665DA6-E988-68DB-BA45-B4B7090B6F33}"/>
+                </a:ext>
+              </a:extLst>
+            </p:cNvPr>
+            <p:cNvSpPr txBox="1"/>
+            <p:nvPr/>
+          </p:nvSpPr>
+          <p:spPr>
+            <a:xfrm>
+              <a:off x="11849100" y="6527800"/>
+              <a:ext cx="242374" cy="230832"/>
+            </a:xfrm>
+            <a:prstGeom prst="rect">
+              <a:avLst/>
+            </a:prstGeom>
+            <a:noFill/>
+          </p:spPr>
+          <p:txBody>
+            <a:bodyPr vert="horz" wrap="none" rtlCol="0">
+              <a:spAutoFit/>
+            </a:bodyPr>
+            <a:lstStyle/>
+            <a:p>
+              <a:r>
+                <a:rPr lang="pt-BR" sz="900"/>
+                <a:t>6</a:t>
+              </a:r>
+            </a:p>
+          </p:txBody>
+        </p:sp>
+      </p:grpSp>
     </p:spTree>
     <p:extLst>
       <p:ext uri="{BB962C8B-B14F-4D97-AF65-F5344CB8AC3E}">
@@ -5679,6 +9316,287 @@
           </a:prstGeom>
         </p:spPr>
       </p:pic>
+      <p:grpSp>
+        <p:nvGrpSpPr>
+          <p:cNvPr id="9" name="!!circuloProgresso">
+            <a:extLst>
+              <a:ext uri="{FF2B5EF4-FFF2-40B4-BE49-F238E27FC236}">
+                <a16:creationId xmlns:a16="http://schemas.microsoft.com/office/drawing/2014/main" id="{5D239EF1-FC93-BB48-E0F0-56084697E408}"/>
+              </a:ext>
+            </a:extLst>
+          </p:cNvPr>
+          <p:cNvGrpSpPr/>
+          <p:nvPr/>
+        </p:nvGrpSpPr>
+        <p:grpSpPr>
+          <a:xfrm>
+            <a:off x="11798300" y="6464300"/>
+            <a:ext cx="342900" cy="342900"/>
+            <a:chOff x="11798300" y="6464300"/>
+            <a:chExt cx="342900" cy="342900"/>
+          </a:xfrm>
+        </p:grpSpPr>
+        <p:sp>
+          <p:nvSpPr>
+            <p:cNvPr id="4" name="Marker1">
+              <a:extLst>
+                <a:ext uri="{FF2B5EF4-FFF2-40B4-BE49-F238E27FC236}">
+                  <a16:creationId xmlns:a16="http://schemas.microsoft.com/office/drawing/2014/main" id="{951B087B-0BEB-6507-EB1D-FAF891E87F12}"/>
+                </a:ext>
+              </a:extLst>
+            </p:cNvPr>
+            <p:cNvSpPr/>
+            <p:nvPr/>
+          </p:nvSpPr>
+          <p:spPr>
+            <a:xfrm>
+              <a:off x="11798300" y="6464300"/>
+              <a:ext cx="342900" cy="342900"/>
+            </a:xfrm>
+            <a:prstGeom prst="pie">
+              <a:avLst>
+                <a:gd name="adj1" fmla="val 16200000"/>
+                <a:gd name="adj2" fmla="val 16200000"/>
+              </a:avLst>
+            </a:prstGeom>
+            <a:solidFill>
+              <a:srgbClr val="000000"/>
+            </a:solidFill>
+            <a:ln w="12700" cap="flat" cmpd="sng" algn="ctr">
+              <a:noFill/>
+              <a:prstDash val="solid"/>
+              <a:miter lim="800000"/>
+            </a:ln>
+            <a:effectLst/>
+            <a:extLst>
+              <a:ext uri="{91240B29-F687-4F45-9708-019B960494DF}">
+                <a14:hiddenLine xmlns:a14="http://schemas.microsoft.com/office/drawing/2010/main" w="12700" cap="flat" cmpd="sng" algn="ctr">
+                  <a:solidFill>
+                    <a:schemeClr val="accent1">
+                      <a:shade val="50000"/>
+                    </a:schemeClr>
+                  </a:solidFill>
+                  <a:prstDash val="solid"/>
+                  <a:miter lim="800000"/>
+                </a14:hiddenLine>
+              </a:ext>
+            </a:extLst>
+          </p:spPr>
+          <p:style>
+            <a:lnRef idx="2">
+              <a:schemeClr val="accent1">
+                <a:shade val="50000"/>
+              </a:schemeClr>
+            </a:lnRef>
+            <a:fillRef idx="1">
+              <a:schemeClr val="accent1"/>
+            </a:fillRef>
+            <a:effectRef idx="0">
+              <a:schemeClr val="accent1"/>
+            </a:effectRef>
+            <a:fontRef idx="minor">
+              <a:schemeClr val="lt1"/>
+            </a:fontRef>
+          </p:style>
+          <p:txBody>
+            <a:bodyPr rtlCol="0" anchor="ctr"/>
+            <a:lstStyle/>
+            <a:p>
+              <a:pPr algn="ctr"/>
+              <a:endParaRPr lang="pt-BR">
+                <a:solidFill>
+                  <a:schemeClr val="tx1"/>
+                </a:solidFill>
+              </a:endParaRPr>
+            </a:p>
+          </p:txBody>
+        </p:sp>
+        <p:sp>
+          <p:nvSpPr>
+            <p:cNvPr id="6" name="Marker2">
+              <a:extLst>
+                <a:ext uri="{FF2B5EF4-FFF2-40B4-BE49-F238E27FC236}">
+                  <a16:creationId xmlns:a16="http://schemas.microsoft.com/office/drawing/2014/main" id="{F750FB2B-0003-5105-8BE7-40BFEB85E81E}"/>
+                </a:ext>
+              </a:extLst>
+            </p:cNvPr>
+            <p:cNvSpPr/>
+            <p:nvPr/>
+          </p:nvSpPr>
+          <p:spPr>
+            <a:xfrm>
+              <a:off x="11811000" y="6477000"/>
+              <a:ext cx="317500" cy="317500"/>
+            </a:xfrm>
+            <a:prstGeom prst="pie">
+              <a:avLst>
+                <a:gd name="adj1" fmla="val 5400000"/>
+                <a:gd name="adj2" fmla="val 16200000"/>
+              </a:avLst>
+            </a:prstGeom>
+            <a:solidFill>
+              <a:srgbClr val="FFFFFF"/>
+            </a:solidFill>
+            <a:ln w="12700" cap="flat" cmpd="sng" algn="ctr">
+              <a:noFill/>
+              <a:prstDash val="solid"/>
+              <a:miter lim="800000"/>
+            </a:ln>
+            <a:effectLst/>
+            <a:extLst>
+              <a:ext uri="{91240B29-F687-4F45-9708-019B960494DF}">
+                <a14:hiddenLine xmlns:a14="http://schemas.microsoft.com/office/drawing/2010/main" w="12700" cap="flat" cmpd="sng" algn="ctr">
+                  <a:solidFill>
+                    <a:schemeClr val="accent1">
+                      <a:shade val="50000"/>
+                    </a:schemeClr>
+                  </a:solidFill>
+                  <a:prstDash val="solid"/>
+                  <a:miter lim="800000"/>
+                </a14:hiddenLine>
+              </a:ext>
+            </a:extLst>
+          </p:spPr>
+          <p:style>
+            <a:lnRef idx="2">
+              <a:schemeClr val="accent1">
+                <a:shade val="50000"/>
+              </a:schemeClr>
+            </a:lnRef>
+            <a:fillRef idx="1">
+              <a:schemeClr val="accent1"/>
+            </a:fillRef>
+            <a:effectRef idx="0">
+              <a:schemeClr val="accent1"/>
+            </a:effectRef>
+            <a:fontRef idx="minor">
+              <a:schemeClr val="lt1"/>
+            </a:fontRef>
+          </p:style>
+          <p:txBody>
+            <a:bodyPr rtlCol="0" anchor="ctr"/>
+            <a:lstStyle/>
+            <a:p>
+              <a:pPr algn="ctr"/>
+              <a:endParaRPr lang="pt-BR">
+                <a:solidFill>
+                  <a:schemeClr val="tx1"/>
+                </a:solidFill>
+              </a:endParaRPr>
+            </a:p>
+          </p:txBody>
+        </p:sp>
+        <p:sp>
+          <p:nvSpPr>
+            <p:cNvPr id="7" name="Marker3">
+              <a:extLst>
+                <a:ext uri="{FF2B5EF4-FFF2-40B4-BE49-F238E27FC236}">
+                  <a16:creationId xmlns:a16="http://schemas.microsoft.com/office/drawing/2014/main" id="{9D280B0C-DC7F-B73C-AE70-610375BFCFE6}"/>
+                </a:ext>
+              </a:extLst>
+            </p:cNvPr>
+            <p:cNvSpPr/>
+            <p:nvPr/>
+          </p:nvSpPr>
+          <p:spPr>
+            <a:xfrm>
+              <a:off x="11874500" y="6540500"/>
+              <a:ext cx="190500" cy="190500"/>
+            </a:xfrm>
+            <a:prstGeom prst="pie">
+              <a:avLst>
+                <a:gd name="adj1" fmla="val 16200000"/>
+                <a:gd name="adj2" fmla="val 16200000"/>
+              </a:avLst>
+            </a:prstGeom>
+            <a:solidFill>
+              <a:srgbClr val="FFFFFF"/>
+            </a:solidFill>
+            <a:ln w="12700" cap="flat" cmpd="sng" algn="ctr">
+              <a:noFill/>
+              <a:prstDash val="solid"/>
+              <a:miter lim="800000"/>
+            </a:ln>
+            <a:effectLst/>
+            <a:extLst>
+              <a:ext uri="{91240B29-F687-4F45-9708-019B960494DF}">
+                <a14:hiddenLine xmlns:a14="http://schemas.microsoft.com/office/drawing/2010/main" w="12700" cap="flat" cmpd="sng" algn="ctr">
+                  <a:solidFill>
+                    <a:schemeClr val="accent1">
+                      <a:shade val="50000"/>
+                    </a:schemeClr>
+                  </a:solidFill>
+                  <a:prstDash val="solid"/>
+                  <a:miter lim="800000"/>
+                </a14:hiddenLine>
+              </a:ext>
+            </a:extLst>
+          </p:spPr>
+          <p:style>
+            <a:lnRef idx="2">
+              <a:schemeClr val="accent1">
+                <a:shade val="50000"/>
+              </a:schemeClr>
+            </a:lnRef>
+            <a:fillRef idx="1">
+              <a:schemeClr val="accent1"/>
+            </a:fillRef>
+            <a:effectRef idx="0">
+              <a:schemeClr val="accent1"/>
+            </a:effectRef>
+            <a:fontRef idx="minor">
+              <a:schemeClr val="lt1"/>
+            </a:fontRef>
+          </p:style>
+          <p:txBody>
+            <a:bodyPr rtlCol="0" anchor="ctr"/>
+            <a:lstStyle/>
+            <a:p>
+              <a:pPr algn="ctr"/>
+              <a:endParaRPr lang="pt-BR">
+                <a:solidFill>
+                  <a:schemeClr val="tx1"/>
+                </a:solidFill>
+              </a:endParaRPr>
+            </a:p>
+          </p:txBody>
+        </p:sp>
+        <p:sp>
+          <p:nvSpPr>
+            <p:cNvPr id="8" name="Marker4">
+              <a:extLst>
+                <a:ext uri="{FF2B5EF4-FFF2-40B4-BE49-F238E27FC236}">
+                  <a16:creationId xmlns:a16="http://schemas.microsoft.com/office/drawing/2014/main" id="{8D47008A-2560-BEC2-6DAA-0DAA67FC31F7}"/>
+                </a:ext>
+              </a:extLst>
+            </p:cNvPr>
+            <p:cNvSpPr txBox="1"/>
+            <p:nvPr/>
+          </p:nvSpPr>
+          <p:spPr>
+            <a:xfrm>
+              <a:off x="11849100" y="6527800"/>
+              <a:ext cx="242374" cy="230832"/>
+            </a:xfrm>
+            <a:prstGeom prst="rect">
+              <a:avLst/>
+            </a:prstGeom>
+            <a:noFill/>
+          </p:spPr>
+          <p:txBody>
+            <a:bodyPr vert="horz" wrap="none" rtlCol="0">
+              <a:spAutoFit/>
+            </a:bodyPr>
+            <a:lstStyle/>
+            <a:p>
+              <a:r>
+                <a:rPr lang="pt-BR" sz="900"/>
+                <a:t>7</a:t>
+              </a:r>
+            </a:p>
+          </p:txBody>
+        </p:sp>
+      </p:grpSp>
     </p:spTree>
     <p:extLst>
       <p:ext uri="{BB962C8B-B14F-4D97-AF65-F5344CB8AC3E}">
@@ -5957,6 +9875,287 @@
           </a:p>
         </p:txBody>
       </p:sp>
+      <p:grpSp>
+        <p:nvGrpSpPr>
+          <p:cNvPr id="12" name="!!circuloProgresso">
+            <a:extLst>
+              <a:ext uri="{FF2B5EF4-FFF2-40B4-BE49-F238E27FC236}">
+                <a16:creationId xmlns:a16="http://schemas.microsoft.com/office/drawing/2014/main" id="{BC24998A-5FA4-C8D7-41B9-D422D80A638A}"/>
+              </a:ext>
+            </a:extLst>
+          </p:cNvPr>
+          <p:cNvGrpSpPr/>
+          <p:nvPr/>
+        </p:nvGrpSpPr>
+        <p:grpSpPr>
+          <a:xfrm>
+            <a:off x="11798300" y="6464300"/>
+            <a:ext cx="342900" cy="342900"/>
+            <a:chOff x="11798300" y="6464300"/>
+            <a:chExt cx="342900" cy="342900"/>
+          </a:xfrm>
+        </p:grpSpPr>
+        <p:sp>
+          <p:nvSpPr>
+            <p:cNvPr id="4" name="Marker1">
+              <a:extLst>
+                <a:ext uri="{FF2B5EF4-FFF2-40B4-BE49-F238E27FC236}">
+                  <a16:creationId xmlns:a16="http://schemas.microsoft.com/office/drawing/2014/main" id="{A90254B8-71FC-8E63-B085-7432333EDBEC}"/>
+                </a:ext>
+              </a:extLst>
+            </p:cNvPr>
+            <p:cNvSpPr/>
+            <p:nvPr/>
+          </p:nvSpPr>
+          <p:spPr>
+            <a:xfrm>
+              <a:off x="11798300" y="6464300"/>
+              <a:ext cx="342900" cy="342900"/>
+            </a:xfrm>
+            <a:prstGeom prst="pie">
+              <a:avLst>
+                <a:gd name="adj1" fmla="val 16200000"/>
+                <a:gd name="adj2" fmla="val 16200000"/>
+              </a:avLst>
+            </a:prstGeom>
+            <a:solidFill>
+              <a:srgbClr val="000000"/>
+            </a:solidFill>
+            <a:ln w="12700" cap="flat" cmpd="sng" algn="ctr">
+              <a:noFill/>
+              <a:prstDash val="solid"/>
+              <a:miter lim="800000"/>
+            </a:ln>
+            <a:effectLst/>
+            <a:extLst>
+              <a:ext uri="{91240B29-F687-4F45-9708-019B960494DF}">
+                <a14:hiddenLine xmlns:a14="http://schemas.microsoft.com/office/drawing/2010/main" w="12700" cap="flat" cmpd="sng" algn="ctr">
+                  <a:solidFill>
+                    <a:schemeClr val="accent1">
+                      <a:shade val="50000"/>
+                    </a:schemeClr>
+                  </a:solidFill>
+                  <a:prstDash val="solid"/>
+                  <a:miter lim="800000"/>
+                </a14:hiddenLine>
+              </a:ext>
+            </a:extLst>
+          </p:spPr>
+          <p:style>
+            <a:lnRef idx="2">
+              <a:schemeClr val="accent1">
+                <a:shade val="50000"/>
+              </a:schemeClr>
+            </a:lnRef>
+            <a:fillRef idx="1">
+              <a:schemeClr val="accent1"/>
+            </a:fillRef>
+            <a:effectRef idx="0">
+              <a:schemeClr val="accent1"/>
+            </a:effectRef>
+            <a:fontRef idx="minor">
+              <a:schemeClr val="lt1"/>
+            </a:fontRef>
+          </p:style>
+          <p:txBody>
+            <a:bodyPr rtlCol="0" anchor="ctr"/>
+            <a:lstStyle/>
+            <a:p>
+              <a:pPr algn="ctr"/>
+              <a:endParaRPr lang="pt-BR">
+                <a:solidFill>
+                  <a:schemeClr val="tx1"/>
+                </a:solidFill>
+              </a:endParaRPr>
+            </a:p>
+          </p:txBody>
+        </p:sp>
+        <p:sp>
+          <p:nvSpPr>
+            <p:cNvPr id="6" name="Marker2">
+              <a:extLst>
+                <a:ext uri="{FF2B5EF4-FFF2-40B4-BE49-F238E27FC236}">
+                  <a16:creationId xmlns:a16="http://schemas.microsoft.com/office/drawing/2014/main" id="{DE04EE7E-AA21-82FA-AA03-E96FA29C1044}"/>
+                </a:ext>
+              </a:extLst>
+            </p:cNvPr>
+            <p:cNvSpPr/>
+            <p:nvPr/>
+          </p:nvSpPr>
+          <p:spPr>
+            <a:xfrm>
+              <a:off x="11811000" y="6477000"/>
+              <a:ext cx="317500" cy="317500"/>
+            </a:xfrm>
+            <a:prstGeom prst="pie">
+              <a:avLst>
+                <a:gd name="adj1" fmla="val 6942857"/>
+                <a:gd name="adj2" fmla="val 16200000"/>
+              </a:avLst>
+            </a:prstGeom>
+            <a:solidFill>
+              <a:srgbClr val="FFFFFF"/>
+            </a:solidFill>
+            <a:ln w="12700" cap="flat" cmpd="sng" algn="ctr">
+              <a:noFill/>
+              <a:prstDash val="solid"/>
+              <a:miter lim="800000"/>
+            </a:ln>
+            <a:effectLst/>
+            <a:extLst>
+              <a:ext uri="{91240B29-F687-4F45-9708-019B960494DF}">
+                <a14:hiddenLine xmlns:a14="http://schemas.microsoft.com/office/drawing/2010/main" w="12700" cap="flat" cmpd="sng" algn="ctr">
+                  <a:solidFill>
+                    <a:schemeClr val="accent1">
+                      <a:shade val="50000"/>
+                    </a:schemeClr>
+                  </a:solidFill>
+                  <a:prstDash val="solid"/>
+                  <a:miter lim="800000"/>
+                </a14:hiddenLine>
+              </a:ext>
+            </a:extLst>
+          </p:spPr>
+          <p:style>
+            <a:lnRef idx="2">
+              <a:schemeClr val="accent1">
+                <a:shade val="50000"/>
+              </a:schemeClr>
+            </a:lnRef>
+            <a:fillRef idx="1">
+              <a:schemeClr val="accent1"/>
+            </a:fillRef>
+            <a:effectRef idx="0">
+              <a:schemeClr val="accent1"/>
+            </a:effectRef>
+            <a:fontRef idx="minor">
+              <a:schemeClr val="lt1"/>
+            </a:fontRef>
+          </p:style>
+          <p:txBody>
+            <a:bodyPr rtlCol="0" anchor="ctr"/>
+            <a:lstStyle/>
+            <a:p>
+              <a:pPr algn="ctr"/>
+              <a:endParaRPr lang="pt-BR">
+                <a:solidFill>
+                  <a:schemeClr val="tx1"/>
+                </a:solidFill>
+              </a:endParaRPr>
+            </a:p>
+          </p:txBody>
+        </p:sp>
+        <p:sp>
+          <p:nvSpPr>
+            <p:cNvPr id="10" name="Marker3">
+              <a:extLst>
+                <a:ext uri="{FF2B5EF4-FFF2-40B4-BE49-F238E27FC236}">
+                  <a16:creationId xmlns:a16="http://schemas.microsoft.com/office/drawing/2014/main" id="{1390631A-4414-BCFB-F047-2D9F1E69AB51}"/>
+                </a:ext>
+              </a:extLst>
+            </p:cNvPr>
+            <p:cNvSpPr/>
+            <p:nvPr/>
+          </p:nvSpPr>
+          <p:spPr>
+            <a:xfrm>
+              <a:off x="11874500" y="6540500"/>
+              <a:ext cx="190500" cy="190500"/>
+            </a:xfrm>
+            <a:prstGeom prst="pie">
+              <a:avLst>
+                <a:gd name="adj1" fmla="val 16200000"/>
+                <a:gd name="adj2" fmla="val 16200000"/>
+              </a:avLst>
+            </a:prstGeom>
+            <a:solidFill>
+              <a:srgbClr val="FFFFFF"/>
+            </a:solidFill>
+            <a:ln w="12700" cap="flat" cmpd="sng" algn="ctr">
+              <a:noFill/>
+              <a:prstDash val="solid"/>
+              <a:miter lim="800000"/>
+            </a:ln>
+            <a:effectLst/>
+            <a:extLst>
+              <a:ext uri="{91240B29-F687-4F45-9708-019B960494DF}">
+                <a14:hiddenLine xmlns:a14="http://schemas.microsoft.com/office/drawing/2010/main" w="12700" cap="flat" cmpd="sng" algn="ctr">
+                  <a:solidFill>
+                    <a:schemeClr val="accent1">
+                      <a:shade val="50000"/>
+                    </a:schemeClr>
+                  </a:solidFill>
+                  <a:prstDash val="solid"/>
+                  <a:miter lim="800000"/>
+                </a14:hiddenLine>
+              </a:ext>
+            </a:extLst>
+          </p:spPr>
+          <p:style>
+            <a:lnRef idx="2">
+              <a:schemeClr val="accent1">
+                <a:shade val="50000"/>
+              </a:schemeClr>
+            </a:lnRef>
+            <a:fillRef idx="1">
+              <a:schemeClr val="accent1"/>
+            </a:fillRef>
+            <a:effectRef idx="0">
+              <a:schemeClr val="accent1"/>
+            </a:effectRef>
+            <a:fontRef idx="minor">
+              <a:schemeClr val="lt1"/>
+            </a:fontRef>
+          </p:style>
+          <p:txBody>
+            <a:bodyPr rtlCol="0" anchor="ctr"/>
+            <a:lstStyle/>
+            <a:p>
+              <a:pPr algn="ctr"/>
+              <a:endParaRPr lang="pt-BR">
+                <a:solidFill>
+                  <a:schemeClr val="tx1"/>
+                </a:solidFill>
+              </a:endParaRPr>
+            </a:p>
+          </p:txBody>
+        </p:sp>
+        <p:sp>
+          <p:nvSpPr>
+            <p:cNvPr id="11" name="Marker4">
+              <a:extLst>
+                <a:ext uri="{FF2B5EF4-FFF2-40B4-BE49-F238E27FC236}">
+                  <a16:creationId xmlns:a16="http://schemas.microsoft.com/office/drawing/2014/main" id="{BCBC5BF4-09F7-EA0D-5E8C-307F01E795A8}"/>
+                </a:ext>
+              </a:extLst>
+            </p:cNvPr>
+            <p:cNvSpPr txBox="1"/>
+            <p:nvPr/>
+          </p:nvSpPr>
+          <p:spPr>
+            <a:xfrm>
+              <a:off x="11849100" y="6527800"/>
+              <a:ext cx="242374" cy="230832"/>
+            </a:xfrm>
+            <a:prstGeom prst="rect">
+              <a:avLst/>
+            </a:prstGeom>
+            <a:noFill/>
+          </p:spPr>
+          <p:txBody>
+            <a:bodyPr vert="horz" wrap="none" rtlCol="0">
+              <a:spAutoFit/>
+            </a:bodyPr>
+            <a:lstStyle/>
+            <a:p>
+              <a:r>
+                <a:rPr lang="pt-BR" sz="900"/>
+                <a:t>8</a:t>
+              </a:r>
+            </a:p>
+          </p:txBody>
+        </p:sp>
+      </p:grpSp>
     </p:spTree>
     <p:extLst>
       <p:ext uri="{BB962C8B-B14F-4D97-AF65-F5344CB8AC3E}">
@@ -6134,6 +10333,287 @@
           </a:prstGeom>
         </p:spPr>
       </p:pic>
+      <p:grpSp>
+        <p:nvGrpSpPr>
+          <p:cNvPr id="9" name="!!circuloProgresso">
+            <a:extLst>
+              <a:ext uri="{FF2B5EF4-FFF2-40B4-BE49-F238E27FC236}">
+                <a16:creationId xmlns:a16="http://schemas.microsoft.com/office/drawing/2014/main" id="{419F3933-0A32-D9E2-4FEE-0338F3227468}"/>
+              </a:ext>
+            </a:extLst>
+          </p:cNvPr>
+          <p:cNvGrpSpPr/>
+          <p:nvPr/>
+        </p:nvGrpSpPr>
+        <p:grpSpPr>
+          <a:xfrm>
+            <a:off x="11798300" y="6464300"/>
+            <a:ext cx="342900" cy="342900"/>
+            <a:chOff x="11798300" y="6464300"/>
+            <a:chExt cx="342900" cy="342900"/>
+          </a:xfrm>
+        </p:grpSpPr>
+        <p:sp>
+          <p:nvSpPr>
+            <p:cNvPr id="4" name="Marker1">
+              <a:extLst>
+                <a:ext uri="{FF2B5EF4-FFF2-40B4-BE49-F238E27FC236}">
+                  <a16:creationId xmlns:a16="http://schemas.microsoft.com/office/drawing/2014/main" id="{6423B523-FE53-C302-77A4-147F0DBB2862}"/>
+                </a:ext>
+              </a:extLst>
+            </p:cNvPr>
+            <p:cNvSpPr/>
+            <p:nvPr/>
+          </p:nvSpPr>
+          <p:spPr>
+            <a:xfrm>
+              <a:off x="11798300" y="6464300"/>
+              <a:ext cx="342900" cy="342900"/>
+            </a:xfrm>
+            <a:prstGeom prst="pie">
+              <a:avLst>
+                <a:gd name="adj1" fmla="val 16200000"/>
+                <a:gd name="adj2" fmla="val 16200000"/>
+              </a:avLst>
+            </a:prstGeom>
+            <a:solidFill>
+              <a:srgbClr val="000000"/>
+            </a:solidFill>
+            <a:ln w="12700" cap="flat" cmpd="sng" algn="ctr">
+              <a:noFill/>
+              <a:prstDash val="solid"/>
+              <a:miter lim="800000"/>
+            </a:ln>
+            <a:effectLst/>
+            <a:extLst>
+              <a:ext uri="{91240B29-F687-4F45-9708-019B960494DF}">
+                <a14:hiddenLine xmlns:a14="http://schemas.microsoft.com/office/drawing/2010/main" w="12700" cap="flat" cmpd="sng" algn="ctr">
+                  <a:solidFill>
+                    <a:schemeClr val="accent1">
+                      <a:shade val="50000"/>
+                    </a:schemeClr>
+                  </a:solidFill>
+                  <a:prstDash val="solid"/>
+                  <a:miter lim="800000"/>
+                </a14:hiddenLine>
+              </a:ext>
+            </a:extLst>
+          </p:spPr>
+          <p:style>
+            <a:lnRef idx="2">
+              <a:schemeClr val="accent1">
+                <a:shade val="50000"/>
+              </a:schemeClr>
+            </a:lnRef>
+            <a:fillRef idx="1">
+              <a:schemeClr val="accent1"/>
+            </a:fillRef>
+            <a:effectRef idx="0">
+              <a:schemeClr val="accent1"/>
+            </a:effectRef>
+            <a:fontRef idx="minor">
+              <a:schemeClr val="lt1"/>
+            </a:fontRef>
+          </p:style>
+          <p:txBody>
+            <a:bodyPr rtlCol="0" anchor="ctr"/>
+            <a:lstStyle/>
+            <a:p>
+              <a:pPr algn="ctr"/>
+              <a:endParaRPr lang="pt-BR">
+                <a:solidFill>
+                  <a:schemeClr val="tx1"/>
+                </a:solidFill>
+              </a:endParaRPr>
+            </a:p>
+          </p:txBody>
+        </p:sp>
+        <p:sp>
+          <p:nvSpPr>
+            <p:cNvPr id="5" name="Marker2">
+              <a:extLst>
+                <a:ext uri="{FF2B5EF4-FFF2-40B4-BE49-F238E27FC236}">
+                  <a16:creationId xmlns:a16="http://schemas.microsoft.com/office/drawing/2014/main" id="{A0662FC3-82E2-8895-D182-DEC12079FB70}"/>
+                </a:ext>
+              </a:extLst>
+            </p:cNvPr>
+            <p:cNvSpPr/>
+            <p:nvPr/>
+          </p:nvSpPr>
+          <p:spPr>
+            <a:xfrm>
+              <a:off x="11811000" y="6477000"/>
+              <a:ext cx="317500" cy="317500"/>
+            </a:xfrm>
+            <a:prstGeom prst="pie">
+              <a:avLst>
+                <a:gd name="adj1" fmla="val 8485714"/>
+                <a:gd name="adj2" fmla="val 16200000"/>
+              </a:avLst>
+            </a:prstGeom>
+            <a:solidFill>
+              <a:srgbClr val="FFFFFF"/>
+            </a:solidFill>
+            <a:ln w="12700" cap="flat" cmpd="sng" algn="ctr">
+              <a:noFill/>
+              <a:prstDash val="solid"/>
+              <a:miter lim="800000"/>
+            </a:ln>
+            <a:effectLst/>
+            <a:extLst>
+              <a:ext uri="{91240B29-F687-4F45-9708-019B960494DF}">
+                <a14:hiddenLine xmlns:a14="http://schemas.microsoft.com/office/drawing/2010/main" w="12700" cap="flat" cmpd="sng" algn="ctr">
+                  <a:solidFill>
+                    <a:schemeClr val="accent1">
+                      <a:shade val="50000"/>
+                    </a:schemeClr>
+                  </a:solidFill>
+                  <a:prstDash val="solid"/>
+                  <a:miter lim="800000"/>
+                </a14:hiddenLine>
+              </a:ext>
+            </a:extLst>
+          </p:spPr>
+          <p:style>
+            <a:lnRef idx="2">
+              <a:schemeClr val="accent1">
+                <a:shade val="50000"/>
+              </a:schemeClr>
+            </a:lnRef>
+            <a:fillRef idx="1">
+              <a:schemeClr val="accent1"/>
+            </a:fillRef>
+            <a:effectRef idx="0">
+              <a:schemeClr val="accent1"/>
+            </a:effectRef>
+            <a:fontRef idx="minor">
+              <a:schemeClr val="lt1"/>
+            </a:fontRef>
+          </p:style>
+          <p:txBody>
+            <a:bodyPr rtlCol="0" anchor="ctr"/>
+            <a:lstStyle/>
+            <a:p>
+              <a:pPr algn="ctr"/>
+              <a:endParaRPr lang="pt-BR">
+                <a:solidFill>
+                  <a:schemeClr val="tx1"/>
+                </a:solidFill>
+              </a:endParaRPr>
+            </a:p>
+          </p:txBody>
+        </p:sp>
+        <p:sp>
+          <p:nvSpPr>
+            <p:cNvPr id="7" name="Marker3">
+              <a:extLst>
+                <a:ext uri="{FF2B5EF4-FFF2-40B4-BE49-F238E27FC236}">
+                  <a16:creationId xmlns:a16="http://schemas.microsoft.com/office/drawing/2014/main" id="{38744BE0-026C-F939-F720-E4EEE54608EC}"/>
+                </a:ext>
+              </a:extLst>
+            </p:cNvPr>
+            <p:cNvSpPr/>
+            <p:nvPr/>
+          </p:nvSpPr>
+          <p:spPr>
+            <a:xfrm>
+              <a:off x="11874500" y="6540500"/>
+              <a:ext cx="190500" cy="190500"/>
+            </a:xfrm>
+            <a:prstGeom prst="pie">
+              <a:avLst>
+                <a:gd name="adj1" fmla="val 16200000"/>
+                <a:gd name="adj2" fmla="val 16200000"/>
+              </a:avLst>
+            </a:prstGeom>
+            <a:solidFill>
+              <a:srgbClr val="FFFFFF"/>
+            </a:solidFill>
+            <a:ln w="12700" cap="flat" cmpd="sng" algn="ctr">
+              <a:noFill/>
+              <a:prstDash val="solid"/>
+              <a:miter lim="800000"/>
+            </a:ln>
+            <a:effectLst/>
+            <a:extLst>
+              <a:ext uri="{91240B29-F687-4F45-9708-019B960494DF}">
+                <a14:hiddenLine xmlns:a14="http://schemas.microsoft.com/office/drawing/2010/main" w="12700" cap="flat" cmpd="sng" algn="ctr">
+                  <a:solidFill>
+                    <a:schemeClr val="accent1">
+                      <a:shade val="50000"/>
+                    </a:schemeClr>
+                  </a:solidFill>
+                  <a:prstDash val="solid"/>
+                  <a:miter lim="800000"/>
+                </a14:hiddenLine>
+              </a:ext>
+            </a:extLst>
+          </p:spPr>
+          <p:style>
+            <a:lnRef idx="2">
+              <a:schemeClr val="accent1">
+                <a:shade val="50000"/>
+              </a:schemeClr>
+            </a:lnRef>
+            <a:fillRef idx="1">
+              <a:schemeClr val="accent1"/>
+            </a:fillRef>
+            <a:effectRef idx="0">
+              <a:schemeClr val="accent1"/>
+            </a:effectRef>
+            <a:fontRef idx="minor">
+              <a:schemeClr val="lt1"/>
+            </a:fontRef>
+          </p:style>
+          <p:txBody>
+            <a:bodyPr rtlCol="0" anchor="ctr"/>
+            <a:lstStyle/>
+            <a:p>
+              <a:pPr algn="ctr"/>
+              <a:endParaRPr lang="pt-BR">
+                <a:solidFill>
+                  <a:schemeClr val="tx1"/>
+                </a:solidFill>
+              </a:endParaRPr>
+            </a:p>
+          </p:txBody>
+        </p:sp>
+        <p:sp>
+          <p:nvSpPr>
+            <p:cNvPr id="8" name="Marker4">
+              <a:extLst>
+                <a:ext uri="{FF2B5EF4-FFF2-40B4-BE49-F238E27FC236}">
+                  <a16:creationId xmlns:a16="http://schemas.microsoft.com/office/drawing/2014/main" id="{D77EFCA4-DC01-84F8-5FAB-B0F05A36CAC7}"/>
+                </a:ext>
+              </a:extLst>
+            </p:cNvPr>
+            <p:cNvSpPr txBox="1"/>
+            <p:nvPr/>
+          </p:nvSpPr>
+          <p:spPr>
+            <a:xfrm>
+              <a:off x="11849100" y="6527800"/>
+              <a:ext cx="242374" cy="230832"/>
+            </a:xfrm>
+            <a:prstGeom prst="rect">
+              <a:avLst/>
+            </a:prstGeom>
+            <a:noFill/>
+          </p:spPr>
+          <p:txBody>
+            <a:bodyPr vert="horz" wrap="none" rtlCol="0">
+              <a:spAutoFit/>
+            </a:bodyPr>
+            <a:lstStyle/>
+            <a:p>
+              <a:r>
+                <a:rPr lang="pt-BR" sz="900"/>
+                <a:t>9</a:t>
+              </a:r>
+            </a:p>
+          </p:txBody>
+        </p:sp>
+      </p:grpSp>
     </p:spTree>
     <p:extLst>
       <p:ext uri="{BB962C8B-B14F-4D97-AF65-F5344CB8AC3E}">

</xml_diff>